<commit_message>
Support for HEX values in color swap operations
</commit_message>
<xml_diff>
--- a/cmd/pptx-toolkit/testdata/test.pptx
+++ b/cmd/pptx-toolkit/testdata/test.pptx
@@ -4,11 +4,13 @@
   <p:sldMasterIdLst>
     <p:sldMasterId id="2147483648" r:id="rId1"/>
     <p:sldMasterId id="2147483660" r:id="rId2"/>
+    <p:sldMasterId id="2147483672" r:id="rId3"/>
   </p:sldMasterIdLst>
   <p:sldIdLst>
-    <p:sldId id="256" r:id="rId3"/>
-    <p:sldId id="257" r:id="rId4"/>
-    <p:sldId id="258" r:id="rId5"/>
+    <p:sldId id="256" r:id="rId4"/>
+    <p:sldId id="257" r:id="rId5"/>
+    <p:sldId id="258" r:id="rId6"/>
+    <p:sldId id="259" r:id="rId7"/>
   </p:sldIdLst>
   <p:sldSz cx="12192000" cy="6858000"/>
   <p:notesSz cx="6858000" cy="9144000"/>
@@ -107,6 +109,11 @@
       </a:defRPr>
     </a:lvl9pPr>
   </p:defaultTextStyle>
+  <p:extLst>
+    <p:ext uri="{EFAFB233-063F-42B5-8137-9DF3F51BA10A}">
+      <p15:sldGuideLst xmlns:p15="http://schemas.microsoft.com/office/powerpoint/2012/main"/>
+    </p:ext>
+  </p:extLst>
 </p:presentation>
 </file>
 
@@ -263,7 +270,7 @@
           <a:p>
             <a:fld id="{99FB2E88-1E27-2243-AE12-8E9276940C7E}" type="datetimeFigureOut">
               <a:rPr lang="en-US" smtClean="0"/>
-              <a:t>10/22/25</a:t>
+              <a:t>10/23/2025</a:t>
             </a:fld>
             <a:endParaRPr lang="en-US"/>
           </a:p>
@@ -463,7 +470,7 @@
           <a:p>
             <a:fld id="{99FB2E88-1E27-2243-AE12-8E9276940C7E}" type="datetimeFigureOut">
               <a:rPr lang="en-US" smtClean="0"/>
-              <a:t>10/22/25</a:t>
+              <a:t>10/23/2025</a:t>
             </a:fld>
             <a:endParaRPr lang="en-US"/>
           </a:p>
@@ -673,7 +680,7 @@
           <a:p>
             <a:fld id="{99FB2E88-1E27-2243-AE12-8E9276940C7E}" type="datetimeFigureOut">
               <a:rPr lang="en-US" smtClean="0"/>
-              <a:t>10/22/25</a:t>
+              <a:t>10/23/2025</a:t>
             </a:fld>
             <a:endParaRPr lang="en-US"/>
           </a:p>
@@ -899,7 +906,7 @@
           <a:p>
             <a:fld id="{99FB2E88-1E27-2243-AE12-8E9276940C7E}" type="datetimeFigureOut">
               <a:rPr lang="en-US" smtClean="0"/>
-              <a:t>10/22/25</a:t>
+              <a:t>10/23/2025</a:t>
             </a:fld>
             <a:endParaRPr lang="en-US"/>
           </a:p>
@@ -1099,7 +1106,7 @@
           <a:p>
             <a:fld id="{99FB2E88-1E27-2243-AE12-8E9276940C7E}" type="datetimeFigureOut">
               <a:rPr lang="en-US" smtClean="0"/>
-              <a:t>10/22/25</a:t>
+              <a:t>10/23/2025</a:t>
             </a:fld>
             <a:endParaRPr lang="en-US"/>
           </a:p>
@@ -1375,7 +1382,7 @@
           <a:p>
             <a:fld id="{99FB2E88-1E27-2243-AE12-8E9276940C7E}" type="datetimeFigureOut">
               <a:rPr lang="en-US" smtClean="0"/>
-              <a:t>10/22/25</a:t>
+              <a:t>10/23/2025</a:t>
             </a:fld>
             <a:endParaRPr lang="en-US"/>
           </a:p>
@@ -1643,7 +1650,7 @@
           <a:p>
             <a:fld id="{99FB2E88-1E27-2243-AE12-8E9276940C7E}" type="datetimeFigureOut">
               <a:rPr lang="en-US" smtClean="0"/>
-              <a:t>10/22/25</a:t>
+              <a:t>10/23/2025</a:t>
             </a:fld>
             <a:endParaRPr lang="en-US"/>
           </a:p>
@@ -2058,7 +2065,7 @@
           <a:p>
             <a:fld id="{99FB2E88-1E27-2243-AE12-8E9276940C7E}" type="datetimeFigureOut">
               <a:rPr lang="en-US" smtClean="0"/>
-              <a:t>10/22/25</a:t>
+              <a:t>10/23/2025</a:t>
             </a:fld>
             <a:endParaRPr lang="en-US"/>
           </a:p>
@@ -2200,7 +2207,7 @@
           <a:p>
             <a:fld id="{99FB2E88-1E27-2243-AE12-8E9276940C7E}" type="datetimeFigureOut">
               <a:rPr lang="en-US" smtClean="0"/>
-              <a:t>10/22/25</a:t>
+              <a:t>10/23/2025</a:t>
             </a:fld>
             <a:endParaRPr lang="en-US"/>
           </a:p>
@@ -2313,7 +2320,7 @@
           <a:p>
             <a:fld id="{99FB2E88-1E27-2243-AE12-8E9276940C7E}" type="datetimeFigureOut">
               <a:rPr lang="en-US" smtClean="0"/>
-              <a:t>10/22/25</a:t>
+              <a:t>10/23/2025</a:t>
             </a:fld>
             <a:endParaRPr lang="en-US"/>
           </a:p>
@@ -2626,7 +2633,7 @@
           <a:p>
             <a:fld id="{99FB2E88-1E27-2243-AE12-8E9276940C7E}" type="datetimeFigureOut">
               <a:rPr lang="en-US" smtClean="0"/>
-              <a:t>10/22/25</a:t>
+              <a:t>10/23/2025</a:t>
             </a:fld>
             <a:endParaRPr lang="en-US"/>
           </a:p>
@@ -2826,7 +2833,7 @@
           <a:p>
             <a:fld id="{99FB2E88-1E27-2243-AE12-8E9276940C7E}" type="datetimeFigureOut">
               <a:rPr lang="en-US" smtClean="0"/>
-              <a:t>10/22/25</a:t>
+              <a:t>10/23/2025</a:t>
             </a:fld>
             <a:endParaRPr lang="en-US"/>
           </a:p>
@@ -3115,7 +3122,7 @@
           <a:p>
             <a:fld id="{99FB2E88-1E27-2243-AE12-8E9276940C7E}" type="datetimeFigureOut">
               <a:rPr lang="en-US" smtClean="0"/>
-              <a:t>10/22/25</a:t>
+              <a:t>10/23/2025</a:t>
             </a:fld>
             <a:endParaRPr lang="en-US"/>
           </a:p>
@@ -3315,7 +3322,7 @@
           <a:p>
             <a:fld id="{99FB2E88-1E27-2243-AE12-8E9276940C7E}" type="datetimeFigureOut">
               <a:rPr lang="en-US" smtClean="0"/>
-              <a:t>10/22/25</a:t>
+              <a:t>10/23/2025</a:t>
             </a:fld>
             <a:endParaRPr lang="en-US"/>
           </a:p>
@@ -3525,7 +3532,7 @@
           <a:p>
             <a:fld id="{99FB2E88-1E27-2243-AE12-8E9276940C7E}" type="datetimeFigureOut">
               <a:rPr lang="en-US" smtClean="0"/>
-              <a:t>10/22/25</a:t>
+              <a:t>10/23/2025</a:t>
             </a:fld>
             <a:endParaRPr lang="en-US"/>
           </a:p>
@@ -3589,6 +3596,1646 @@
     <p:extLst>
       <p:ext uri="{BB962C8B-B14F-4D97-AF65-F5344CB8AC3E}">
         <p14:creationId xmlns:p14="http://schemas.microsoft.com/office/powerpoint/2010/main" val="3483825962"/>
+      </p:ext>
+    </p:extLst>
+  </p:cSld>
+  <p:clrMapOvr>
+    <a:masterClrMapping/>
+  </p:clrMapOvr>
+</p:sldLayout>
+</file>
+
+<file path=ppt/slideLayouts/slideLayout23.xml><?xml version="1.0" encoding="utf-8"?>
+<p:sldLayout xmlns:a="http://schemas.openxmlformats.org/drawingml/2006/main" xmlns:r="http://schemas.openxmlformats.org/officeDocument/2006/relationships" xmlns:p="http://schemas.openxmlformats.org/presentationml/2006/main" type="title" preserve="1">
+  <p:cSld name="Title Slide">
+    <p:spTree>
+      <p:nvGrpSpPr>
+        <p:cNvPr id="1" name=""/>
+        <p:cNvGrpSpPr/>
+        <p:nvPr/>
+      </p:nvGrpSpPr>
+      <p:grpSpPr>
+        <a:xfrm>
+          <a:off x="0" y="0"/>
+          <a:ext cx="0" cy="0"/>
+          <a:chOff x="0" y="0"/>
+          <a:chExt cx="0" cy="0"/>
+        </a:xfrm>
+      </p:grpSpPr>
+      <p:sp>
+        <p:nvSpPr>
+          <p:cNvPr id="2" name="Title 1">
+            <a:extLst>
+              <a:ext uri="{FF2B5EF4-FFF2-40B4-BE49-F238E27FC236}">
+                <a16:creationId xmlns:a16="http://schemas.microsoft.com/office/drawing/2014/main" id="{048CC0AE-348B-49D4-C0F8-3063E00ACC29}"/>
+              </a:ext>
+            </a:extLst>
+          </p:cNvPr>
+          <p:cNvSpPr>
+            <a:spLocks noGrp="1"/>
+          </p:cNvSpPr>
+          <p:nvPr>
+            <p:ph type="ctrTitle"/>
+          </p:nvPr>
+        </p:nvSpPr>
+        <p:spPr>
+          <a:xfrm>
+            <a:off x="1524000" y="1122363"/>
+            <a:ext cx="9144000" cy="2387600"/>
+          </a:xfrm>
+        </p:spPr>
+        <p:txBody>
+          <a:bodyPr anchor="b"/>
+          <a:lstStyle>
+            <a:lvl1pPr algn="ctr">
+              <a:defRPr sz="6000">
+                <a:solidFill>
+                  <a:schemeClr val="accent3"/>
+                </a:solidFill>
+              </a:defRPr>
+            </a:lvl1pPr>
+          </a:lstStyle>
+          <a:p>
+            <a:r>
+              <a:rPr lang="en-GB"/>
+              <a:t>Click to edit Master title style</a:t>
+            </a:r>
+            <a:endParaRPr lang="en-US"/>
+          </a:p>
+        </p:txBody>
+      </p:sp>
+      <p:sp>
+        <p:nvSpPr>
+          <p:cNvPr id="3" name="Subtitle 2">
+            <a:extLst>
+              <a:ext uri="{FF2B5EF4-FFF2-40B4-BE49-F238E27FC236}">
+                <a16:creationId xmlns:a16="http://schemas.microsoft.com/office/drawing/2014/main" id="{A1FFDE18-62FB-73DC-AAF3-680B2486B215}"/>
+              </a:ext>
+            </a:extLst>
+          </p:cNvPr>
+          <p:cNvSpPr>
+            <a:spLocks noGrp="1"/>
+          </p:cNvSpPr>
+          <p:nvPr>
+            <p:ph type="subTitle" idx="1"/>
+          </p:nvPr>
+        </p:nvSpPr>
+        <p:spPr>
+          <a:xfrm>
+            <a:off x="1524000" y="3602038"/>
+            <a:ext cx="9144000" cy="1655762"/>
+          </a:xfrm>
+        </p:spPr>
+        <p:txBody>
+          <a:bodyPr/>
+          <a:lstStyle>
+            <a:lvl1pPr marL="0" indent="0" algn="ctr">
+              <a:buNone/>
+              <a:defRPr sz="2400"/>
+            </a:lvl1pPr>
+            <a:lvl2pPr marL="457200" indent="0" algn="ctr">
+              <a:buNone/>
+              <a:defRPr sz="2000"/>
+            </a:lvl2pPr>
+            <a:lvl3pPr marL="914400" indent="0" algn="ctr">
+              <a:buNone/>
+              <a:defRPr sz="1800"/>
+            </a:lvl3pPr>
+            <a:lvl4pPr marL="1371600" indent="0" algn="ctr">
+              <a:buNone/>
+              <a:defRPr sz="1600"/>
+            </a:lvl4pPr>
+            <a:lvl5pPr marL="1828800" indent="0" algn="ctr">
+              <a:buNone/>
+              <a:defRPr sz="1600"/>
+            </a:lvl5pPr>
+            <a:lvl6pPr marL="2286000" indent="0" algn="ctr">
+              <a:buNone/>
+              <a:defRPr sz="1600"/>
+            </a:lvl6pPr>
+            <a:lvl7pPr marL="2743200" indent="0" algn="ctr">
+              <a:buNone/>
+              <a:defRPr sz="1600"/>
+            </a:lvl7pPr>
+            <a:lvl8pPr marL="3200400" indent="0" algn="ctr">
+              <a:buNone/>
+              <a:defRPr sz="1600"/>
+            </a:lvl8pPr>
+            <a:lvl9pPr marL="3657600" indent="0" algn="ctr">
+              <a:buNone/>
+              <a:defRPr sz="1600"/>
+            </a:lvl9pPr>
+          </a:lstStyle>
+          <a:p>
+            <a:r>
+              <a:rPr lang="en-GB"/>
+              <a:t>Click to edit Master subtitle style</a:t>
+            </a:r>
+            <a:endParaRPr lang="en-US"/>
+          </a:p>
+        </p:txBody>
+      </p:sp>
+      <p:sp>
+        <p:nvSpPr>
+          <p:cNvPr id="4" name="Date Placeholder 3">
+            <a:extLst>
+              <a:ext uri="{FF2B5EF4-FFF2-40B4-BE49-F238E27FC236}">
+                <a16:creationId xmlns:a16="http://schemas.microsoft.com/office/drawing/2014/main" id="{5B603CD9-CD76-EAAD-44AC-4DEA63AB1460}"/>
+              </a:ext>
+            </a:extLst>
+          </p:cNvPr>
+          <p:cNvSpPr>
+            <a:spLocks noGrp="1"/>
+          </p:cNvSpPr>
+          <p:nvPr>
+            <p:ph type="dt" sz="half" idx="10"/>
+          </p:nvPr>
+        </p:nvSpPr>
+        <p:spPr/>
+        <p:txBody>
+          <a:bodyPr/>
+          <a:lstStyle/>
+          <a:p>
+            <a:fld id="{99FB2E88-1E27-2243-AE12-8E9276940C7E}" type="datetimeFigureOut">
+              <a:rPr lang="en-US" smtClean="0"/>
+              <a:t>10/23/2025</a:t>
+            </a:fld>
+            <a:endParaRPr lang="en-US"/>
+          </a:p>
+        </p:txBody>
+      </p:sp>
+      <p:sp>
+        <p:nvSpPr>
+          <p:cNvPr id="5" name="Footer Placeholder 4">
+            <a:extLst>
+              <a:ext uri="{FF2B5EF4-FFF2-40B4-BE49-F238E27FC236}">
+                <a16:creationId xmlns:a16="http://schemas.microsoft.com/office/drawing/2014/main" id="{778046F5-307A-F909-233C-FB5A93A2C217}"/>
+              </a:ext>
+            </a:extLst>
+          </p:cNvPr>
+          <p:cNvSpPr>
+            <a:spLocks noGrp="1"/>
+          </p:cNvSpPr>
+          <p:nvPr>
+            <p:ph type="ftr" sz="quarter" idx="11"/>
+          </p:nvPr>
+        </p:nvSpPr>
+        <p:spPr/>
+        <p:txBody>
+          <a:bodyPr/>
+          <a:lstStyle/>
+          <a:p>
+            <a:endParaRPr lang="en-US"/>
+          </a:p>
+        </p:txBody>
+      </p:sp>
+      <p:sp>
+        <p:nvSpPr>
+          <p:cNvPr id="6" name="Slide Number Placeholder 5">
+            <a:extLst>
+              <a:ext uri="{FF2B5EF4-FFF2-40B4-BE49-F238E27FC236}">
+                <a16:creationId xmlns:a16="http://schemas.microsoft.com/office/drawing/2014/main" id="{6422EF47-AE4D-2AA7-096A-E34674E847C1}"/>
+              </a:ext>
+            </a:extLst>
+          </p:cNvPr>
+          <p:cNvSpPr>
+            <a:spLocks noGrp="1"/>
+          </p:cNvSpPr>
+          <p:nvPr>
+            <p:ph type="sldNum" sz="quarter" idx="12"/>
+          </p:nvPr>
+        </p:nvSpPr>
+        <p:spPr/>
+        <p:txBody>
+          <a:bodyPr/>
+          <a:lstStyle/>
+          <a:p>
+            <a:fld id="{FB79F54A-05CE-C64E-B4BD-9FE99FCAD8A2}" type="slidenum">
+              <a:rPr lang="en-US" smtClean="0"/>
+              <a:t>‹#›</a:t>
+            </a:fld>
+            <a:endParaRPr lang="en-US"/>
+          </a:p>
+        </p:txBody>
+      </p:sp>
+    </p:spTree>
+    <p:extLst>
+      <p:ext uri="{BB962C8B-B14F-4D97-AF65-F5344CB8AC3E}">
+        <p14:creationId xmlns:p14="http://schemas.microsoft.com/office/powerpoint/2010/main" val="3881219232"/>
+      </p:ext>
+    </p:extLst>
+  </p:cSld>
+  <p:clrMapOvr>
+    <a:masterClrMapping/>
+  </p:clrMapOvr>
+</p:sldLayout>
+</file>
+
+<file path=ppt/slideLayouts/slideLayout24.xml><?xml version="1.0" encoding="utf-8"?>
+<p:sldLayout xmlns:a="http://schemas.openxmlformats.org/drawingml/2006/main" xmlns:r="http://schemas.openxmlformats.org/officeDocument/2006/relationships" xmlns:p="http://schemas.openxmlformats.org/presentationml/2006/main" type="obj" preserve="1">
+  <p:cSld name="Title and Content">
+    <p:spTree>
+      <p:nvGrpSpPr>
+        <p:cNvPr id="1" name=""/>
+        <p:cNvGrpSpPr/>
+        <p:nvPr/>
+      </p:nvGrpSpPr>
+      <p:grpSpPr>
+        <a:xfrm>
+          <a:off x="0" y="0"/>
+          <a:ext cx="0" cy="0"/>
+          <a:chOff x="0" y="0"/>
+          <a:chExt cx="0" cy="0"/>
+        </a:xfrm>
+      </p:grpSpPr>
+      <p:sp>
+        <p:nvSpPr>
+          <p:cNvPr id="2" name="Title 1">
+            <a:extLst>
+              <a:ext uri="{FF2B5EF4-FFF2-40B4-BE49-F238E27FC236}">
+                <a16:creationId xmlns:a16="http://schemas.microsoft.com/office/drawing/2014/main" id="{3B8C287A-2E71-C50F-85B3-88F6316F2D14}"/>
+              </a:ext>
+            </a:extLst>
+          </p:cNvPr>
+          <p:cNvSpPr>
+            <a:spLocks noGrp="1"/>
+          </p:cNvSpPr>
+          <p:nvPr>
+            <p:ph type="title"/>
+          </p:nvPr>
+        </p:nvSpPr>
+        <p:spPr/>
+        <p:txBody>
+          <a:bodyPr/>
+          <a:lstStyle/>
+          <a:p>
+            <a:r>
+              <a:rPr lang="en-GB"/>
+              <a:t>Click to edit Master title style</a:t>
+            </a:r>
+            <a:endParaRPr lang="en-US"/>
+          </a:p>
+        </p:txBody>
+      </p:sp>
+      <p:sp>
+        <p:nvSpPr>
+          <p:cNvPr id="3" name="Content Placeholder 2">
+            <a:extLst>
+              <a:ext uri="{FF2B5EF4-FFF2-40B4-BE49-F238E27FC236}">
+                <a16:creationId xmlns:a16="http://schemas.microsoft.com/office/drawing/2014/main" id="{4110D3E7-CE46-128E-D575-4D9411BAA93B}"/>
+              </a:ext>
+            </a:extLst>
+          </p:cNvPr>
+          <p:cNvSpPr>
+            <a:spLocks noGrp="1"/>
+          </p:cNvSpPr>
+          <p:nvPr>
+            <p:ph idx="1"/>
+          </p:nvPr>
+        </p:nvSpPr>
+        <p:spPr/>
+        <p:txBody>
+          <a:bodyPr/>
+          <a:lstStyle/>
+          <a:p>
+            <a:pPr lvl="0"/>
+            <a:r>
+              <a:rPr lang="en-GB"/>
+              <a:t>Click to edit Master text styles</a:t>
+            </a:r>
+          </a:p>
+          <a:p>
+            <a:pPr lvl="1"/>
+            <a:r>
+              <a:rPr lang="en-GB"/>
+              <a:t>Second level</a:t>
+            </a:r>
+          </a:p>
+          <a:p>
+            <a:pPr lvl="2"/>
+            <a:r>
+              <a:rPr lang="en-GB"/>
+              <a:t>Third level</a:t>
+            </a:r>
+          </a:p>
+          <a:p>
+            <a:pPr lvl="3"/>
+            <a:r>
+              <a:rPr lang="en-GB"/>
+              <a:t>Fourth level</a:t>
+            </a:r>
+          </a:p>
+          <a:p>
+            <a:pPr lvl="4"/>
+            <a:r>
+              <a:rPr lang="en-GB"/>
+              <a:t>Fifth level</a:t>
+            </a:r>
+            <a:endParaRPr lang="en-US"/>
+          </a:p>
+        </p:txBody>
+      </p:sp>
+      <p:sp>
+        <p:nvSpPr>
+          <p:cNvPr id="4" name="Date Placeholder 3">
+            <a:extLst>
+              <a:ext uri="{FF2B5EF4-FFF2-40B4-BE49-F238E27FC236}">
+                <a16:creationId xmlns:a16="http://schemas.microsoft.com/office/drawing/2014/main" id="{A2D56A85-B71E-156A-1179-AE65148285A1}"/>
+              </a:ext>
+            </a:extLst>
+          </p:cNvPr>
+          <p:cNvSpPr>
+            <a:spLocks noGrp="1"/>
+          </p:cNvSpPr>
+          <p:nvPr>
+            <p:ph type="dt" sz="half" idx="10"/>
+          </p:nvPr>
+        </p:nvSpPr>
+        <p:spPr/>
+        <p:txBody>
+          <a:bodyPr/>
+          <a:lstStyle/>
+          <a:p>
+            <a:fld id="{99FB2E88-1E27-2243-AE12-8E9276940C7E}" type="datetimeFigureOut">
+              <a:rPr lang="en-US" smtClean="0"/>
+              <a:t>10/23/2025</a:t>
+            </a:fld>
+            <a:endParaRPr lang="en-US"/>
+          </a:p>
+        </p:txBody>
+      </p:sp>
+      <p:sp>
+        <p:nvSpPr>
+          <p:cNvPr id="5" name="Footer Placeholder 4">
+            <a:extLst>
+              <a:ext uri="{FF2B5EF4-FFF2-40B4-BE49-F238E27FC236}">
+                <a16:creationId xmlns:a16="http://schemas.microsoft.com/office/drawing/2014/main" id="{00E4FA0A-0D5F-A29F-C55B-0B473B940294}"/>
+              </a:ext>
+            </a:extLst>
+          </p:cNvPr>
+          <p:cNvSpPr>
+            <a:spLocks noGrp="1"/>
+          </p:cNvSpPr>
+          <p:nvPr>
+            <p:ph type="ftr" sz="quarter" idx="11"/>
+          </p:nvPr>
+        </p:nvSpPr>
+        <p:spPr/>
+        <p:txBody>
+          <a:bodyPr/>
+          <a:lstStyle/>
+          <a:p>
+            <a:endParaRPr lang="en-US"/>
+          </a:p>
+        </p:txBody>
+      </p:sp>
+      <p:sp>
+        <p:nvSpPr>
+          <p:cNvPr id="6" name="Slide Number Placeholder 5">
+            <a:extLst>
+              <a:ext uri="{FF2B5EF4-FFF2-40B4-BE49-F238E27FC236}">
+                <a16:creationId xmlns:a16="http://schemas.microsoft.com/office/drawing/2014/main" id="{DC688D67-B9FE-C872-545A-CF84F1473DD1}"/>
+              </a:ext>
+            </a:extLst>
+          </p:cNvPr>
+          <p:cNvSpPr>
+            <a:spLocks noGrp="1"/>
+          </p:cNvSpPr>
+          <p:nvPr>
+            <p:ph type="sldNum" sz="quarter" idx="12"/>
+          </p:nvPr>
+        </p:nvSpPr>
+        <p:spPr/>
+        <p:txBody>
+          <a:bodyPr/>
+          <a:lstStyle/>
+          <a:p>
+            <a:fld id="{FB79F54A-05CE-C64E-B4BD-9FE99FCAD8A2}" type="slidenum">
+              <a:rPr lang="en-US" smtClean="0"/>
+              <a:t>‹#›</a:t>
+            </a:fld>
+            <a:endParaRPr lang="en-US"/>
+          </a:p>
+        </p:txBody>
+      </p:sp>
+    </p:spTree>
+    <p:extLst>
+      <p:ext uri="{BB962C8B-B14F-4D97-AF65-F5344CB8AC3E}">
+        <p14:creationId xmlns:p14="http://schemas.microsoft.com/office/powerpoint/2010/main" val="272076875"/>
+      </p:ext>
+    </p:extLst>
+  </p:cSld>
+  <p:clrMapOvr>
+    <a:masterClrMapping/>
+  </p:clrMapOvr>
+</p:sldLayout>
+</file>
+
+<file path=ppt/slideLayouts/slideLayout25.xml><?xml version="1.0" encoding="utf-8"?>
+<p:sldLayout xmlns:a="http://schemas.openxmlformats.org/drawingml/2006/main" xmlns:r="http://schemas.openxmlformats.org/officeDocument/2006/relationships" xmlns:p="http://schemas.openxmlformats.org/presentationml/2006/main" type="secHead" preserve="1">
+  <p:cSld name="Section Header">
+    <p:spTree>
+      <p:nvGrpSpPr>
+        <p:cNvPr id="1" name=""/>
+        <p:cNvGrpSpPr/>
+        <p:nvPr/>
+      </p:nvGrpSpPr>
+      <p:grpSpPr>
+        <a:xfrm>
+          <a:off x="0" y="0"/>
+          <a:ext cx="0" cy="0"/>
+          <a:chOff x="0" y="0"/>
+          <a:chExt cx="0" cy="0"/>
+        </a:xfrm>
+      </p:grpSpPr>
+      <p:sp>
+        <p:nvSpPr>
+          <p:cNvPr id="2" name="Title 1">
+            <a:extLst>
+              <a:ext uri="{FF2B5EF4-FFF2-40B4-BE49-F238E27FC236}">
+                <a16:creationId xmlns:a16="http://schemas.microsoft.com/office/drawing/2014/main" id="{634D363B-618C-3918-1EB6-70B8BDAD22E3}"/>
+              </a:ext>
+            </a:extLst>
+          </p:cNvPr>
+          <p:cNvSpPr>
+            <a:spLocks noGrp="1"/>
+          </p:cNvSpPr>
+          <p:nvPr>
+            <p:ph type="title"/>
+          </p:nvPr>
+        </p:nvSpPr>
+        <p:spPr>
+          <a:xfrm>
+            <a:off x="831850" y="1709738"/>
+            <a:ext cx="10515600" cy="2852737"/>
+          </a:xfrm>
+        </p:spPr>
+        <p:txBody>
+          <a:bodyPr anchor="b"/>
+          <a:lstStyle>
+            <a:lvl1pPr>
+              <a:defRPr sz="6000"/>
+            </a:lvl1pPr>
+          </a:lstStyle>
+          <a:p>
+            <a:r>
+              <a:rPr lang="en-GB"/>
+              <a:t>Click to edit Master title style</a:t>
+            </a:r>
+            <a:endParaRPr lang="en-US"/>
+          </a:p>
+        </p:txBody>
+      </p:sp>
+      <p:sp>
+        <p:nvSpPr>
+          <p:cNvPr id="3" name="Text Placeholder 2">
+            <a:extLst>
+              <a:ext uri="{FF2B5EF4-FFF2-40B4-BE49-F238E27FC236}">
+                <a16:creationId xmlns:a16="http://schemas.microsoft.com/office/drawing/2014/main" id="{A6AE4ABD-22D2-36B9-8E91-5B9642B5572F}"/>
+              </a:ext>
+            </a:extLst>
+          </p:cNvPr>
+          <p:cNvSpPr>
+            <a:spLocks noGrp="1"/>
+          </p:cNvSpPr>
+          <p:nvPr>
+            <p:ph type="body" idx="1"/>
+          </p:nvPr>
+        </p:nvSpPr>
+        <p:spPr>
+          <a:xfrm>
+            <a:off x="831850" y="4589463"/>
+            <a:ext cx="10515600" cy="1500187"/>
+          </a:xfrm>
+        </p:spPr>
+        <p:txBody>
+          <a:bodyPr/>
+          <a:lstStyle>
+            <a:lvl1pPr marL="0" indent="0">
+              <a:buNone/>
+              <a:defRPr sz="2400">
+                <a:solidFill>
+                  <a:schemeClr val="tx1">
+                    <a:tint val="82000"/>
+                  </a:schemeClr>
+                </a:solidFill>
+              </a:defRPr>
+            </a:lvl1pPr>
+            <a:lvl2pPr marL="457200" indent="0">
+              <a:buNone/>
+              <a:defRPr sz="2000">
+                <a:solidFill>
+                  <a:schemeClr val="tx1">
+                    <a:tint val="82000"/>
+                  </a:schemeClr>
+                </a:solidFill>
+              </a:defRPr>
+            </a:lvl2pPr>
+            <a:lvl3pPr marL="914400" indent="0">
+              <a:buNone/>
+              <a:defRPr sz="1800">
+                <a:solidFill>
+                  <a:schemeClr val="tx1">
+                    <a:tint val="82000"/>
+                  </a:schemeClr>
+                </a:solidFill>
+              </a:defRPr>
+            </a:lvl3pPr>
+            <a:lvl4pPr marL="1371600" indent="0">
+              <a:buNone/>
+              <a:defRPr sz="1600">
+                <a:solidFill>
+                  <a:schemeClr val="tx1">
+                    <a:tint val="82000"/>
+                  </a:schemeClr>
+                </a:solidFill>
+              </a:defRPr>
+            </a:lvl4pPr>
+            <a:lvl5pPr marL="1828800" indent="0">
+              <a:buNone/>
+              <a:defRPr sz="1600">
+                <a:solidFill>
+                  <a:schemeClr val="tx1">
+                    <a:tint val="82000"/>
+                  </a:schemeClr>
+                </a:solidFill>
+              </a:defRPr>
+            </a:lvl5pPr>
+            <a:lvl6pPr marL="2286000" indent="0">
+              <a:buNone/>
+              <a:defRPr sz="1600">
+                <a:solidFill>
+                  <a:schemeClr val="tx1">
+                    <a:tint val="82000"/>
+                  </a:schemeClr>
+                </a:solidFill>
+              </a:defRPr>
+            </a:lvl6pPr>
+            <a:lvl7pPr marL="2743200" indent="0">
+              <a:buNone/>
+              <a:defRPr sz="1600">
+                <a:solidFill>
+                  <a:schemeClr val="tx1">
+                    <a:tint val="82000"/>
+                  </a:schemeClr>
+                </a:solidFill>
+              </a:defRPr>
+            </a:lvl7pPr>
+            <a:lvl8pPr marL="3200400" indent="0">
+              <a:buNone/>
+              <a:defRPr sz="1600">
+                <a:solidFill>
+                  <a:schemeClr val="tx1">
+                    <a:tint val="82000"/>
+                  </a:schemeClr>
+                </a:solidFill>
+              </a:defRPr>
+            </a:lvl8pPr>
+            <a:lvl9pPr marL="3657600" indent="0">
+              <a:buNone/>
+              <a:defRPr sz="1600">
+                <a:solidFill>
+                  <a:schemeClr val="tx1">
+                    <a:tint val="82000"/>
+                  </a:schemeClr>
+                </a:solidFill>
+              </a:defRPr>
+            </a:lvl9pPr>
+          </a:lstStyle>
+          <a:p>
+            <a:pPr lvl="0"/>
+            <a:r>
+              <a:rPr lang="en-GB"/>
+              <a:t>Click to edit Master text styles</a:t>
+            </a:r>
+          </a:p>
+        </p:txBody>
+      </p:sp>
+      <p:sp>
+        <p:nvSpPr>
+          <p:cNvPr id="4" name="Date Placeholder 3">
+            <a:extLst>
+              <a:ext uri="{FF2B5EF4-FFF2-40B4-BE49-F238E27FC236}">
+                <a16:creationId xmlns:a16="http://schemas.microsoft.com/office/drawing/2014/main" id="{E305365F-C028-4972-E997-55B7A035F177}"/>
+              </a:ext>
+            </a:extLst>
+          </p:cNvPr>
+          <p:cNvSpPr>
+            <a:spLocks noGrp="1"/>
+          </p:cNvSpPr>
+          <p:nvPr>
+            <p:ph type="dt" sz="half" idx="10"/>
+          </p:nvPr>
+        </p:nvSpPr>
+        <p:spPr/>
+        <p:txBody>
+          <a:bodyPr/>
+          <a:lstStyle/>
+          <a:p>
+            <a:fld id="{99FB2E88-1E27-2243-AE12-8E9276940C7E}" type="datetimeFigureOut">
+              <a:rPr lang="en-US" smtClean="0"/>
+              <a:t>10/23/2025</a:t>
+            </a:fld>
+            <a:endParaRPr lang="en-US"/>
+          </a:p>
+        </p:txBody>
+      </p:sp>
+      <p:sp>
+        <p:nvSpPr>
+          <p:cNvPr id="5" name="Footer Placeholder 4">
+            <a:extLst>
+              <a:ext uri="{FF2B5EF4-FFF2-40B4-BE49-F238E27FC236}">
+                <a16:creationId xmlns:a16="http://schemas.microsoft.com/office/drawing/2014/main" id="{502239D2-C0C7-93DE-96A3-6D4AC335AB25}"/>
+              </a:ext>
+            </a:extLst>
+          </p:cNvPr>
+          <p:cNvSpPr>
+            <a:spLocks noGrp="1"/>
+          </p:cNvSpPr>
+          <p:nvPr>
+            <p:ph type="ftr" sz="quarter" idx="11"/>
+          </p:nvPr>
+        </p:nvSpPr>
+        <p:spPr/>
+        <p:txBody>
+          <a:bodyPr/>
+          <a:lstStyle/>
+          <a:p>
+            <a:endParaRPr lang="en-US"/>
+          </a:p>
+        </p:txBody>
+      </p:sp>
+      <p:sp>
+        <p:nvSpPr>
+          <p:cNvPr id="6" name="Slide Number Placeholder 5">
+            <a:extLst>
+              <a:ext uri="{FF2B5EF4-FFF2-40B4-BE49-F238E27FC236}">
+                <a16:creationId xmlns:a16="http://schemas.microsoft.com/office/drawing/2014/main" id="{C34CDDA3-3F19-03A2-54D9-31171FD5D845}"/>
+              </a:ext>
+            </a:extLst>
+          </p:cNvPr>
+          <p:cNvSpPr>
+            <a:spLocks noGrp="1"/>
+          </p:cNvSpPr>
+          <p:nvPr>
+            <p:ph type="sldNum" sz="quarter" idx="12"/>
+          </p:nvPr>
+        </p:nvSpPr>
+        <p:spPr/>
+        <p:txBody>
+          <a:bodyPr/>
+          <a:lstStyle/>
+          <a:p>
+            <a:fld id="{FB79F54A-05CE-C64E-B4BD-9FE99FCAD8A2}" type="slidenum">
+              <a:rPr lang="en-US" smtClean="0"/>
+              <a:t>‹#›</a:t>
+            </a:fld>
+            <a:endParaRPr lang="en-US"/>
+          </a:p>
+        </p:txBody>
+      </p:sp>
+    </p:spTree>
+    <p:extLst>
+      <p:ext uri="{BB962C8B-B14F-4D97-AF65-F5344CB8AC3E}">
+        <p14:creationId xmlns:p14="http://schemas.microsoft.com/office/powerpoint/2010/main" val="1356785041"/>
+      </p:ext>
+    </p:extLst>
+  </p:cSld>
+  <p:clrMapOvr>
+    <a:masterClrMapping/>
+  </p:clrMapOvr>
+</p:sldLayout>
+</file>
+
+<file path=ppt/slideLayouts/slideLayout26.xml><?xml version="1.0" encoding="utf-8"?>
+<p:sldLayout xmlns:a="http://schemas.openxmlformats.org/drawingml/2006/main" xmlns:r="http://schemas.openxmlformats.org/officeDocument/2006/relationships" xmlns:p="http://schemas.openxmlformats.org/presentationml/2006/main" type="twoObj" preserve="1">
+  <p:cSld name="Two Content">
+    <p:spTree>
+      <p:nvGrpSpPr>
+        <p:cNvPr id="1" name=""/>
+        <p:cNvGrpSpPr/>
+        <p:nvPr/>
+      </p:nvGrpSpPr>
+      <p:grpSpPr>
+        <a:xfrm>
+          <a:off x="0" y="0"/>
+          <a:ext cx="0" cy="0"/>
+          <a:chOff x="0" y="0"/>
+          <a:chExt cx="0" cy="0"/>
+        </a:xfrm>
+      </p:grpSpPr>
+      <p:sp>
+        <p:nvSpPr>
+          <p:cNvPr id="2" name="Title 1">
+            <a:extLst>
+              <a:ext uri="{FF2B5EF4-FFF2-40B4-BE49-F238E27FC236}">
+                <a16:creationId xmlns:a16="http://schemas.microsoft.com/office/drawing/2014/main" id="{EC98AB4D-2C78-9FB1-83C9-09E12CBDB379}"/>
+              </a:ext>
+            </a:extLst>
+          </p:cNvPr>
+          <p:cNvSpPr>
+            <a:spLocks noGrp="1"/>
+          </p:cNvSpPr>
+          <p:nvPr>
+            <p:ph type="title"/>
+          </p:nvPr>
+        </p:nvSpPr>
+        <p:spPr/>
+        <p:txBody>
+          <a:bodyPr/>
+          <a:lstStyle/>
+          <a:p>
+            <a:r>
+              <a:rPr lang="en-GB"/>
+              <a:t>Click to edit Master title style</a:t>
+            </a:r>
+            <a:endParaRPr lang="en-US"/>
+          </a:p>
+        </p:txBody>
+      </p:sp>
+      <p:sp>
+        <p:nvSpPr>
+          <p:cNvPr id="3" name="Content Placeholder 2">
+            <a:extLst>
+              <a:ext uri="{FF2B5EF4-FFF2-40B4-BE49-F238E27FC236}">
+                <a16:creationId xmlns:a16="http://schemas.microsoft.com/office/drawing/2014/main" id="{0B4F1C6D-8D3C-27E3-C4B6-903EA2FA185D}"/>
+              </a:ext>
+            </a:extLst>
+          </p:cNvPr>
+          <p:cNvSpPr>
+            <a:spLocks noGrp="1"/>
+          </p:cNvSpPr>
+          <p:nvPr>
+            <p:ph sz="half" idx="1"/>
+          </p:nvPr>
+        </p:nvSpPr>
+        <p:spPr>
+          <a:xfrm>
+            <a:off x="838200" y="1825625"/>
+            <a:ext cx="5181600" cy="4351338"/>
+          </a:xfrm>
+        </p:spPr>
+        <p:txBody>
+          <a:bodyPr/>
+          <a:lstStyle/>
+          <a:p>
+            <a:pPr lvl="0"/>
+            <a:r>
+              <a:rPr lang="en-GB"/>
+              <a:t>Click to edit Master text styles</a:t>
+            </a:r>
+          </a:p>
+          <a:p>
+            <a:pPr lvl="1"/>
+            <a:r>
+              <a:rPr lang="en-GB"/>
+              <a:t>Second level</a:t>
+            </a:r>
+          </a:p>
+          <a:p>
+            <a:pPr lvl="2"/>
+            <a:r>
+              <a:rPr lang="en-GB"/>
+              <a:t>Third level</a:t>
+            </a:r>
+          </a:p>
+          <a:p>
+            <a:pPr lvl="3"/>
+            <a:r>
+              <a:rPr lang="en-GB"/>
+              <a:t>Fourth level</a:t>
+            </a:r>
+          </a:p>
+          <a:p>
+            <a:pPr lvl="4"/>
+            <a:r>
+              <a:rPr lang="en-GB"/>
+              <a:t>Fifth level</a:t>
+            </a:r>
+            <a:endParaRPr lang="en-US"/>
+          </a:p>
+        </p:txBody>
+      </p:sp>
+      <p:sp>
+        <p:nvSpPr>
+          <p:cNvPr id="4" name="Content Placeholder 3">
+            <a:extLst>
+              <a:ext uri="{FF2B5EF4-FFF2-40B4-BE49-F238E27FC236}">
+                <a16:creationId xmlns:a16="http://schemas.microsoft.com/office/drawing/2014/main" id="{C9C34339-2218-4601-38AC-C30C82EB5783}"/>
+              </a:ext>
+            </a:extLst>
+          </p:cNvPr>
+          <p:cNvSpPr>
+            <a:spLocks noGrp="1"/>
+          </p:cNvSpPr>
+          <p:nvPr>
+            <p:ph sz="half" idx="2"/>
+          </p:nvPr>
+        </p:nvSpPr>
+        <p:spPr>
+          <a:xfrm>
+            <a:off x="6172200" y="1825625"/>
+            <a:ext cx="5181600" cy="4351338"/>
+          </a:xfrm>
+        </p:spPr>
+        <p:txBody>
+          <a:bodyPr/>
+          <a:lstStyle/>
+          <a:p>
+            <a:pPr lvl="0"/>
+            <a:r>
+              <a:rPr lang="en-GB"/>
+              <a:t>Click to edit Master text styles</a:t>
+            </a:r>
+          </a:p>
+          <a:p>
+            <a:pPr lvl="1"/>
+            <a:r>
+              <a:rPr lang="en-GB"/>
+              <a:t>Second level</a:t>
+            </a:r>
+          </a:p>
+          <a:p>
+            <a:pPr lvl="2"/>
+            <a:r>
+              <a:rPr lang="en-GB"/>
+              <a:t>Third level</a:t>
+            </a:r>
+          </a:p>
+          <a:p>
+            <a:pPr lvl="3"/>
+            <a:r>
+              <a:rPr lang="en-GB"/>
+              <a:t>Fourth level</a:t>
+            </a:r>
+          </a:p>
+          <a:p>
+            <a:pPr lvl="4"/>
+            <a:r>
+              <a:rPr lang="en-GB"/>
+              <a:t>Fifth level</a:t>
+            </a:r>
+            <a:endParaRPr lang="en-US"/>
+          </a:p>
+        </p:txBody>
+      </p:sp>
+      <p:sp>
+        <p:nvSpPr>
+          <p:cNvPr id="5" name="Date Placeholder 4">
+            <a:extLst>
+              <a:ext uri="{FF2B5EF4-FFF2-40B4-BE49-F238E27FC236}">
+                <a16:creationId xmlns:a16="http://schemas.microsoft.com/office/drawing/2014/main" id="{6A9AF6B3-1992-08B1-B905-6653297392A5}"/>
+              </a:ext>
+            </a:extLst>
+          </p:cNvPr>
+          <p:cNvSpPr>
+            <a:spLocks noGrp="1"/>
+          </p:cNvSpPr>
+          <p:nvPr>
+            <p:ph type="dt" sz="half" idx="10"/>
+          </p:nvPr>
+        </p:nvSpPr>
+        <p:spPr/>
+        <p:txBody>
+          <a:bodyPr/>
+          <a:lstStyle/>
+          <a:p>
+            <a:fld id="{99FB2E88-1E27-2243-AE12-8E9276940C7E}" type="datetimeFigureOut">
+              <a:rPr lang="en-US" smtClean="0"/>
+              <a:t>10/23/2025</a:t>
+            </a:fld>
+            <a:endParaRPr lang="en-US"/>
+          </a:p>
+        </p:txBody>
+      </p:sp>
+      <p:sp>
+        <p:nvSpPr>
+          <p:cNvPr id="6" name="Footer Placeholder 5">
+            <a:extLst>
+              <a:ext uri="{FF2B5EF4-FFF2-40B4-BE49-F238E27FC236}">
+                <a16:creationId xmlns:a16="http://schemas.microsoft.com/office/drawing/2014/main" id="{6BD402DF-2B6B-CB53-8A47-18F1E65BE969}"/>
+              </a:ext>
+            </a:extLst>
+          </p:cNvPr>
+          <p:cNvSpPr>
+            <a:spLocks noGrp="1"/>
+          </p:cNvSpPr>
+          <p:nvPr>
+            <p:ph type="ftr" sz="quarter" idx="11"/>
+          </p:nvPr>
+        </p:nvSpPr>
+        <p:spPr/>
+        <p:txBody>
+          <a:bodyPr/>
+          <a:lstStyle/>
+          <a:p>
+            <a:endParaRPr lang="en-US"/>
+          </a:p>
+        </p:txBody>
+      </p:sp>
+      <p:sp>
+        <p:nvSpPr>
+          <p:cNvPr id="7" name="Slide Number Placeholder 6">
+            <a:extLst>
+              <a:ext uri="{FF2B5EF4-FFF2-40B4-BE49-F238E27FC236}">
+                <a16:creationId xmlns:a16="http://schemas.microsoft.com/office/drawing/2014/main" id="{0D9D845F-EAC5-E3C4-C5FB-C9DE13FE9574}"/>
+              </a:ext>
+            </a:extLst>
+          </p:cNvPr>
+          <p:cNvSpPr>
+            <a:spLocks noGrp="1"/>
+          </p:cNvSpPr>
+          <p:nvPr>
+            <p:ph type="sldNum" sz="quarter" idx="12"/>
+          </p:nvPr>
+        </p:nvSpPr>
+        <p:spPr/>
+        <p:txBody>
+          <a:bodyPr/>
+          <a:lstStyle/>
+          <a:p>
+            <a:fld id="{FB79F54A-05CE-C64E-B4BD-9FE99FCAD8A2}" type="slidenum">
+              <a:rPr lang="en-US" smtClean="0"/>
+              <a:t>‹#›</a:t>
+            </a:fld>
+            <a:endParaRPr lang="en-US"/>
+          </a:p>
+        </p:txBody>
+      </p:sp>
+    </p:spTree>
+    <p:extLst>
+      <p:ext uri="{BB962C8B-B14F-4D97-AF65-F5344CB8AC3E}">
+        <p14:creationId xmlns:p14="http://schemas.microsoft.com/office/powerpoint/2010/main" val="119219810"/>
+      </p:ext>
+    </p:extLst>
+  </p:cSld>
+  <p:clrMapOvr>
+    <a:masterClrMapping/>
+  </p:clrMapOvr>
+</p:sldLayout>
+</file>
+
+<file path=ppt/slideLayouts/slideLayout27.xml><?xml version="1.0" encoding="utf-8"?>
+<p:sldLayout xmlns:a="http://schemas.openxmlformats.org/drawingml/2006/main" xmlns:r="http://schemas.openxmlformats.org/officeDocument/2006/relationships" xmlns:p="http://schemas.openxmlformats.org/presentationml/2006/main" type="twoTxTwoObj" preserve="1">
+  <p:cSld name="Comparison">
+    <p:spTree>
+      <p:nvGrpSpPr>
+        <p:cNvPr id="1" name=""/>
+        <p:cNvGrpSpPr/>
+        <p:nvPr/>
+      </p:nvGrpSpPr>
+      <p:grpSpPr>
+        <a:xfrm>
+          <a:off x="0" y="0"/>
+          <a:ext cx="0" cy="0"/>
+          <a:chOff x="0" y="0"/>
+          <a:chExt cx="0" cy="0"/>
+        </a:xfrm>
+      </p:grpSpPr>
+      <p:sp>
+        <p:nvSpPr>
+          <p:cNvPr id="2" name="Title 1">
+            <a:extLst>
+              <a:ext uri="{FF2B5EF4-FFF2-40B4-BE49-F238E27FC236}">
+                <a16:creationId xmlns:a16="http://schemas.microsoft.com/office/drawing/2014/main" id="{2EB04905-1692-44BE-FB18-B8B064E5092C}"/>
+              </a:ext>
+            </a:extLst>
+          </p:cNvPr>
+          <p:cNvSpPr>
+            <a:spLocks noGrp="1"/>
+          </p:cNvSpPr>
+          <p:nvPr>
+            <p:ph type="title"/>
+          </p:nvPr>
+        </p:nvSpPr>
+        <p:spPr>
+          <a:xfrm>
+            <a:off x="839788" y="365125"/>
+            <a:ext cx="10515600" cy="1325563"/>
+          </a:xfrm>
+        </p:spPr>
+        <p:txBody>
+          <a:bodyPr/>
+          <a:lstStyle/>
+          <a:p>
+            <a:r>
+              <a:rPr lang="en-GB"/>
+              <a:t>Click to edit Master title style</a:t>
+            </a:r>
+            <a:endParaRPr lang="en-US"/>
+          </a:p>
+        </p:txBody>
+      </p:sp>
+      <p:sp>
+        <p:nvSpPr>
+          <p:cNvPr id="3" name="Text Placeholder 2">
+            <a:extLst>
+              <a:ext uri="{FF2B5EF4-FFF2-40B4-BE49-F238E27FC236}">
+                <a16:creationId xmlns:a16="http://schemas.microsoft.com/office/drawing/2014/main" id="{7EA8611C-B2A1-7DD2-18F5-719908939524}"/>
+              </a:ext>
+            </a:extLst>
+          </p:cNvPr>
+          <p:cNvSpPr>
+            <a:spLocks noGrp="1"/>
+          </p:cNvSpPr>
+          <p:nvPr>
+            <p:ph type="body" idx="1"/>
+          </p:nvPr>
+        </p:nvSpPr>
+        <p:spPr>
+          <a:xfrm>
+            <a:off x="839788" y="1681163"/>
+            <a:ext cx="5157787" cy="823912"/>
+          </a:xfrm>
+        </p:spPr>
+        <p:txBody>
+          <a:bodyPr anchor="b"/>
+          <a:lstStyle>
+            <a:lvl1pPr marL="0" indent="0">
+              <a:buNone/>
+              <a:defRPr sz="2400" b="1"/>
+            </a:lvl1pPr>
+            <a:lvl2pPr marL="457200" indent="0">
+              <a:buNone/>
+              <a:defRPr sz="2000" b="1"/>
+            </a:lvl2pPr>
+            <a:lvl3pPr marL="914400" indent="0">
+              <a:buNone/>
+              <a:defRPr sz="1800" b="1"/>
+            </a:lvl3pPr>
+            <a:lvl4pPr marL="1371600" indent="0">
+              <a:buNone/>
+              <a:defRPr sz="1600" b="1"/>
+            </a:lvl4pPr>
+            <a:lvl5pPr marL="1828800" indent="0">
+              <a:buNone/>
+              <a:defRPr sz="1600" b="1"/>
+            </a:lvl5pPr>
+            <a:lvl6pPr marL="2286000" indent="0">
+              <a:buNone/>
+              <a:defRPr sz="1600" b="1"/>
+            </a:lvl6pPr>
+            <a:lvl7pPr marL="2743200" indent="0">
+              <a:buNone/>
+              <a:defRPr sz="1600" b="1"/>
+            </a:lvl7pPr>
+            <a:lvl8pPr marL="3200400" indent="0">
+              <a:buNone/>
+              <a:defRPr sz="1600" b="1"/>
+            </a:lvl8pPr>
+            <a:lvl9pPr marL="3657600" indent="0">
+              <a:buNone/>
+              <a:defRPr sz="1600" b="1"/>
+            </a:lvl9pPr>
+          </a:lstStyle>
+          <a:p>
+            <a:pPr lvl="0"/>
+            <a:r>
+              <a:rPr lang="en-GB"/>
+              <a:t>Click to edit Master text styles</a:t>
+            </a:r>
+          </a:p>
+        </p:txBody>
+      </p:sp>
+      <p:sp>
+        <p:nvSpPr>
+          <p:cNvPr id="4" name="Content Placeholder 3">
+            <a:extLst>
+              <a:ext uri="{FF2B5EF4-FFF2-40B4-BE49-F238E27FC236}">
+                <a16:creationId xmlns:a16="http://schemas.microsoft.com/office/drawing/2014/main" id="{49C8C00F-AA6F-AD1C-6545-263690411A4A}"/>
+              </a:ext>
+            </a:extLst>
+          </p:cNvPr>
+          <p:cNvSpPr>
+            <a:spLocks noGrp="1"/>
+          </p:cNvSpPr>
+          <p:nvPr>
+            <p:ph sz="half" idx="2"/>
+          </p:nvPr>
+        </p:nvSpPr>
+        <p:spPr>
+          <a:xfrm>
+            <a:off x="839788" y="2505075"/>
+            <a:ext cx="5157787" cy="3684588"/>
+          </a:xfrm>
+        </p:spPr>
+        <p:txBody>
+          <a:bodyPr/>
+          <a:lstStyle/>
+          <a:p>
+            <a:pPr lvl="0"/>
+            <a:r>
+              <a:rPr lang="en-GB"/>
+              <a:t>Click to edit Master text styles</a:t>
+            </a:r>
+          </a:p>
+          <a:p>
+            <a:pPr lvl="1"/>
+            <a:r>
+              <a:rPr lang="en-GB"/>
+              <a:t>Second level</a:t>
+            </a:r>
+          </a:p>
+          <a:p>
+            <a:pPr lvl="2"/>
+            <a:r>
+              <a:rPr lang="en-GB"/>
+              <a:t>Third level</a:t>
+            </a:r>
+          </a:p>
+          <a:p>
+            <a:pPr lvl="3"/>
+            <a:r>
+              <a:rPr lang="en-GB"/>
+              <a:t>Fourth level</a:t>
+            </a:r>
+          </a:p>
+          <a:p>
+            <a:pPr lvl="4"/>
+            <a:r>
+              <a:rPr lang="en-GB"/>
+              <a:t>Fifth level</a:t>
+            </a:r>
+            <a:endParaRPr lang="en-US"/>
+          </a:p>
+        </p:txBody>
+      </p:sp>
+      <p:sp>
+        <p:nvSpPr>
+          <p:cNvPr id="5" name="Text Placeholder 4">
+            <a:extLst>
+              <a:ext uri="{FF2B5EF4-FFF2-40B4-BE49-F238E27FC236}">
+                <a16:creationId xmlns:a16="http://schemas.microsoft.com/office/drawing/2014/main" id="{93884DF8-003B-F11B-2F25-06074C23F06A}"/>
+              </a:ext>
+            </a:extLst>
+          </p:cNvPr>
+          <p:cNvSpPr>
+            <a:spLocks noGrp="1"/>
+          </p:cNvSpPr>
+          <p:nvPr>
+            <p:ph type="body" sz="quarter" idx="3"/>
+          </p:nvPr>
+        </p:nvSpPr>
+        <p:spPr>
+          <a:xfrm>
+            <a:off x="6172200" y="1681163"/>
+            <a:ext cx="5183188" cy="823912"/>
+          </a:xfrm>
+        </p:spPr>
+        <p:txBody>
+          <a:bodyPr anchor="b"/>
+          <a:lstStyle>
+            <a:lvl1pPr marL="0" indent="0">
+              <a:buNone/>
+              <a:defRPr sz="2400" b="1"/>
+            </a:lvl1pPr>
+            <a:lvl2pPr marL="457200" indent="0">
+              <a:buNone/>
+              <a:defRPr sz="2000" b="1"/>
+            </a:lvl2pPr>
+            <a:lvl3pPr marL="914400" indent="0">
+              <a:buNone/>
+              <a:defRPr sz="1800" b="1"/>
+            </a:lvl3pPr>
+            <a:lvl4pPr marL="1371600" indent="0">
+              <a:buNone/>
+              <a:defRPr sz="1600" b="1"/>
+            </a:lvl4pPr>
+            <a:lvl5pPr marL="1828800" indent="0">
+              <a:buNone/>
+              <a:defRPr sz="1600" b="1"/>
+            </a:lvl5pPr>
+            <a:lvl6pPr marL="2286000" indent="0">
+              <a:buNone/>
+              <a:defRPr sz="1600" b="1"/>
+            </a:lvl6pPr>
+            <a:lvl7pPr marL="2743200" indent="0">
+              <a:buNone/>
+              <a:defRPr sz="1600" b="1"/>
+            </a:lvl7pPr>
+            <a:lvl8pPr marL="3200400" indent="0">
+              <a:buNone/>
+              <a:defRPr sz="1600" b="1"/>
+            </a:lvl8pPr>
+            <a:lvl9pPr marL="3657600" indent="0">
+              <a:buNone/>
+              <a:defRPr sz="1600" b="1"/>
+            </a:lvl9pPr>
+          </a:lstStyle>
+          <a:p>
+            <a:pPr lvl="0"/>
+            <a:r>
+              <a:rPr lang="en-GB"/>
+              <a:t>Click to edit Master text styles</a:t>
+            </a:r>
+          </a:p>
+        </p:txBody>
+      </p:sp>
+      <p:sp>
+        <p:nvSpPr>
+          <p:cNvPr id="6" name="Content Placeholder 5">
+            <a:extLst>
+              <a:ext uri="{FF2B5EF4-FFF2-40B4-BE49-F238E27FC236}">
+                <a16:creationId xmlns:a16="http://schemas.microsoft.com/office/drawing/2014/main" id="{A515DCAA-DF70-3D3E-8E4B-A874444AA0DE}"/>
+              </a:ext>
+            </a:extLst>
+          </p:cNvPr>
+          <p:cNvSpPr>
+            <a:spLocks noGrp="1"/>
+          </p:cNvSpPr>
+          <p:nvPr>
+            <p:ph sz="quarter" idx="4"/>
+          </p:nvPr>
+        </p:nvSpPr>
+        <p:spPr>
+          <a:xfrm>
+            <a:off x="6172200" y="2505075"/>
+            <a:ext cx="5183188" cy="3684588"/>
+          </a:xfrm>
+        </p:spPr>
+        <p:txBody>
+          <a:bodyPr/>
+          <a:lstStyle/>
+          <a:p>
+            <a:pPr lvl="0"/>
+            <a:r>
+              <a:rPr lang="en-GB"/>
+              <a:t>Click to edit Master text styles</a:t>
+            </a:r>
+          </a:p>
+          <a:p>
+            <a:pPr lvl="1"/>
+            <a:r>
+              <a:rPr lang="en-GB"/>
+              <a:t>Second level</a:t>
+            </a:r>
+          </a:p>
+          <a:p>
+            <a:pPr lvl="2"/>
+            <a:r>
+              <a:rPr lang="en-GB"/>
+              <a:t>Third level</a:t>
+            </a:r>
+          </a:p>
+          <a:p>
+            <a:pPr lvl="3"/>
+            <a:r>
+              <a:rPr lang="en-GB"/>
+              <a:t>Fourth level</a:t>
+            </a:r>
+          </a:p>
+          <a:p>
+            <a:pPr lvl="4"/>
+            <a:r>
+              <a:rPr lang="en-GB"/>
+              <a:t>Fifth level</a:t>
+            </a:r>
+            <a:endParaRPr lang="en-US"/>
+          </a:p>
+        </p:txBody>
+      </p:sp>
+      <p:sp>
+        <p:nvSpPr>
+          <p:cNvPr id="7" name="Date Placeholder 6">
+            <a:extLst>
+              <a:ext uri="{FF2B5EF4-FFF2-40B4-BE49-F238E27FC236}">
+                <a16:creationId xmlns:a16="http://schemas.microsoft.com/office/drawing/2014/main" id="{D94C67ED-5727-200F-153F-BB8159FA2B5B}"/>
+              </a:ext>
+            </a:extLst>
+          </p:cNvPr>
+          <p:cNvSpPr>
+            <a:spLocks noGrp="1"/>
+          </p:cNvSpPr>
+          <p:nvPr>
+            <p:ph type="dt" sz="half" idx="10"/>
+          </p:nvPr>
+        </p:nvSpPr>
+        <p:spPr/>
+        <p:txBody>
+          <a:bodyPr/>
+          <a:lstStyle/>
+          <a:p>
+            <a:fld id="{99FB2E88-1E27-2243-AE12-8E9276940C7E}" type="datetimeFigureOut">
+              <a:rPr lang="en-US" smtClean="0"/>
+              <a:t>10/23/2025</a:t>
+            </a:fld>
+            <a:endParaRPr lang="en-US"/>
+          </a:p>
+        </p:txBody>
+      </p:sp>
+      <p:sp>
+        <p:nvSpPr>
+          <p:cNvPr id="8" name="Footer Placeholder 7">
+            <a:extLst>
+              <a:ext uri="{FF2B5EF4-FFF2-40B4-BE49-F238E27FC236}">
+                <a16:creationId xmlns:a16="http://schemas.microsoft.com/office/drawing/2014/main" id="{65ADFB28-F40E-CCE1-E01A-F9E7371040C8}"/>
+              </a:ext>
+            </a:extLst>
+          </p:cNvPr>
+          <p:cNvSpPr>
+            <a:spLocks noGrp="1"/>
+          </p:cNvSpPr>
+          <p:nvPr>
+            <p:ph type="ftr" sz="quarter" idx="11"/>
+          </p:nvPr>
+        </p:nvSpPr>
+        <p:spPr/>
+        <p:txBody>
+          <a:bodyPr/>
+          <a:lstStyle/>
+          <a:p>
+            <a:endParaRPr lang="en-US"/>
+          </a:p>
+        </p:txBody>
+      </p:sp>
+      <p:sp>
+        <p:nvSpPr>
+          <p:cNvPr id="9" name="Slide Number Placeholder 8">
+            <a:extLst>
+              <a:ext uri="{FF2B5EF4-FFF2-40B4-BE49-F238E27FC236}">
+                <a16:creationId xmlns:a16="http://schemas.microsoft.com/office/drawing/2014/main" id="{41E5FC27-F7CC-9FE5-A5C7-B6E64AD0BC16}"/>
+              </a:ext>
+            </a:extLst>
+          </p:cNvPr>
+          <p:cNvSpPr>
+            <a:spLocks noGrp="1"/>
+          </p:cNvSpPr>
+          <p:nvPr>
+            <p:ph type="sldNum" sz="quarter" idx="12"/>
+          </p:nvPr>
+        </p:nvSpPr>
+        <p:spPr/>
+        <p:txBody>
+          <a:bodyPr/>
+          <a:lstStyle/>
+          <a:p>
+            <a:fld id="{FB79F54A-05CE-C64E-B4BD-9FE99FCAD8A2}" type="slidenum">
+              <a:rPr lang="en-US" smtClean="0"/>
+              <a:t>‹#›</a:t>
+            </a:fld>
+            <a:endParaRPr lang="en-US"/>
+          </a:p>
+        </p:txBody>
+      </p:sp>
+    </p:spTree>
+    <p:extLst>
+      <p:ext uri="{BB962C8B-B14F-4D97-AF65-F5344CB8AC3E}">
+        <p14:creationId xmlns:p14="http://schemas.microsoft.com/office/powerpoint/2010/main" val="1667051055"/>
+      </p:ext>
+    </p:extLst>
+  </p:cSld>
+  <p:clrMapOvr>
+    <a:masterClrMapping/>
+  </p:clrMapOvr>
+</p:sldLayout>
+</file>
+
+<file path=ppt/slideLayouts/slideLayout28.xml><?xml version="1.0" encoding="utf-8"?>
+<p:sldLayout xmlns:a="http://schemas.openxmlformats.org/drawingml/2006/main" xmlns:r="http://schemas.openxmlformats.org/officeDocument/2006/relationships" xmlns:p="http://schemas.openxmlformats.org/presentationml/2006/main" type="titleOnly" preserve="1">
+  <p:cSld name="Title Only">
+    <p:spTree>
+      <p:nvGrpSpPr>
+        <p:cNvPr id="1" name=""/>
+        <p:cNvGrpSpPr/>
+        <p:nvPr/>
+      </p:nvGrpSpPr>
+      <p:grpSpPr>
+        <a:xfrm>
+          <a:off x="0" y="0"/>
+          <a:ext cx="0" cy="0"/>
+          <a:chOff x="0" y="0"/>
+          <a:chExt cx="0" cy="0"/>
+        </a:xfrm>
+      </p:grpSpPr>
+      <p:sp>
+        <p:nvSpPr>
+          <p:cNvPr id="2" name="Title 1">
+            <a:extLst>
+              <a:ext uri="{FF2B5EF4-FFF2-40B4-BE49-F238E27FC236}">
+                <a16:creationId xmlns:a16="http://schemas.microsoft.com/office/drawing/2014/main" id="{7688B529-7656-B192-EB2B-80FA64DF9536}"/>
+              </a:ext>
+            </a:extLst>
+          </p:cNvPr>
+          <p:cNvSpPr>
+            <a:spLocks noGrp="1"/>
+          </p:cNvSpPr>
+          <p:nvPr>
+            <p:ph type="title"/>
+          </p:nvPr>
+        </p:nvSpPr>
+        <p:spPr/>
+        <p:txBody>
+          <a:bodyPr/>
+          <a:lstStyle/>
+          <a:p>
+            <a:r>
+              <a:rPr lang="en-GB"/>
+              <a:t>Click to edit Master title style</a:t>
+            </a:r>
+            <a:endParaRPr lang="en-US"/>
+          </a:p>
+        </p:txBody>
+      </p:sp>
+      <p:sp>
+        <p:nvSpPr>
+          <p:cNvPr id="3" name="Date Placeholder 2">
+            <a:extLst>
+              <a:ext uri="{FF2B5EF4-FFF2-40B4-BE49-F238E27FC236}">
+                <a16:creationId xmlns:a16="http://schemas.microsoft.com/office/drawing/2014/main" id="{4D537CCB-DD8A-6C9C-7435-62AEDE93E2D4}"/>
+              </a:ext>
+            </a:extLst>
+          </p:cNvPr>
+          <p:cNvSpPr>
+            <a:spLocks noGrp="1"/>
+          </p:cNvSpPr>
+          <p:nvPr>
+            <p:ph type="dt" sz="half" idx="10"/>
+          </p:nvPr>
+        </p:nvSpPr>
+        <p:spPr/>
+        <p:txBody>
+          <a:bodyPr/>
+          <a:lstStyle/>
+          <a:p>
+            <a:fld id="{99FB2E88-1E27-2243-AE12-8E9276940C7E}" type="datetimeFigureOut">
+              <a:rPr lang="en-US" smtClean="0"/>
+              <a:t>10/23/2025</a:t>
+            </a:fld>
+            <a:endParaRPr lang="en-US"/>
+          </a:p>
+        </p:txBody>
+      </p:sp>
+      <p:sp>
+        <p:nvSpPr>
+          <p:cNvPr id="4" name="Footer Placeholder 3">
+            <a:extLst>
+              <a:ext uri="{FF2B5EF4-FFF2-40B4-BE49-F238E27FC236}">
+                <a16:creationId xmlns:a16="http://schemas.microsoft.com/office/drawing/2014/main" id="{0AAD9204-296F-5A2E-3115-5D731D935BE0}"/>
+              </a:ext>
+            </a:extLst>
+          </p:cNvPr>
+          <p:cNvSpPr>
+            <a:spLocks noGrp="1"/>
+          </p:cNvSpPr>
+          <p:nvPr>
+            <p:ph type="ftr" sz="quarter" idx="11"/>
+          </p:nvPr>
+        </p:nvSpPr>
+        <p:spPr/>
+        <p:txBody>
+          <a:bodyPr/>
+          <a:lstStyle/>
+          <a:p>
+            <a:endParaRPr lang="en-US"/>
+          </a:p>
+        </p:txBody>
+      </p:sp>
+      <p:sp>
+        <p:nvSpPr>
+          <p:cNvPr id="5" name="Slide Number Placeholder 4">
+            <a:extLst>
+              <a:ext uri="{FF2B5EF4-FFF2-40B4-BE49-F238E27FC236}">
+                <a16:creationId xmlns:a16="http://schemas.microsoft.com/office/drawing/2014/main" id="{8E5FFAFC-19B6-7B74-C4C5-214259B4BD92}"/>
+              </a:ext>
+            </a:extLst>
+          </p:cNvPr>
+          <p:cNvSpPr>
+            <a:spLocks noGrp="1"/>
+          </p:cNvSpPr>
+          <p:nvPr>
+            <p:ph type="sldNum" sz="quarter" idx="12"/>
+          </p:nvPr>
+        </p:nvSpPr>
+        <p:spPr/>
+        <p:txBody>
+          <a:bodyPr/>
+          <a:lstStyle/>
+          <a:p>
+            <a:fld id="{FB79F54A-05CE-C64E-B4BD-9FE99FCAD8A2}" type="slidenum">
+              <a:rPr lang="en-US" smtClean="0"/>
+              <a:t>‹#›</a:t>
+            </a:fld>
+            <a:endParaRPr lang="en-US"/>
+          </a:p>
+        </p:txBody>
+      </p:sp>
+    </p:spTree>
+    <p:extLst>
+      <p:ext uri="{BB962C8B-B14F-4D97-AF65-F5344CB8AC3E}">
+        <p14:creationId xmlns:p14="http://schemas.microsoft.com/office/powerpoint/2010/main" val="3397386837"/>
+      </p:ext>
+    </p:extLst>
+  </p:cSld>
+  <p:clrMapOvr>
+    <a:masterClrMapping/>
+  </p:clrMapOvr>
+</p:sldLayout>
+</file>
+
+<file path=ppt/slideLayouts/slideLayout29.xml><?xml version="1.0" encoding="utf-8"?>
+<p:sldLayout xmlns:a="http://schemas.openxmlformats.org/drawingml/2006/main" xmlns:r="http://schemas.openxmlformats.org/officeDocument/2006/relationships" xmlns:p="http://schemas.openxmlformats.org/presentationml/2006/main" type="blank" preserve="1">
+  <p:cSld name="Blank">
+    <p:spTree>
+      <p:nvGrpSpPr>
+        <p:cNvPr id="1" name=""/>
+        <p:cNvGrpSpPr/>
+        <p:nvPr/>
+      </p:nvGrpSpPr>
+      <p:grpSpPr>
+        <a:xfrm>
+          <a:off x="0" y="0"/>
+          <a:ext cx="0" cy="0"/>
+          <a:chOff x="0" y="0"/>
+          <a:chExt cx="0" cy="0"/>
+        </a:xfrm>
+      </p:grpSpPr>
+      <p:sp>
+        <p:nvSpPr>
+          <p:cNvPr id="2" name="Date Placeholder 1">
+            <a:extLst>
+              <a:ext uri="{FF2B5EF4-FFF2-40B4-BE49-F238E27FC236}">
+                <a16:creationId xmlns:a16="http://schemas.microsoft.com/office/drawing/2014/main" id="{117698D7-0F9D-4481-18D5-D3A671DD8C1B}"/>
+              </a:ext>
+            </a:extLst>
+          </p:cNvPr>
+          <p:cNvSpPr>
+            <a:spLocks noGrp="1"/>
+          </p:cNvSpPr>
+          <p:nvPr>
+            <p:ph type="dt" sz="half" idx="10"/>
+          </p:nvPr>
+        </p:nvSpPr>
+        <p:spPr/>
+        <p:txBody>
+          <a:bodyPr/>
+          <a:lstStyle/>
+          <a:p>
+            <a:fld id="{99FB2E88-1E27-2243-AE12-8E9276940C7E}" type="datetimeFigureOut">
+              <a:rPr lang="en-US" smtClean="0"/>
+              <a:t>10/23/2025</a:t>
+            </a:fld>
+            <a:endParaRPr lang="en-US"/>
+          </a:p>
+        </p:txBody>
+      </p:sp>
+      <p:sp>
+        <p:nvSpPr>
+          <p:cNvPr id="3" name="Footer Placeholder 2">
+            <a:extLst>
+              <a:ext uri="{FF2B5EF4-FFF2-40B4-BE49-F238E27FC236}">
+                <a16:creationId xmlns:a16="http://schemas.microsoft.com/office/drawing/2014/main" id="{3B37F211-D4DB-9900-55E9-F2B385925022}"/>
+              </a:ext>
+            </a:extLst>
+          </p:cNvPr>
+          <p:cNvSpPr>
+            <a:spLocks noGrp="1"/>
+          </p:cNvSpPr>
+          <p:nvPr>
+            <p:ph type="ftr" sz="quarter" idx="11"/>
+          </p:nvPr>
+        </p:nvSpPr>
+        <p:spPr/>
+        <p:txBody>
+          <a:bodyPr/>
+          <a:lstStyle/>
+          <a:p>
+            <a:endParaRPr lang="en-US"/>
+          </a:p>
+        </p:txBody>
+      </p:sp>
+      <p:sp>
+        <p:nvSpPr>
+          <p:cNvPr id="4" name="Slide Number Placeholder 3">
+            <a:extLst>
+              <a:ext uri="{FF2B5EF4-FFF2-40B4-BE49-F238E27FC236}">
+                <a16:creationId xmlns:a16="http://schemas.microsoft.com/office/drawing/2014/main" id="{05135D63-75E9-D37B-6B7F-EE4E9349D03D}"/>
+              </a:ext>
+            </a:extLst>
+          </p:cNvPr>
+          <p:cNvSpPr>
+            <a:spLocks noGrp="1"/>
+          </p:cNvSpPr>
+          <p:nvPr>
+            <p:ph type="sldNum" sz="quarter" idx="12"/>
+          </p:nvPr>
+        </p:nvSpPr>
+        <p:spPr/>
+        <p:txBody>
+          <a:bodyPr/>
+          <a:lstStyle/>
+          <a:p>
+            <a:fld id="{FB79F54A-05CE-C64E-B4BD-9FE99FCAD8A2}" type="slidenum">
+              <a:rPr lang="en-US" smtClean="0"/>
+              <a:t>‹#›</a:t>
+            </a:fld>
+            <a:endParaRPr lang="en-US"/>
+          </a:p>
+        </p:txBody>
+      </p:sp>
+    </p:spTree>
+    <p:extLst>
+      <p:ext uri="{BB962C8B-B14F-4D97-AF65-F5344CB8AC3E}">
+        <p14:creationId xmlns:p14="http://schemas.microsoft.com/office/powerpoint/2010/main" val="881586059"/>
       </p:ext>
     </p:extLst>
   </p:cSld>
@@ -3801,7 +5448,7 @@
           <a:p>
             <a:fld id="{99FB2E88-1E27-2243-AE12-8E9276940C7E}" type="datetimeFigureOut">
               <a:rPr lang="en-US" smtClean="0"/>
-              <a:t>10/22/25</a:t>
+              <a:t>10/23/2025</a:t>
             </a:fld>
             <a:endParaRPr lang="en-US"/>
           </a:p>
@@ -3865,6 +5512,1018 @@
     <p:extLst>
       <p:ext uri="{BB962C8B-B14F-4D97-AF65-F5344CB8AC3E}">
         <p14:creationId xmlns:p14="http://schemas.microsoft.com/office/powerpoint/2010/main" val="2659957251"/>
+      </p:ext>
+    </p:extLst>
+  </p:cSld>
+  <p:clrMapOvr>
+    <a:masterClrMapping/>
+  </p:clrMapOvr>
+</p:sldLayout>
+</file>
+
+<file path=ppt/slideLayouts/slideLayout30.xml><?xml version="1.0" encoding="utf-8"?>
+<p:sldLayout xmlns:a="http://schemas.openxmlformats.org/drawingml/2006/main" xmlns:r="http://schemas.openxmlformats.org/officeDocument/2006/relationships" xmlns:p="http://schemas.openxmlformats.org/presentationml/2006/main" type="objTx" preserve="1">
+  <p:cSld name="Content with Caption">
+    <p:spTree>
+      <p:nvGrpSpPr>
+        <p:cNvPr id="1" name=""/>
+        <p:cNvGrpSpPr/>
+        <p:nvPr/>
+      </p:nvGrpSpPr>
+      <p:grpSpPr>
+        <a:xfrm>
+          <a:off x="0" y="0"/>
+          <a:ext cx="0" cy="0"/>
+          <a:chOff x="0" y="0"/>
+          <a:chExt cx="0" cy="0"/>
+        </a:xfrm>
+      </p:grpSpPr>
+      <p:sp>
+        <p:nvSpPr>
+          <p:cNvPr id="2" name="Title 1">
+            <a:extLst>
+              <a:ext uri="{FF2B5EF4-FFF2-40B4-BE49-F238E27FC236}">
+                <a16:creationId xmlns:a16="http://schemas.microsoft.com/office/drawing/2014/main" id="{0A2451FC-C148-9F7A-E243-A989CEC5A21D}"/>
+              </a:ext>
+            </a:extLst>
+          </p:cNvPr>
+          <p:cNvSpPr>
+            <a:spLocks noGrp="1"/>
+          </p:cNvSpPr>
+          <p:nvPr>
+            <p:ph type="title"/>
+          </p:nvPr>
+        </p:nvSpPr>
+        <p:spPr>
+          <a:xfrm>
+            <a:off x="839788" y="457200"/>
+            <a:ext cx="3932237" cy="1600200"/>
+          </a:xfrm>
+        </p:spPr>
+        <p:txBody>
+          <a:bodyPr anchor="b"/>
+          <a:lstStyle>
+            <a:lvl1pPr>
+              <a:defRPr sz="3200"/>
+            </a:lvl1pPr>
+          </a:lstStyle>
+          <a:p>
+            <a:r>
+              <a:rPr lang="en-GB"/>
+              <a:t>Click to edit Master title style</a:t>
+            </a:r>
+            <a:endParaRPr lang="en-US"/>
+          </a:p>
+        </p:txBody>
+      </p:sp>
+      <p:sp>
+        <p:nvSpPr>
+          <p:cNvPr id="3" name="Content Placeholder 2">
+            <a:extLst>
+              <a:ext uri="{FF2B5EF4-FFF2-40B4-BE49-F238E27FC236}">
+                <a16:creationId xmlns:a16="http://schemas.microsoft.com/office/drawing/2014/main" id="{008B7CFA-532F-9433-EDCF-629F4F001FCA}"/>
+              </a:ext>
+            </a:extLst>
+          </p:cNvPr>
+          <p:cNvSpPr>
+            <a:spLocks noGrp="1"/>
+          </p:cNvSpPr>
+          <p:nvPr>
+            <p:ph idx="1"/>
+          </p:nvPr>
+        </p:nvSpPr>
+        <p:spPr>
+          <a:xfrm>
+            <a:off x="5183188" y="987425"/>
+            <a:ext cx="6172200" cy="4873625"/>
+          </a:xfrm>
+        </p:spPr>
+        <p:txBody>
+          <a:bodyPr/>
+          <a:lstStyle>
+            <a:lvl1pPr>
+              <a:defRPr sz="3200"/>
+            </a:lvl1pPr>
+            <a:lvl2pPr>
+              <a:defRPr sz="2800"/>
+            </a:lvl2pPr>
+            <a:lvl3pPr>
+              <a:defRPr sz="2400"/>
+            </a:lvl3pPr>
+            <a:lvl4pPr>
+              <a:defRPr sz="2000"/>
+            </a:lvl4pPr>
+            <a:lvl5pPr>
+              <a:defRPr sz="2000"/>
+            </a:lvl5pPr>
+            <a:lvl6pPr>
+              <a:defRPr sz="2000"/>
+            </a:lvl6pPr>
+            <a:lvl7pPr>
+              <a:defRPr sz="2000"/>
+            </a:lvl7pPr>
+            <a:lvl8pPr>
+              <a:defRPr sz="2000"/>
+            </a:lvl8pPr>
+            <a:lvl9pPr>
+              <a:defRPr sz="2000"/>
+            </a:lvl9pPr>
+          </a:lstStyle>
+          <a:p>
+            <a:pPr lvl="0"/>
+            <a:r>
+              <a:rPr lang="en-GB"/>
+              <a:t>Click to edit Master text styles</a:t>
+            </a:r>
+          </a:p>
+          <a:p>
+            <a:pPr lvl="1"/>
+            <a:r>
+              <a:rPr lang="en-GB"/>
+              <a:t>Second level</a:t>
+            </a:r>
+          </a:p>
+          <a:p>
+            <a:pPr lvl="2"/>
+            <a:r>
+              <a:rPr lang="en-GB"/>
+              <a:t>Third level</a:t>
+            </a:r>
+          </a:p>
+          <a:p>
+            <a:pPr lvl="3"/>
+            <a:r>
+              <a:rPr lang="en-GB"/>
+              <a:t>Fourth level</a:t>
+            </a:r>
+          </a:p>
+          <a:p>
+            <a:pPr lvl="4"/>
+            <a:r>
+              <a:rPr lang="en-GB"/>
+              <a:t>Fifth level</a:t>
+            </a:r>
+            <a:endParaRPr lang="en-US"/>
+          </a:p>
+        </p:txBody>
+      </p:sp>
+      <p:sp>
+        <p:nvSpPr>
+          <p:cNvPr id="4" name="Text Placeholder 3">
+            <a:extLst>
+              <a:ext uri="{FF2B5EF4-FFF2-40B4-BE49-F238E27FC236}">
+                <a16:creationId xmlns:a16="http://schemas.microsoft.com/office/drawing/2014/main" id="{43A91977-C5FE-6483-0F6E-1186AE0C490C}"/>
+              </a:ext>
+            </a:extLst>
+          </p:cNvPr>
+          <p:cNvSpPr>
+            <a:spLocks noGrp="1"/>
+          </p:cNvSpPr>
+          <p:nvPr>
+            <p:ph type="body" sz="half" idx="2"/>
+          </p:nvPr>
+        </p:nvSpPr>
+        <p:spPr>
+          <a:xfrm>
+            <a:off x="839788" y="2057400"/>
+            <a:ext cx="3932237" cy="3811588"/>
+          </a:xfrm>
+        </p:spPr>
+        <p:txBody>
+          <a:bodyPr/>
+          <a:lstStyle>
+            <a:lvl1pPr marL="0" indent="0">
+              <a:buNone/>
+              <a:defRPr sz="1600"/>
+            </a:lvl1pPr>
+            <a:lvl2pPr marL="457200" indent="0">
+              <a:buNone/>
+              <a:defRPr sz="1400"/>
+            </a:lvl2pPr>
+            <a:lvl3pPr marL="914400" indent="0">
+              <a:buNone/>
+              <a:defRPr sz="1200"/>
+            </a:lvl3pPr>
+            <a:lvl4pPr marL="1371600" indent="0">
+              <a:buNone/>
+              <a:defRPr sz="1000"/>
+            </a:lvl4pPr>
+            <a:lvl5pPr marL="1828800" indent="0">
+              <a:buNone/>
+              <a:defRPr sz="1000"/>
+            </a:lvl5pPr>
+            <a:lvl6pPr marL="2286000" indent="0">
+              <a:buNone/>
+              <a:defRPr sz="1000"/>
+            </a:lvl6pPr>
+            <a:lvl7pPr marL="2743200" indent="0">
+              <a:buNone/>
+              <a:defRPr sz="1000"/>
+            </a:lvl7pPr>
+            <a:lvl8pPr marL="3200400" indent="0">
+              <a:buNone/>
+              <a:defRPr sz="1000"/>
+            </a:lvl8pPr>
+            <a:lvl9pPr marL="3657600" indent="0">
+              <a:buNone/>
+              <a:defRPr sz="1000"/>
+            </a:lvl9pPr>
+          </a:lstStyle>
+          <a:p>
+            <a:pPr lvl="0"/>
+            <a:r>
+              <a:rPr lang="en-GB"/>
+              <a:t>Click to edit Master text styles</a:t>
+            </a:r>
+          </a:p>
+        </p:txBody>
+      </p:sp>
+      <p:sp>
+        <p:nvSpPr>
+          <p:cNvPr id="5" name="Date Placeholder 4">
+            <a:extLst>
+              <a:ext uri="{FF2B5EF4-FFF2-40B4-BE49-F238E27FC236}">
+                <a16:creationId xmlns:a16="http://schemas.microsoft.com/office/drawing/2014/main" id="{41CCE1DF-5558-7AD4-1F59-8E09FC7837ED}"/>
+              </a:ext>
+            </a:extLst>
+          </p:cNvPr>
+          <p:cNvSpPr>
+            <a:spLocks noGrp="1"/>
+          </p:cNvSpPr>
+          <p:nvPr>
+            <p:ph type="dt" sz="half" idx="10"/>
+          </p:nvPr>
+        </p:nvSpPr>
+        <p:spPr/>
+        <p:txBody>
+          <a:bodyPr/>
+          <a:lstStyle/>
+          <a:p>
+            <a:fld id="{99FB2E88-1E27-2243-AE12-8E9276940C7E}" type="datetimeFigureOut">
+              <a:rPr lang="en-US" smtClean="0"/>
+              <a:t>10/23/2025</a:t>
+            </a:fld>
+            <a:endParaRPr lang="en-US"/>
+          </a:p>
+        </p:txBody>
+      </p:sp>
+      <p:sp>
+        <p:nvSpPr>
+          <p:cNvPr id="6" name="Footer Placeholder 5">
+            <a:extLst>
+              <a:ext uri="{FF2B5EF4-FFF2-40B4-BE49-F238E27FC236}">
+                <a16:creationId xmlns:a16="http://schemas.microsoft.com/office/drawing/2014/main" id="{B7A32666-34B7-7EB6-63BD-CD31F456D152}"/>
+              </a:ext>
+            </a:extLst>
+          </p:cNvPr>
+          <p:cNvSpPr>
+            <a:spLocks noGrp="1"/>
+          </p:cNvSpPr>
+          <p:nvPr>
+            <p:ph type="ftr" sz="quarter" idx="11"/>
+          </p:nvPr>
+        </p:nvSpPr>
+        <p:spPr/>
+        <p:txBody>
+          <a:bodyPr/>
+          <a:lstStyle/>
+          <a:p>
+            <a:endParaRPr lang="en-US"/>
+          </a:p>
+        </p:txBody>
+      </p:sp>
+      <p:sp>
+        <p:nvSpPr>
+          <p:cNvPr id="7" name="Slide Number Placeholder 6">
+            <a:extLst>
+              <a:ext uri="{FF2B5EF4-FFF2-40B4-BE49-F238E27FC236}">
+                <a16:creationId xmlns:a16="http://schemas.microsoft.com/office/drawing/2014/main" id="{50ABD1F7-6DF2-2A66-2CA3-22281E2C7C87}"/>
+              </a:ext>
+            </a:extLst>
+          </p:cNvPr>
+          <p:cNvSpPr>
+            <a:spLocks noGrp="1"/>
+          </p:cNvSpPr>
+          <p:nvPr>
+            <p:ph type="sldNum" sz="quarter" idx="12"/>
+          </p:nvPr>
+        </p:nvSpPr>
+        <p:spPr/>
+        <p:txBody>
+          <a:bodyPr/>
+          <a:lstStyle/>
+          <a:p>
+            <a:fld id="{FB79F54A-05CE-C64E-B4BD-9FE99FCAD8A2}" type="slidenum">
+              <a:rPr lang="en-US" smtClean="0"/>
+              <a:t>‹#›</a:t>
+            </a:fld>
+            <a:endParaRPr lang="en-US"/>
+          </a:p>
+        </p:txBody>
+      </p:sp>
+    </p:spTree>
+    <p:extLst>
+      <p:ext uri="{BB962C8B-B14F-4D97-AF65-F5344CB8AC3E}">
+        <p14:creationId xmlns:p14="http://schemas.microsoft.com/office/powerpoint/2010/main" val="77321524"/>
+      </p:ext>
+    </p:extLst>
+  </p:cSld>
+  <p:clrMapOvr>
+    <a:masterClrMapping/>
+  </p:clrMapOvr>
+</p:sldLayout>
+</file>
+
+<file path=ppt/slideLayouts/slideLayout31.xml><?xml version="1.0" encoding="utf-8"?>
+<p:sldLayout xmlns:a="http://schemas.openxmlformats.org/drawingml/2006/main" xmlns:r="http://schemas.openxmlformats.org/officeDocument/2006/relationships" xmlns:p="http://schemas.openxmlformats.org/presentationml/2006/main" type="picTx" preserve="1">
+  <p:cSld name="Picture with Caption">
+    <p:spTree>
+      <p:nvGrpSpPr>
+        <p:cNvPr id="1" name=""/>
+        <p:cNvGrpSpPr/>
+        <p:nvPr/>
+      </p:nvGrpSpPr>
+      <p:grpSpPr>
+        <a:xfrm>
+          <a:off x="0" y="0"/>
+          <a:ext cx="0" cy="0"/>
+          <a:chOff x="0" y="0"/>
+          <a:chExt cx="0" cy="0"/>
+        </a:xfrm>
+      </p:grpSpPr>
+      <p:sp>
+        <p:nvSpPr>
+          <p:cNvPr id="2" name="Title 1">
+            <a:extLst>
+              <a:ext uri="{FF2B5EF4-FFF2-40B4-BE49-F238E27FC236}">
+                <a16:creationId xmlns:a16="http://schemas.microsoft.com/office/drawing/2014/main" id="{511FE42A-C2C7-4023-A39A-0E6BA3E3F8F1}"/>
+              </a:ext>
+            </a:extLst>
+          </p:cNvPr>
+          <p:cNvSpPr>
+            <a:spLocks noGrp="1"/>
+          </p:cNvSpPr>
+          <p:nvPr>
+            <p:ph type="title"/>
+          </p:nvPr>
+        </p:nvSpPr>
+        <p:spPr>
+          <a:xfrm>
+            <a:off x="839788" y="457200"/>
+            <a:ext cx="3932237" cy="1600200"/>
+          </a:xfrm>
+        </p:spPr>
+        <p:txBody>
+          <a:bodyPr anchor="b"/>
+          <a:lstStyle>
+            <a:lvl1pPr>
+              <a:defRPr sz="3200"/>
+            </a:lvl1pPr>
+          </a:lstStyle>
+          <a:p>
+            <a:r>
+              <a:rPr lang="en-GB"/>
+              <a:t>Click to edit Master title style</a:t>
+            </a:r>
+            <a:endParaRPr lang="en-US"/>
+          </a:p>
+        </p:txBody>
+      </p:sp>
+      <p:sp>
+        <p:nvSpPr>
+          <p:cNvPr id="3" name="Picture Placeholder 2">
+            <a:extLst>
+              <a:ext uri="{FF2B5EF4-FFF2-40B4-BE49-F238E27FC236}">
+                <a16:creationId xmlns:a16="http://schemas.microsoft.com/office/drawing/2014/main" id="{14245D5E-ADD4-EC99-8FAC-5B716CA6B727}"/>
+              </a:ext>
+            </a:extLst>
+          </p:cNvPr>
+          <p:cNvSpPr>
+            <a:spLocks noGrp="1"/>
+          </p:cNvSpPr>
+          <p:nvPr>
+            <p:ph type="pic" idx="1"/>
+          </p:nvPr>
+        </p:nvSpPr>
+        <p:spPr>
+          <a:xfrm>
+            <a:off x="5183188" y="987425"/>
+            <a:ext cx="6172200" cy="4873625"/>
+          </a:xfrm>
+        </p:spPr>
+        <p:txBody>
+          <a:bodyPr/>
+          <a:lstStyle>
+            <a:lvl1pPr marL="0" indent="0">
+              <a:buNone/>
+              <a:defRPr sz="3200"/>
+            </a:lvl1pPr>
+            <a:lvl2pPr marL="457200" indent="0">
+              <a:buNone/>
+              <a:defRPr sz="2800"/>
+            </a:lvl2pPr>
+            <a:lvl3pPr marL="914400" indent="0">
+              <a:buNone/>
+              <a:defRPr sz="2400"/>
+            </a:lvl3pPr>
+            <a:lvl4pPr marL="1371600" indent="0">
+              <a:buNone/>
+              <a:defRPr sz="2000"/>
+            </a:lvl4pPr>
+            <a:lvl5pPr marL="1828800" indent="0">
+              <a:buNone/>
+              <a:defRPr sz="2000"/>
+            </a:lvl5pPr>
+            <a:lvl6pPr marL="2286000" indent="0">
+              <a:buNone/>
+              <a:defRPr sz="2000"/>
+            </a:lvl6pPr>
+            <a:lvl7pPr marL="2743200" indent="0">
+              <a:buNone/>
+              <a:defRPr sz="2000"/>
+            </a:lvl7pPr>
+            <a:lvl8pPr marL="3200400" indent="0">
+              <a:buNone/>
+              <a:defRPr sz="2000"/>
+            </a:lvl8pPr>
+            <a:lvl9pPr marL="3657600" indent="0">
+              <a:buNone/>
+              <a:defRPr sz="2000"/>
+            </a:lvl9pPr>
+          </a:lstStyle>
+          <a:p>
+            <a:endParaRPr lang="en-US"/>
+          </a:p>
+        </p:txBody>
+      </p:sp>
+      <p:sp>
+        <p:nvSpPr>
+          <p:cNvPr id="4" name="Text Placeholder 3">
+            <a:extLst>
+              <a:ext uri="{FF2B5EF4-FFF2-40B4-BE49-F238E27FC236}">
+                <a16:creationId xmlns:a16="http://schemas.microsoft.com/office/drawing/2014/main" id="{DDA21CA4-19AD-242C-9D29-41A8DF6A6E0D}"/>
+              </a:ext>
+            </a:extLst>
+          </p:cNvPr>
+          <p:cNvSpPr>
+            <a:spLocks noGrp="1"/>
+          </p:cNvSpPr>
+          <p:nvPr>
+            <p:ph type="body" sz="half" idx="2"/>
+          </p:nvPr>
+        </p:nvSpPr>
+        <p:spPr>
+          <a:xfrm>
+            <a:off x="839788" y="2057400"/>
+            <a:ext cx="3932237" cy="3811588"/>
+          </a:xfrm>
+        </p:spPr>
+        <p:txBody>
+          <a:bodyPr/>
+          <a:lstStyle>
+            <a:lvl1pPr marL="0" indent="0">
+              <a:buNone/>
+              <a:defRPr sz="1600"/>
+            </a:lvl1pPr>
+            <a:lvl2pPr marL="457200" indent="0">
+              <a:buNone/>
+              <a:defRPr sz="1400"/>
+            </a:lvl2pPr>
+            <a:lvl3pPr marL="914400" indent="0">
+              <a:buNone/>
+              <a:defRPr sz="1200"/>
+            </a:lvl3pPr>
+            <a:lvl4pPr marL="1371600" indent="0">
+              <a:buNone/>
+              <a:defRPr sz="1000"/>
+            </a:lvl4pPr>
+            <a:lvl5pPr marL="1828800" indent="0">
+              <a:buNone/>
+              <a:defRPr sz="1000"/>
+            </a:lvl5pPr>
+            <a:lvl6pPr marL="2286000" indent="0">
+              <a:buNone/>
+              <a:defRPr sz="1000"/>
+            </a:lvl6pPr>
+            <a:lvl7pPr marL="2743200" indent="0">
+              <a:buNone/>
+              <a:defRPr sz="1000"/>
+            </a:lvl7pPr>
+            <a:lvl8pPr marL="3200400" indent="0">
+              <a:buNone/>
+              <a:defRPr sz="1000"/>
+            </a:lvl8pPr>
+            <a:lvl9pPr marL="3657600" indent="0">
+              <a:buNone/>
+              <a:defRPr sz="1000"/>
+            </a:lvl9pPr>
+          </a:lstStyle>
+          <a:p>
+            <a:pPr lvl="0"/>
+            <a:r>
+              <a:rPr lang="en-GB"/>
+              <a:t>Click to edit Master text styles</a:t>
+            </a:r>
+          </a:p>
+        </p:txBody>
+      </p:sp>
+      <p:sp>
+        <p:nvSpPr>
+          <p:cNvPr id="5" name="Date Placeholder 4">
+            <a:extLst>
+              <a:ext uri="{FF2B5EF4-FFF2-40B4-BE49-F238E27FC236}">
+                <a16:creationId xmlns:a16="http://schemas.microsoft.com/office/drawing/2014/main" id="{EC2CBDDC-CB6B-ABB4-97A9-4E2A1608BE30}"/>
+              </a:ext>
+            </a:extLst>
+          </p:cNvPr>
+          <p:cNvSpPr>
+            <a:spLocks noGrp="1"/>
+          </p:cNvSpPr>
+          <p:nvPr>
+            <p:ph type="dt" sz="half" idx="10"/>
+          </p:nvPr>
+        </p:nvSpPr>
+        <p:spPr/>
+        <p:txBody>
+          <a:bodyPr/>
+          <a:lstStyle/>
+          <a:p>
+            <a:fld id="{99FB2E88-1E27-2243-AE12-8E9276940C7E}" type="datetimeFigureOut">
+              <a:rPr lang="en-US" smtClean="0"/>
+              <a:t>10/23/2025</a:t>
+            </a:fld>
+            <a:endParaRPr lang="en-US"/>
+          </a:p>
+        </p:txBody>
+      </p:sp>
+      <p:sp>
+        <p:nvSpPr>
+          <p:cNvPr id="6" name="Footer Placeholder 5">
+            <a:extLst>
+              <a:ext uri="{FF2B5EF4-FFF2-40B4-BE49-F238E27FC236}">
+                <a16:creationId xmlns:a16="http://schemas.microsoft.com/office/drawing/2014/main" id="{408FB2BB-5B3A-55BD-9F41-2688CC6FBD7A}"/>
+              </a:ext>
+            </a:extLst>
+          </p:cNvPr>
+          <p:cNvSpPr>
+            <a:spLocks noGrp="1"/>
+          </p:cNvSpPr>
+          <p:nvPr>
+            <p:ph type="ftr" sz="quarter" idx="11"/>
+          </p:nvPr>
+        </p:nvSpPr>
+        <p:spPr/>
+        <p:txBody>
+          <a:bodyPr/>
+          <a:lstStyle/>
+          <a:p>
+            <a:endParaRPr lang="en-US"/>
+          </a:p>
+        </p:txBody>
+      </p:sp>
+      <p:sp>
+        <p:nvSpPr>
+          <p:cNvPr id="7" name="Slide Number Placeholder 6">
+            <a:extLst>
+              <a:ext uri="{FF2B5EF4-FFF2-40B4-BE49-F238E27FC236}">
+                <a16:creationId xmlns:a16="http://schemas.microsoft.com/office/drawing/2014/main" id="{501D7C53-840F-A3A1-243F-360896DCBEFA}"/>
+              </a:ext>
+            </a:extLst>
+          </p:cNvPr>
+          <p:cNvSpPr>
+            <a:spLocks noGrp="1"/>
+          </p:cNvSpPr>
+          <p:nvPr>
+            <p:ph type="sldNum" sz="quarter" idx="12"/>
+          </p:nvPr>
+        </p:nvSpPr>
+        <p:spPr/>
+        <p:txBody>
+          <a:bodyPr/>
+          <a:lstStyle/>
+          <a:p>
+            <a:fld id="{FB79F54A-05CE-C64E-B4BD-9FE99FCAD8A2}" type="slidenum">
+              <a:rPr lang="en-US" smtClean="0"/>
+              <a:t>‹#›</a:t>
+            </a:fld>
+            <a:endParaRPr lang="en-US"/>
+          </a:p>
+        </p:txBody>
+      </p:sp>
+    </p:spTree>
+    <p:extLst>
+      <p:ext uri="{BB962C8B-B14F-4D97-AF65-F5344CB8AC3E}">
+        <p14:creationId xmlns:p14="http://schemas.microsoft.com/office/powerpoint/2010/main" val="2964195438"/>
+      </p:ext>
+    </p:extLst>
+  </p:cSld>
+  <p:clrMapOvr>
+    <a:masterClrMapping/>
+  </p:clrMapOvr>
+</p:sldLayout>
+</file>
+
+<file path=ppt/slideLayouts/slideLayout32.xml><?xml version="1.0" encoding="utf-8"?>
+<p:sldLayout xmlns:a="http://schemas.openxmlformats.org/drawingml/2006/main" xmlns:r="http://schemas.openxmlformats.org/officeDocument/2006/relationships" xmlns:p="http://schemas.openxmlformats.org/presentationml/2006/main" type="vertTx" preserve="1">
+  <p:cSld name="Title and Vertical Text">
+    <p:spTree>
+      <p:nvGrpSpPr>
+        <p:cNvPr id="1" name=""/>
+        <p:cNvGrpSpPr/>
+        <p:nvPr/>
+      </p:nvGrpSpPr>
+      <p:grpSpPr>
+        <a:xfrm>
+          <a:off x="0" y="0"/>
+          <a:ext cx="0" cy="0"/>
+          <a:chOff x="0" y="0"/>
+          <a:chExt cx="0" cy="0"/>
+        </a:xfrm>
+      </p:grpSpPr>
+      <p:sp>
+        <p:nvSpPr>
+          <p:cNvPr id="2" name="Title 1">
+            <a:extLst>
+              <a:ext uri="{FF2B5EF4-FFF2-40B4-BE49-F238E27FC236}">
+                <a16:creationId xmlns:a16="http://schemas.microsoft.com/office/drawing/2014/main" id="{F75A7184-1257-0912-942C-80D084BE915C}"/>
+              </a:ext>
+            </a:extLst>
+          </p:cNvPr>
+          <p:cNvSpPr>
+            <a:spLocks noGrp="1"/>
+          </p:cNvSpPr>
+          <p:nvPr>
+            <p:ph type="title"/>
+          </p:nvPr>
+        </p:nvSpPr>
+        <p:spPr/>
+        <p:txBody>
+          <a:bodyPr/>
+          <a:lstStyle/>
+          <a:p>
+            <a:r>
+              <a:rPr lang="en-GB"/>
+              <a:t>Click to edit Master title style</a:t>
+            </a:r>
+            <a:endParaRPr lang="en-US"/>
+          </a:p>
+        </p:txBody>
+      </p:sp>
+      <p:sp>
+        <p:nvSpPr>
+          <p:cNvPr id="3" name="Vertical Text Placeholder 2">
+            <a:extLst>
+              <a:ext uri="{FF2B5EF4-FFF2-40B4-BE49-F238E27FC236}">
+                <a16:creationId xmlns:a16="http://schemas.microsoft.com/office/drawing/2014/main" id="{76B514BB-DFFB-90A5-DDF3-41839164C8D7}"/>
+              </a:ext>
+            </a:extLst>
+          </p:cNvPr>
+          <p:cNvSpPr>
+            <a:spLocks noGrp="1"/>
+          </p:cNvSpPr>
+          <p:nvPr>
+            <p:ph type="body" orient="vert" idx="1"/>
+          </p:nvPr>
+        </p:nvSpPr>
+        <p:spPr/>
+        <p:txBody>
+          <a:bodyPr vert="eaVert"/>
+          <a:lstStyle/>
+          <a:p>
+            <a:pPr lvl="0"/>
+            <a:r>
+              <a:rPr lang="en-GB"/>
+              <a:t>Click to edit Master text styles</a:t>
+            </a:r>
+          </a:p>
+          <a:p>
+            <a:pPr lvl="1"/>
+            <a:r>
+              <a:rPr lang="en-GB"/>
+              <a:t>Second level</a:t>
+            </a:r>
+          </a:p>
+          <a:p>
+            <a:pPr lvl="2"/>
+            <a:r>
+              <a:rPr lang="en-GB"/>
+              <a:t>Third level</a:t>
+            </a:r>
+          </a:p>
+          <a:p>
+            <a:pPr lvl="3"/>
+            <a:r>
+              <a:rPr lang="en-GB"/>
+              <a:t>Fourth level</a:t>
+            </a:r>
+          </a:p>
+          <a:p>
+            <a:pPr lvl="4"/>
+            <a:r>
+              <a:rPr lang="en-GB"/>
+              <a:t>Fifth level</a:t>
+            </a:r>
+            <a:endParaRPr lang="en-US"/>
+          </a:p>
+        </p:txBody>
+      </p:sp>
+      <p:sp>
+        <p:nvSpPr>
+          <p:cNvPr id="4" name="Date Placeholder 3">
+            <a:extLst>
+              <a:ext uri="{FF2B5EF4-FFF2-40B4-BE49-F238E27FC236}">
+                <a16:creationId xmlns:a16="http://schemas.microsoft.com/office/drawing/2014/main" id="{19B03859-AC38-77E5-21C7-E1BE730D26DC}"/>
+              </a:ext>
+            </a:extLst>
+          </p:cNvPr>
+          <p:cNvSpPr>
+            <a:spLocks noGrp="1"/>
+          </p:cNvSpPr>
+          <p:nvPr>
+            <p:ph type="dt" sz="half" idx="10"/>
+          </p:nvPr>
+        </p:nvSpPr>
+        <p:spPr/>
+        <p:txBody>
+          <a:bodyPr/>
+          <a:lstStyle/>
+          <a:p>
+            <a:fld id="{99FB2E88-1E27-2243-AE12-8E9276940C7E}" type="datetimeFigureOut">
+              <a:rPr lang="en-US" smtClean="0"/>
+              <a:t>10/23/2025</a:t>
+            </a:fld>
+            <a:endParaRPr lang="en-US"/>
+          </a:p>
+        </p:txBody>
+      </p:sp>
+      <p:sp>
+        <p:nvSpPr>
+          <p:cNvPr id="5" name="Footer Placeholder 4">
+            <a:extLst>
+              <a:ext uri="{FF2B5EF4-FFF2-40B4-BE49-F238E27FC236}">
+                <a16:creationId xmlns:a16="http://schemas.microsoft.com/office/drawing/2014/main" id="{050B4206-8FF0-A016-C722-EF1648A0B78C}"/>
+              </a:ext>
+            </a:extLst>
+          </p:cNvPr>
+          <p:cNvSpPr>
+            <a:spLocks noGrp="1"/>
+          </p:cNvSpPr>
+          <p:nvPr>
+            <p:ph type="ftr" sz="quarter" idx="11"/>
+          </p:nvPr>
+        </p:nvSpPr>
+        <p:spPr/>
+        <p:txBody>
+          <a:bodyPr/>
+          <a:lstStyle/>
+          <a:p>
+            <a:endParaRPr lang="en-US"/>
+          </a:p>
+        </p:txBody>
+      </p:sp>
+      <p:sp>
+        <p:nvSpPr>
+          <p:cNvPr id="6" name="Slide Number Placeholder 5">
+            <a:extLst>
+              <a:ext uri="{FF2B5EF4-FFF2-40B4-BE49-F238E27FC236}">
+                <a16:creationId xmlns:a16="http://schemas.microsoft.com/office/drawing/2014/main" id="{1B332BF2-54D3-78F4-313B-667C9A015944}"/>
+              </a:ext>
+            </a:extLst>
+          </p:cNvPr>
+          <p:cNvSpPr>
+            <a:spLocks noGrp="1"/>
+          </p:cNvSpPr>
+          <p:nvPr>
+            <p:ph type="sldNum" sz="quarter" idx="12"/>
+          </p:nvPr>
+        </p:nvSpPr>
+        <p:spPr/>
+        <p:txBody>
+          <a:bodyPr/>
+          <a:lstStyle/>
+          <a:p>
+            <a:fld id="{FB79F54A-05CE-C64E-B4BD-9FE99FCAD8A2}" type="slidenum">
+              <a:rPr lang="en-US" smtClean="0"/>
+              <a:t>‹#›</a:t>
+            </a:fld>
+            <a:endParaRPr lang="en-US"/>
+          </a:p>
+        </p:txBody>
+      </p:sp>
+    </p:spTree>
+    <p:extLst>
+      <p:ext uri="{BB962C8B-B14F-4D97-AF65-F5344CB8AC3E}">
+        <p14:creationId xmlns:p14="http://schemas.microsoft.com/office/powerpoint/2010/main" val="3932472428"/>
+      </p:ext>
+    </p:extLst>
+  </p:cSld>
+  <p:clrMapOvr>
+    <a:masterClrMapping/>
+  </p:clrMapOvr>
+</p:sldLayout>
+</file>
+
+<file path=ppt/slideLayouts/slideLayout33.xml><?xml version="1.0" encoding="utf-8"?>
+<p:sldLayout xmlns:a="http://schemas.openxmlformats.org/drawingml/2006/main" xmlns:r="http://schemas.openxmlformats.org/officeDocument/2006/relationships" xmlns:p="http://schemas.openxmlformats.org/presentationml/2006/main" type="vertTitleAndTx" preserve="1">
+  <p:cSld name="Vertical Title and Text">
+    <p:spTree>
+      <p:nvGrpSpPr>
+        <p:cNvPr id="1" name=""/>
+        <p:cNvGrpSpPr/>
+        <p:nvPr/>
+      </p:nvGrpSpPr>
+      <p:grpSpPr>
+        <a:xfrm>
+          <a:off x="0" y="0"/>
+          <a:ext cx="0" cy="0"/>
+          <a:chOff x="0" y="0"/>
+          <a:chExt cx="0" cy="0"/>
+        </a:xfrm>
+      </p:grpSpPr>
+      <p:sp>
+        <p:nvSpPr>
+          <p:cNvPr id="2" name="Vertical Title 1">
+            <a:extLst>
+              <a:ext uri="{FF2B5EF4-FFF2-40B4-BE49-F238E27FC236}">
+                <a16:creationId xmlns:a16="http://schemas.microsoft.com/office/drawing/2014/main" id="{7379E53A-145B-3140-06C1-1707D12D9BD4}"/>
+              </a:ext>
+            </a:extLst>
+          </p:cNvPr>
+          <p:cNvSpPr>
+            <a:spLocks noGrp="1"/>
+          </p:cNvSpPr>
+          <p:nvPr>
+            <p:ph type="title" orient="vert"/>
+          </p:nvPr>
+        </p:nvSpPr>
+        <p:spPr>
+          <a:xfrm>
+            <a:off x="8724900" y="365125"/>
+            <a:ext cx="2628900" cy="5811838"/>
+          </a:xfrm>
+        </p:spPr>
+        <p:txBody>
+          <a:bodyPr vert="eaVert"/>
+          <a:lstStyle/>
+          <a:p>
+            <a:r>
+              <a:rPr lang="en-GB"/>
+              <a:t>Click to edit Master title style</a:t>
+            </a:r>
+            <a:endParaRPr lang="en-US"/>
+          </a:p>
+        </p:txBody>
+      </p:sp>
+      <p:sp>
+        <p:nvSpPr>
+          <p:cNvPr id="3" name="Vertical Text Placeholder 2">
+            <a:extLst>
+              <a:ext uri="{FF2B5EF4-FFF2-40B4-BE49-F238E27FC236}">
+                <a16:creationId xmlns:a16="http://schemas.microsoft.com/office/drawing/2014/main" id="{C884EDD0-D5D3-C316-5973-A235C1ECFDA8}"/>
+              </a:ext>
+            </a:extLst>
+          </p:cNvPr>
+          <p:cNvSpPr>
+            <a:spLocks noGrp="1"/>
+          </p:cNvSpPr>
+          <p:nvPr>
+            <p:ph type="body" orient="vert" idx="1"/>
+          </p:nvPr>
+        </p:nvSpPr>
+        <p:spPr>
+          <a:xfrm>
+            <a:off x="838200" y="365125"/>
+            <a:ext cx="7734300" cy="5811838"/>
+          </a:xfrm>
+        </p:spPr>
+        <p:txBody>
+          <a:bodyPr vert="eaVert"/>
+          <a:lstStyle/>
+          <a:p>
+            <a:pPr lvl="0"/>
+            <a:r>
+              <a:rPr lang="en-GB"/>
+              <a:t>Click to edit Master text styles</a:t>
+            </a:r>
+          </a:p>
+          <a:p>
+            <a:pPr lvl="1"/>
+            <a:r>
+              <a:rPr lang="en-GB"/>
+              <a:t>Second level</a:t>
+            </a:r>
+          </a:p>
+          <a:p>
+            <a:pPr lvl="2"/>
+            <a:r>
+              <a:rPr lang="en-GB"/>
+              <a:t>Third level</a:t>
+            </a:r>
+          </a:p>
+          <a:p>
+            <a:pPr lvl="3"/>
+            <a:r>
+              <a:rPr lang="en-GB"/>
+              <a:t>Fourth level</a:t>
+            </a:r>
+          </a:p>
+          <a:p>
+            <a:pPr lvl="4"/>
+            <a:r>
+              <a:rPr lang="en-GB"/>
+              <a:t>Fifth level</a:t>
+            </a:r>
+            <a:endParaRPr lang="en-US"/>
+          </a:p>
+        </p:txBody>
+      </p:sp>
+      <p:sp>
+        <p:nvSpPr>
+          <p:cNvPr id="4" name="Date Placeholder 3">
+            <a:extLst>
+              <a:ext uri="{FF2B5EF4-FFF2-40B4-BE49-F238E27FC236}">
+                <a16:creationId xmlns:a16="http://schemas.microsoft.com/office/drawing/2014/main" id="{8F094BF1-0F7E-0EC1-AC9D-E9C1215AE5EE}"/>
+              </a:ext>
+            </a:extLst>
+          </p:cNvPr>
+          <p:cNvSpPr>
+            <a:spLocks noGrp="1"/>
+          </p:cNvSpPr>
+          <p:nvPr>
+            <p:ph type="dt" sz="half" idx="10"/>
+          </p:nvPr>
+        </p:nvSpPr>
+        <p:spPr/>
+        <p:txBody>
+          <a:bodyPr/>
+          <a:lstStyle/>
+          <a:p>
+            <a:fld id="{99FB2E88-1E27-2243-AE12-8E9276940C7E}" type="datetimeFigureOut">
+              <a:rPr lang="en-US" smtClean="0"/>
+              <a:t>10/23/2025</a:t>
+            </a:fld>
+            <a:endParaRPr lang="en-US"/>
+          </a:p>
+        </p:txBody>
+      </p:sp>
+      <p:sp>
+        <p:nvSpPr>
+          <p:cNvPr id="5" name="Footer Placeholder 4">
+            <a:extLst>
+              <a:ext uri="{FF2B5EF4-FFF2-40B4-BE49-F238E27FC236}">
+                <a16:creationId xmlns:a16="http://schemas.microsoft.com/office/drawing/2014/main" id="{3E46413C-1F6B-722B-B7E9-4A9C0ACF6B84}"/>
+              </a:ext>
+            </a:extLst>
+          </p:cNvPr>
+          <p:cNvSpPr>
+            <a:spLocks noGrp="1"/>
+          </p:cNvSpPr>
+          <p:nvPr>
+            <p:ph type="ftr" sz="quarter" idx="11"/>
+          </p:nvPr>
+        </p:nvSpPr>
+        <p:spPr/>
+        <p:txBody>
+          <a:bodyPr/>
+          <a:lstStyle/>
+          <a:p>
+            <a:endParaRPr lang="en-US"/>
+          </a:p>
+        </p:txBody>
+      </p:sp>
+      <p:sp>
+        <p:nvSpPr>
+          <p:cNvPr id="6" name="Slide Number Placeholder 5">
+            <a:extLst>
+              <a:ext uri="{FF2B5EF4-FFF2-40B4-BE49-F238E27FC236}">
+                <a16:creationId xmlns:a16="http://schemas.microsoft.com/office/drawing/2014/main" id="{C83A5BDE-E101-9E2F-95DC-7505B21AF88A}"/>
+              </a:ext>
+            </a:extLst>
+          </p:cNvPr>
+          <p:cNvSpPr>
+            <a:spLocks noGrp="1"/>
+          </p:cNvSpPr>
+          <p:nvPr>
+            <p:ph type="sldNum" sz="quarter" idx="12"/>
+          </p:nvPr>
+        </p:nvSpPr>
+        <p:spPr/>
+        <p:txBody>
+          <a:bodyPr/>
+          <a:lstStyle/>
+          <a:p>
+            <a:fld id="{FB79F54A-05CE-C64E-B4BD-9FE99FCAD8A2}" type="slidenum">
+              <a:rPr lang="en-US" smtClean="0"/>
+              <a:t>‹#›</a:t>
+            </a:fld>
+            <a:endParaRPr lang="en-US"/>
+          </a:p>
+        </p:txBody>
+      </p:sp>
+    </p:spTree>
+    <p:extLst>
+      <p:ext uri="{BB962C8B-B14F-4D97-AF65-F5344CB8AC3E}">
+        <p14:creationId xmlns:p14="http://schemas.microsoft.com/office/powerpoint/2010/main" val="1923171814"/>
       </p:ext>
     </p:extLst>
   </p:cSld>
@@ -4069,7 +6728,7 @@
           <a:p>
             <a:fld id="{99FB2E88-1E27-2243-AE12-8E9276940C7E}" type="datetimeFigureOut">
               <a:rPr lang="en-US" smtClean="0"/>
-              <a:t>10/22/25</a:t>
+              <a:t>10/23/2025</a:t>
             </a:fld>
             <a:endParaRPr lang="en-US"/>
           </a:p>
@@ -4484,7 +7143,7 @@
           <a:p>
             <a:fld id="{99FB2E88-1E27-2243-AE12-8E9276940C7E}" type="datetimeFigureOut">
               <a:rPr lang="en-US" smtClean="0"/>
-              <a:t>10/22/25</a:t>
+              <a:t>10/23/2025</a:t>
             </a:fld>
             <a:endParaRPr lang="en-US"/>
           </a:p>
@@ -4626,7 +7285,7 @@
           <a:p>
             <a:fld id="{99FB2E88-1E27-2243-AE12-8E9276940C7E}" type="datetimeFigureOut">
               <a:rPr lang="en-US" smtClean="0"/>
-              <a:t>10/22/25</a:t>
+              <a:t>10/23/2025</a:t>
             </a:fld>
             <a:endParaRPr lang="en-US"/>
           </a:p>
@@ -4739,7 +7398,7 @@
           <a:p>
             <a:fld id="{99FB2E88-1E27-2243-AE12-8E9276940C7E}" type="datetimeFigureOut">
               <a:rPr lang="en-US" smtClean="0"/>
-              <a:t>10/22/25</a:t>
+              <a:t>10/23/2025</a:t>
             </a:fld>
             <a:endParaRPr lang="en-US"/>
           </a:p>
@@ -5052,7 +7711,7 @@
           <a:p>
             <a:fld id="{99FB2E88-1E27-2243-AE12-8E9276940C7E}" type="datetimeFigureOut">
               <a:rPr lang="en-US" smtClean="0"/>
-              <a:t>10/22/25</a:t>
+              <a:t>10/23/2025</a:t>
             </a:fld>
             <a:endParaRPr lang="en-US"/>
           </a:p>
@@ -5341,7 +8000,7 @@
           <a:p>
             <a:fld id="{99FB2E88-1E27-2243-AE12-8E9276940C7E}" type="datetimeFigureOut">
               <a:rPr lang="en-US" smtClean="0"/>
-              <a:t>10/22/25</a:t>
+              <a:t>10/23/2025</a:t>
             </a:fld>
             <a:endParaRPr lang="en-US"/>
           </a:p>
@@ -5584,7 +8243,7 @@
           <a:p>
             <a:fld id="{99FB2E88-1E27-2243-AE12-8E9276940C7E}" type="datetimeFigureOut">
               <a:rPr lang="en-US" smtClean="0"/>
-              <a:t>10/22/25</a:t>
+              <a:t>10/23/2025</a:t>
             </a:fld>
             <a:endParaRPr lang="en-US"/>
           </a:p>
@@ -6154,7 +8813,7 @@
           <a:p>
             <a:fld id="{99FB2E88-1E27-2243-AE12-8E9276940C7E}" type="datetimeFigureOut">
               <a:rPr lang="en-US" smtClean="0"/>
-              <a:t>10/22/25</a:t>
+              <a:t>10/23/2025</a:t>
             </a:fld>
             <a:endParaRPr lang="en-US"/>
           </a:p>
@@ -6554,6 +9213,576 @@
 </p:sldMaster>
 </file>
 
+<file path=ppt/slideMasters/slideMaster3.xml><?xml version="1.0" encoding="utf-8"?>
+<p:sldMaster xmlns:a="http://schemas.openxmlformats.org/drawingml/2006/main" xmlns:r="http://schemas.openxmlformats.org/officeDocument/2006/relationships" xmlns:p="http://schemas.openxmlformats.org/presentationml/2006/main" preserve="1">
+  <p:cSld>
+    <p:bg>
+      <p:bgRef idx="1001">
+        <a:schemeClr val="bg1"/>
+      </p:bgRef>
+    </p:bg>
+    <p:spTree>
+      <p:nvGrpSpPr>
+        <p:cNvPr id="1" name=""/>
+        <p:cNvGrpSpPr/>
+        <p:nvPr/>
+      </p:nvGrpSpPr>
+      <p:grpSpPr>
+        <a:xfrm>
+          <a:off x="0" y="0"/>
+          <a:ext cx="0" cy="0"/>
+          <a:chOff x="0" y="0"/>
+          <a:chExt cx="0" cy="0"/>
+        </a:xfrm>
+      </p:grpSpPr>
+      <p:sp>
+        <p:nvSpPr>
+          <p:cNvPr id="2" name="Title Placeholder 1">
+            <a:extLst>
+              <a:ext uri="{FF2B5EF4-FFF2-40B4-BE49-F238E27FC236}">
+                <a16:creationId xmlns:a16="http://schemas.microsoft.com/office/drawing/2014/main" id="{C9D6324B-31F2-557A-4274-6834896F1DBA}"/>
+              </a:ext>
+            </a:extLst>
+          </p:cNvPr>
+          <p:cNvSpPr>
+            <a:spLocks noGrp="1"/>
+          </p:cNvSpPr>
+          <p:nvPr>
+            <p:ph type="title"/>
+          </p:nvPr>
+        </p:nvSpPr>
+        <p:spPr>
+          <a:xfrm>
+            <a:off x="838200" y="365125"/>
+            <a:ext cx="10515600" cy="1325563"/>
+          </a:xfrm>
+          <a:prstGeom prst="rect">
+            <a:avLst/>
+          </a:prstGeom>
+        </p:spPr>
+        <p:txBody>
+          <a:bodyPr vert="horz" lIns="91440" tIns="45720" rIns="91440" bIns="45720" rtlCol="0" anchor="ctr">
+            <a:normAutofit/>
+          </a:bodyPr>
+          <a:lstStyle/>
+          <a:p>
+            <a:r>
+              <a:rPr lang="en-GB" dirty="0"/>
+              <a:t>Click to edit Master title style</a:t>
+            </a:r>
+            <a:endParaRPr lang="en-US" dirty="0"/>
+          </a:p>
+        </p:txBody>
+      </p:sp>
+      <p:sp>
+        <p:nvSpPr>
+          <p:cNvPr id="3" name="Text Placeholder 2">
+            <a:extLst>
+              <a:ext uri="{FF2B5EF4-FFF2-40B4-BE49-F238E27FC236}">
+                <a16:creationId xmlns:a16="http://schemas.microsoft.com/office/drawing/2014/main" id="{1642DE60-AB80-C23C-0AB4-CC26660D1D88}"/>
+              </a:ext>
+            </a:extLst>
+          </p:cNvPr>
+          <p:cNvSpPr>
+            <a:spLocks noGrp="1"/>
+          </p:cNvSpPr>
+          <p:nvPr>
+            <p:ph type="body" idx="1"/>
+          </p:nvPr>
+        </p:nvSpPr>
+        <p:spPr>
+          <a:xfrm>
+            <a:off x="838200" y="1825625"/>
+            <a:ext cx="10515600" cy="4351338"/>
+          </a:xfrm>
+          <a:prstGeom prst="rect">
+            <a:avLst/>
+          </a:prstGeom>
+        </p:spPr>
+        <p:txBody>
+          <a:bodyPr vert="horz" lIns="91440" tIns="45720" rIns="91440" bIns="45720" rtlCol="0">
+            <a:normAutofit/>
+          </a:bodyPr>
+          <a:lstStyle/>
+          <a:p>
+            <a:pPr lvl="0"/>
+            <a:r>
+              <a:rPr lang="en-GB"/>
+              <a:t>Click to edit Master text styles</a:t>
+            </a:r>
+          </a:p>
+          <a:p>
+            <a:pPr lvl="1"/>
+            <a:r>
+              <a:rPr lang="en-GB"/>
+              <a:t>Second level</a:t>
+            </a:r>
+          </a:p>
+          <a:p>
+            <a:pPr lvl="2"/>
+            <a:r>
+              <a:rPr lang="en-GB"/>
+              <a:t>Third level</a:t>
+            </a:r>
+          </a:p>
+          <a:p>
+            <a:pPr lvl="3"/>
+            <a:r>
+              <a:rPr lang="en-GB"/>
+              <a:t>Fourth level</a:t>
+            </a:r>
+          </a:p>
+          <a:p>
+            <a:pPr lvl="4"/>
+            <a:r>
+              <a:rPr lang="en-GB"/>
+              <a:t>Fifth level</a:t>
+            </a:r>
+            <a:endParaRPr lang="en-US"/>
+          </a:p>
+        </p:txBody>
+      </p:sp>
+      <p:sp>
+        <p:nvSpPr>
+          <p:cNvPr id="4" name="Date Placeholder 3">
+            <a:extLst>
+              <a:ext uri="{FF2B5EF4-FFF2-40B4-BE49-F238E27FC236}">
+                <a16:creationId xmlns:a16="http://schemas.microsoft.com/office/drawing/2014/main" id="{A76C5B5E-3DE7-43B3-431D-47DB824D0C55}"/>
+              </a:ext>
+            </a:extLst>
+          </p:cNvPr>
+          <p:cNvSpPr>
+            <a:spLocks noGrp="1"/>
+          </p:cNvSpPr>
+          <p:nvPr>
+            <p:ph type="dt" sz="half" idx="2"/>
+          </p:nvPr>
+        </p:nvSpPr>
+        <p:spPr>
+          <a:xfrm>
+            <a:off x="838200" y="6356350"/>
+            <a:ext cx="2743200" cy="365125"/>
+          </a:xfrm>
+          <a:prstGeom prst="rect">
+            <a:avLst/>
+          </a:prstGeom>
+        </p:spPr>
+        <p:txBody>
+          <a:bodyPr vert="horz" lIns="91440" tIns="45720" rIns="91440" bIns="45720" rtlCol="0" anchor="ctr"/>
+          <a:lstStyle>
+            <a:lvl1pPr algn="l">
+              <a:defRPr sz="1200">
+                <a:solidFill>
+                  <a:schemeClr val="tx1">
+                    <a:tint val="82000"/>
+                  </a:schemeClr>
+                </a:solidFill>
+              </a:defRPr>
+            </a:lvl1pPr>
+          </a:lstStyle>
+          <a:p>
+            <a:fld id="{99FB2E88-1E27-2243-AE12-8E9276940C7E}" type="datetimeFigureOut">
+              <a:rPr lang="en-US" smtClean="0"/>
+              <a:t>10/23/2025</a:t>
+            </a:fld>
+            <a:endParaRPr lang="en-US"/>
+          </a:p>
+        </p:txBody>
+      </p:sp>
+      <p:sp>
+        <p:nvSpPr>
+          <p:cNvPr id="5" name="Footer Placeholder 4">
+            <a:extLst>
+              <a:ext uri="{FF2B5EF4-FFF2-40B4-BE49-F238E27FC236}">
+                <a16:creationId xmlns:a16="http://schemas.microsoft.com/office/drawing/2014/main" id="{2E3113C6-CF88-599E-5213-A1183B79A783}"/>
+              </a:ext>
+            </a:extLst>
+          </p:cNvPr>
+          <p:cNvSpPr>
+            <a:spLocks noGrp="1"/>
+          </p:cNvSpPr>
+          <p:nvPr>
+            <p:ph type="ftr" sz="quarter" idx="3"/>
+          </p:nvPr>
+        </p:nvSpPr>
+        <p:spPr>
+          <a:xfrm>
+            <a:off x="4038600" y="6356350"/>
+            <a:ext cx="4114800" cy="365125"/>
+          </a:xfrm>
+          <a:prstGeom prst="rect">
+            <a:avLst/>
+          </a:prstGeom>
+        </p:spPr>
+        <p:txBody>
+          <a:bodyPr vert="horz" lIns="91440" tIns="45720" rIns="91440" bIns="45720" rtlCol="0" anchor="ctr"/>
+          <a:lstStyle>
+            <a:lvl1pPr algn="ctr">
+              <a:defRPr sz="1200">
+                <a:solidFill>
+                  <a:schemeClr val="tx1">
+                    <a:tint val="82000"/>
+                  </a:schemeClr>
+                </a:solidFill>
+              </a:defRPr>
+            </a:lvl1pPr>
+          </a:lstStyle>
+          <a:p>
+            <a:endParaRPr lang="en-US"/>
+          </a:p>
+        </p:txBody>
+      </p:sp>
+      <p:sp>
+        <p:nvSpPr>
+          <p:cNvPr id="6" name="Slide Number Placeholder 5">
+            <a:extLst>
+              <a:ext uri="{FF2B5EF4-FFF2-40B4-BE49-F238E27FC236}">
+                <a16:creationId xmlns:a16="http://schemas.microsoft.com/office/drawing/2014/main" id="{67CC3EDF-7B5B-08E4-A653-F8E35A4D0408}"/>
+              </a:ext>
+            </a:extLst>
+          </p:cNvPr>
+          <p:cNvSpPr>
+            <a:spLocks noGrp="1"/>
+          </p:cNvSpPr>
+          <p:nvPr>
+            <p:ph type="sldNum" sz="quarter" idx="4"/>
+          </p:nvPr>
+        </p:nvSpPr>
+        <p:spPr>
+          <a:xfrm>
+            <a:off x="8610600" y="6356350"/>
+            <a:ext cx="2743200" cy="365125"/>
+          </a:xfrm>
+          <a:prstGeom prst="rect">
+            <a:avLst/>
+          </a:prstGeom>
+        </p:spPr>
+        <p:txBody>
+          <a:bodyPr vert="horz" lIns="91440" tIns="45720" rIns="91440" bIns="45720" rtlCol="0" anchor="ctr"/>
+          <a:lstStyle>
+            <a:lvl1pPr algn="r">
+              <a:defRPr sz="1200">
+                <a:solidFill>
+                  <a:schemeClr val="tx1">
+                    <a:tint val="82000"/>
+                  </a:schemeClr>
+                </a:solidFill>
+              </a:defRPr>
+            </a:lvl1pPr>
+          </a:lstStyle>
+          <a:p>
+            <a:fld id="{FB79F54A-05CE-C64E-B4BD-9FE99FCAD8A2}" type="slidenum">
+              <a:rPr lang="en-US" smtClean="0"/>
+              <a:t>‹#›</a:t>
+            </a:fld>
+            <a:endParaRPr lang="en-US"/>
+          </a:p>
+        </p:txBody>
+      </p:sp>
+    </p:spTree>
+    <p:extLst>
+      <p:ext uri="{BB962C8B-B14F-4D97-AF65-F5344CB8AC3E}">
+        <p14:creationId xmlns:p14="http://schemas.microsoft.com/office/powerpoint/2010/main" val="3445733200"/>
+      </p:ext>
+    </p:extLst>
+  </p:cSld>
+  <p:clrMap bg1="lt1" tx1="dk1" bg2="lt2" tx2="dk2" accent1="accent1" accent2="accent2" accent3="accent3" accent4="accent4" accent5="accent5" accent6="accent6" hlink="hlink" folHlink="folHlink"/>
+  <p:sldLayoutIdLst>
+    <p:sldLayoutId id="2147483673" r:id="rId1"/>
+    <p:sldLayoutId id="2147483674" r:id="rId2"/>
+    <p:sldLayoutId id="2147483675" r:id="rId3"/>
+    <p:sldLayoutId id="2147483676" r:id="rId4"/>
+    <p:sldLayoutId id="2147483677" r:id="rId5"/>
+    <p:sldLayoutId id="2147483678" r:id="rId6"/>
+    <p:sldLayoutId id="2147483679" r:id="rId7"/>
+    <p:sldLayoutId id="2147483680" r:id="rId8"/>
+    <p:sldLayoutId id="2147483681" r:id="rId9"/>
+    <p:sldLayoutId id="2147483682" r:id="rId10"/>
+    <p:sldLayoutId id="2147483683" r:id="rId11"/>
+  </p:sldLayoutIdLst>
+  <p:txStyles>
+    <p:titleStyle>
+      <a:lvl1pPr algn="l" defTabSz="914400" rtl="0" eaLnBrk="1" latinLnBrk="0" hangingPunct="1">
+        <a:lnSpc>
+          <a:spcPct val="90000"/>
+        </a:lnSpc>
+        <a:spcBef>
+          <a:spcPct val="0"/>
+        </a:spcBef>
+        <a:buNone/>
+        <a:defRPr sz="4400" kern="1200">
+          <a:solidFill>
+            <a:schemeClr val="accent2"/>
+          </a:solidFill>
+          <a:latin typeface="+mj-lt"/>
+          <a:ea typeface="+mj-ea"/>
+          <a:cs typeface="+mj-cs"/>
+        </a:defRPr>
+      </a:lvl1pPr>
+    </p:titleStyle>
+    <p:bodyStyle>
+      <a:lvl1pPr marL="228600" indent="-228600" algn="l" defTabSz="914400" rtl="0" eaLnBrk="1" latinLnBrk="0" hangingPunct="1">
+        <a:lnSpc>
+          <a:spcPct val="90000"/>
+        </a:lnSpc>
+        <a:spcBef>
+          <a:spcPts val="1000"/>
+        </a:spcBef>
+        <a:buFont typeface="Arial" panose="020B0604020202020204" pitchFamily="34" charset="0"/>
+        <a:buChar char="•"/>
+        <a:defRPr sz="2800" kern="1200">
+          <a:solidFill>
+            <a:schemeClr val="tx1"/>
+          </a:solidFill>
+          <a:latin typeface="+mn-lt"/>
+          <a:ea typeface="+mn-ea"/>
+          <a:cs typeface="+mn-cs"/>
+        </a:defRPr>
+      </a:lvl1pPr>
+      <a:lvl2pPr marL="685800" indent="-228600" algn="l" defTabSz="914400" rtl="0" eaLnBrk="1" latinLnBrk="0" hangingPunct="1">
+        <a:lnSpc>
+          <a:spcPct val="90000"/>
+        </a:lnSpc>
+        <a:spcBef>
+          <a:spcPts val="500"/>
+        </a:spcBef>
+        <a:buFont typeface="Arial" panose="020B0604020202020204" pitchFamily="34" charset="0"/>
+        <a:buChar char="•"/>
+        <a:defRPr sz="2400" kern="1200">
+          <a:solidFill>
+            <a:schemeClr val="tx1"/>
+          </a:solidFill>
+          <a:latin typeface="+mn-lt"/>
+          <a:ea typeface="+mn-ea"/>
+          <a:cs typeface="+mn-cs"/>
+        </a:defRPr>
+      </a:lvl2pPr>
+      <a:lvl3pPr marL="1143000" indent="-228600" algn="l" defTabSz="914400" rtl="0" eaLnBrk="1" latinLnBrk="0" hangingPunct="1">
+        <a:lnSpc>
+          <a:spcPct val="90000"/>
+        </a:lnSpc>
+        <a:spcBef>
+          <a:spcPts val="500"/>
+        </a:spcBef>
+        <a:buFont typeface="Arial" panose="020B0604020202020204" pitchFamily="34" charset="0"/>
+        <a:buChar char="•"/>
+        <a:defRPr sz="2000" kern="1200">
+          <a:solidFill>
+            <a:schemeClr val="tx1"/>
+          </a:solidFill>
+          <a:latin typeface="+mn-lt"/>
+          <a:ea typeface="+mn-ea"/>
+          <a:cs typeface="+mn-cs"/>
+        </a:defRPr>
+      </a:lvl3pPr>
+      <a:lvl4pPr marL="1600200" indent="-228600" algn="l" defTabSz="914400" rtl="0" eaLnBrk="1" latinLnBrk="0" hangingPunct="1">
+        <a:lnSpc>
+          <a:spcPct val="90000"/>
+        </a:lnSpc>
+        <a:spcBef>
+          <a:spcPts val="500"/>
+        </a:spcBef>
+        <a:buFont typeface="Arial" panose="020B0604020202020204" pitchFamily="34" charset="0"/>
+        <a:buChar char="•"/>
+        <a:defRPr sz="1800" kern="1200">
+          <a:solidFill>
+            <a:schemeClr val="tx1"/>
+          </a:solidFill>
+          <a:latin typeface="+mn-lt"/>
+          <a:ea typeface="+mn-ea"/>
+          <a:cs typeface="+mn-cs"/>
+        </a:defRPr>
+      </a:lvl4pPr>
+      <a:lvl5pPr marL="2057400" indent="-228600" algn="l" defTabSz="914400" rtl="0" eaLnBrk="1" latinLnBrk="0" hangingPunct="1">
+        <a:lnSpc>
+          <a:spcPct val="90000"/>
+        </a:lnSpc>
+        <a:spcBef>
+          <a:spcPts val="500"/>
+        </a:spcBef>
+        <a:buFont typeface="Arial" panose="020B0604020202020204" pitchFamily="34" charset="0"/>
+        <a:buChar char="•"/>
+        <a:defRPr sz="1800" kern="1200">
+          <a:solidFill>
+            <a:schemeClr val="tx1"/>
+          </a:solidFill>
+          <a:latin typeface="+mn-lt"/>
+          <a:ea typeface="+mn-ea"/>
+          <a:cs typeface="+mn-cs"/>
+        </a:defRPr>
+      </a:lvl5pPr>
+      <a:lvl6pPr marL="2514600" indent="-228600" algn="l" defTabSz="914400" rtl="0" eaLnBrk="1" latinLnBrk="0" hangingPunct="1">
+        <a:lnSpc>
+          <a:spcPct val="90000"/>
+        </a:lnSpc>
+        <a:spcBef>
+          <a:spcPts val="500"/>
+        </a:spcBef>
+        <a:buFont typeface="Arial" panose="020B0604020202020204" pitchFamily="34" charset="0"/>
+        <a:buChar char="•"/>
+        <a:defRPr sz="1800" kern="1200">
+          <a:solidFill>
+            <a:schemeClr val="tx1"/>
+          </a:solidFill>
+          <a:latin typeface="+mn-lt"/>
+          <a:ea typeface="+mn-ea"/>
+          <a:cs typeface="+mn-cs"/>
+        </a:defRPr>
+      </a:lvl6pPr>
+      <a:lvl7pPr marL="2971800" indent="-228600" algn="l" defTabSz="914400" rtl="0" eaLnBrk="1" latinLnBrk="0" hangingPunct="1">
+        <a:lnSpc>
+          <a:spcPct val="90000"/>
+        </a:lnSpc>
+        <a:spcBef>
+          <a:spcPts val="500"/>
+        </a:spcBef>
+        <a:buFont typeface="Arial" panose="020B0604020202020204" pitchFamily="34" charset="0"/>
+        <a:buChar char="•"/>
+        <a:defRPr sz="1800" kern="1200">
+          <a:solidFill>
+            <a:schemeClr val="tx1"/>
+          </a:solidFill>
+          <a:latin typeface="+mn-lt"/>
+          <a:ea typeface="+mn-ea"/>
+          <a:cs typeface="+mn-cs"/>
+        </a:defRPr>
+      </a:lvl7pPr>
+      <a:lvl8pPr marL="3429000" indent="-228600" algn="l" defTabSz="914400" rtl="0" eaLnBrk="1" latinLnBrk="0" hangingPunct="1">
+        <a:lnSpc>
+          <a:spcPct val="90000"/>
+        </a:lnSpc>
+        <a:spcBef>
+          <a:spcPts val="500"/>
+        </a:spcBef>
+        <a:buFont typeface="Arial" panose="020B0604020202020204" pitchFamily="34" charset="0"/>
+        <a:buChar char="•"/>
+        <a:defRPr sz="1800" kern="1200">
+          <a:solidFill>
+            <a:schemeClr val="tx1"/>
+          </a:solidFill>
+          <a:latin typeface="+mn-lt"/>
+          <a:ea typeface="+mn-ea"/>
+          <a:cs typeface="+mn-cs"/>
+        </a:defRPr>
+      </a:lvl8pPr>
+      <a:lvl9pPr marL="3886200" indent="-228600" algn="l" defTabSz="914400" rtl="0" eaLnBrk="1" latinLnBrk="0" hangingPunct="1">
+        <a:lnSpc>
+          <a:spcPct val="90000"/>
+        </a:lnSpc>
+        <a:spcBef>
+          <a:spcPts val="500"/>
+        </a:spcBef>
+        <a:buFont typeface="Arial" panose="020B0604020202020204" pitchFamily="34" charset="0"/>
+        <a:buChar char="•"/>
+        <a:defRPr sz="1800" kern="1200">
+          <a:solidFill>
+            <a:schemeClr val="tx1"/>
+          </a:solidFill>
+          <a:latin typeface="+mn-lt"/>
+          <a:ea typeface="+mn-ea"/>
+          <a:cs typeface="+mn-cs"/>
+        </a:defRPr>
+      </a:lvl9pPr>
+    </p:bodyStyle>
+    <p:otherStyle>
+      <a:defPPr>
+        <a:defRPr lang="en-US"/>
+      </a:defPPr>
+      <a:lvl1pPr marL="0" algn="l" defTabSz="914400" rtl="0" eaLnBrk="1" latinLnBrk="0" hangingPunct="1">
+        <a:defRPr sz="1800" kern="1200">
+          <a:solidFill>
+            <a:schemeClr val="tx1"/>
+          </a:solidFill>
+          <a:latin typeface="+mn-lt"/>
+          <a:ea typeface="+mn-ea"/>
+          <a:cs typeface="+mn-cs"/>
+        </a:defRPr>
+      </a:lvl1pPr>
+      <a:lvl2pPr marL="457200" algn="l" defTabSz="914400" rtl="0" eaLnBrk="1" latinLnBrk="0" hangingPunct="1">
+        <a:defRPr sz="1800" kern="1200">
+          <a:solidFill>
+            <a:schemeClr val="tx1"/>
+          </a:solidFill>
+          <a:latin typeface="+mn-lt"/>
+          <a:ea typeface="+mn-ea"/>
+          <a:cs typeface="+mn-cs"/>
+        </a:defRPr>
+      </a:lvl2pPr>
+      <a:lvl3pPr marL="914400" algn="l" defTabSz="914400" rtl="0" eaLnBrk="1" latinLnBrk="0" hangingPunct="1">
+        <a:defRPr sz="1800" kern="1200">
+          <a:solidFill>
+            <a:schemeClr val="tx1"/>
+          </a:solidFill>
+          <a:latin typeface="+mn-lt"/>
+          <a:ea typeface="+mn-ea"/>
+          <a:cs typeface="+mn-cs"/>
+        </a:defRPr>
+      </a:lvl3pPr>
+      <a:lvl4pPr marL="1371600" algn="l" defTabSz="914400" rtl="0" eaLnBrk="1" latinLnBrk="0" hangingPunct="1">
+        <a:defRPr sz="1800" kern="1200">
+          <a:solidFill>
+            <a:schemeClr val="tx1"/>
+          </a:solidFill>
+          <a:latin typeface="+mn-lt"/>
+          <a:ea typeface="+mn-ea"/>
+          <a:cs typeface="+mn-cs"/>
+        </a:defRPr>
+      </a:lvl4pPr>
+      <a:lvl5pPr marL="1828800" algn="l" defTabSz="914400" rtl="0" eaLnBrk="1" latinLnBrk="0" hangingPunct="1">
+        <a:defRPr sz="1800" kern="1200">
+          <a:solidFill>
+            <a:schemeClr val="tx1"/>
+          </a:solidFill>
+          <a:latin typeface="+mn-lt"/>
+          <a:ea typeface="+mn-ea"/>
+          <a:cs typeface="+mn-cs"/>
+        </a:defRPr>
+      </a:lvl5pPr>
+      <a:lvl6pPr marL="2286000" algn="l" defTabSz="914400" rtl="0" eaLnBrk="1" latinLnBrk="0" hangingPunct="1">
+        <a:defRPr sz="1800" kern="1200">
+          <a:solidFill>
+            <a:schemeClr val="tx1"/>
+          </a:solidFill>
+          <a:latin typeface="+mn-lt"/>
+          <a:ea typeface="+mn-ea"/>
+          <a:cs typeface="+mn-cs"/>
+        </a:defRPr>
+      </a:lvl6pPr>
+      <a:lvl7pPr marL="2743200" algn="l" defTabSz="914400" rtl="0" eaLnBrk="1" latinLnBrk="0" hangingPunct="1">
+        <a:defRPr sz="1800" kern="1200">
+          <a:solidFill>
+            <a:schemeClr val="tx1"/>
+          </a:solidFill>
+          <a:latin typeface="+mn-lt"/>
+          <a:ea typeface="+mn-ea"/>
+          <a:cs typeface="+mn-cs"/>
+        </a:defRPr>
+      </a:lvl7pPr>
+      <a:lvl8pPr marL="3200400" algn="l" defTabSz="914400" rtl="0" eaLnBrk="1" latinLnBrk="0" hangingPunct="1">
+        <a:defRPr sz="1800" kern="1200">
+          <a:solidFill>
+            <a:schemeClr val="tx1"/>
+          </a:solidFill>
+          <a:latin typeface="+mn-lt"/>
+          <a:ea typeface="+mn-ea"/>
+          <a:cs typeface="+mn-cs"/>
+        </a:defRPr>
+      </a:lvl8pPr>
+      <a:lvl9pPr marL="3657600" algn="l" defTabSz="914400" rtl="0" eaLnBrk="1" latinLnBrk="0" hangingPunct="1">
+        <a:defRPr sz="1800" kern="1200">
+          <a:solidFill>
+            <a:schemeClr val="tx1"/>
+          </a:solidFill>
+          <a:latin typeface="+mn-lt"/>
+          <a:ea typeface="+mn-ea"/>
+          <a:cs typeface="+mn-cs"/>
+        </a:defRPr>
+      </a:lvl9pPr>
+    </p:otherStyle>
+  </p:txStyles>
+</p:sldMaster>
+</file>
+
 <file path=ppt/slides/slide1.xml><?xml version="1.0" encoding="utf-8"?>
 <p:sld xmlns:a="http://schemas.openxmlformats.org/drawingml/2006/main" xmlns:r="http://schemas.openxmlformats.org/officeDocument/2006/relationships" xmlns:p="http://schemas.openxmlformats.org/presentationml/2006/main">
   <p:cSld>
@@ -6593,7 +9822,11 @@
           <a:lstStyle/>
           <a:p>
             <a:r>
-              <a:rPr lang="en-US" dirty="0"/>
+              <a:rPr lang="en-US" dirty="0">
+                <a:solidFill>
+                  <a:srgbClr val="000000"/>
+                </a:solidFill>
+              </a:rPr>
               <a:t>PowerPoint test file</a:t>
             </a:r>
           </a:p>
@@ -6621,7 +9854,11 @@
           <a:lstStyle/>
           <a:p>
             <a:r>
-              <a:rPr lang="en-US" dirty="0"/>
+              <a:rPr lang="en-US" dirty="0">
+                <a:solidFill>
+                  <a:srgbClr val="000000"/>
+                </a:solidFill>
+              </a:rPr>
               <a:t>For PMDCI’s PPTX-toolkit</a:t>
             </a:r>
           </a:p>
@@ -7023,6 +10260,208 @@
     <p:extLst>
       <p:ext uri="{BB962C8B-B14F-4D97-AF65-F5344CB8AC3E}">
         <p14:creationId xmlns:p14="http://schemas.microsoft.com/office/powerpoint/2010/main" val="1162886184"/>
+      </p:ext>
+    </p:extLst>
+  </p:cSld>
+  <p:clrMapOvr>
+    <a:masterClrMapping/>
+  </p:clrMapOvr>
+</p:sld>
+</file>
+
+<file path=ppt/slides/slide4.xml><?xml version="1.0" encoding="utf-8"?>
+<p:sld xmlns:a="http://schemas.openxmlformats.org/drawingml/2006/main" xmlns:r="http://schemas.openxmlformats.org/officeDocument/2006/relationships" xmlns:p="http://schemas.openxmlformats.org/presentationml/2006/main">
+  <p:cSld>
+    <p:spTree>
+      <p:nvGrpSpPr>
+        <p:cNvPr id="1" name="">
+          <a:extLst>
+            <a:ext uri="{FF2B5EF4-FFF2-40B4-BE49-F238E27FC236}">
+              <a16:creationId xmlns:a16="http://schemas.microsoft.com/office/drawing/2014/main" id="{B5C27B92-83EA-3DAC-D683-40ECE85DF327}"/>
+            </a:ext>
+          </a:extLst>
+        </p:cNvPr>
+        <p:cNvGrpSpPr/>
+        <p:nvPr/>
+      </p:nvGrpSpPr>
+      <p:grpSpPr>
+        <a:xfrm>
+          <a:off x="0" y="0"/>
+          <a:ext cx="0" cy="0"/>
+          <a:chOff x="0" y="0"/>
+          <a:chExt cx="0" cy="0"/>
+        </a:xfrm>
+      </p:grpSpPr>
+      <p:sp>
+        <p:nvSpPr>
+          <p:cNvPr id="4" name="Title 3">
+            <a:extLst>
+              <a:ext uri="{FF2B5EF4-FFF2-40B4-BE49-F238E27FC236}">
+                <a16:creationId xmlns:a16="http://schemas.microsoft.com/office/drawing/2014/main" id="{76339C3D-B45D-5A8A-A8AE-3BB865EFAAFA}"/>
+              </a:ext>
+            </a:extLst>
+          </p:cNvPr>
+          <p:cNvSpPr>
+            <a:spLocks noGrp="1"/>
+          </p:cNvSpPr>
+          <p:nvPr>
+            <p:ph type="title"/>
+          </p:nvPr>
+        </p:nvSpPr>
+        <p:spPr/>
+        <p:txBody>
+          <a:bodyPr/>
+          <a:lstStyle/>
+          <a:p>
+            <a:r>
+              <a:rPr lang="en-US" dirty="0"/>
+              <a:t>Theme 3: Custom Theme Deck</a:t>
+            </a:r>
+          </a:p>
+        </p:txBody>
+      </p:sp>
+      <p:sp>
+        <p:nvSpPr>
+          <p:cNvPr id="5" name="Content Placeholder 4">
+            <a:extLst>
+              <a:ext uri="{FF2B5EF4-FFF2-40B4-BE49-F238E27FC236}">
+                <a16:creationId xmlns:a16="http://schemas.microsoft.com/office/drawing/2014/main" id="{AECE963C-B697-E503-1575-E4670B07081A}"/>
+              </a:ext>
+            </a:extLst>
+          </p:cNvPr>
+          <p:cNvSpPr>
+            <a:spLocks noGrp="1"/>
+          </p:cNvSpPr>
+          <p:nvPr>
+            <p:ph idx="1"/>
+          </p:nvPr>
+        </p:nvSpPr>
+        <p:spPr/>
+        <p:txBody>
+          <a:bodyPr>
+            <a:normAutofit fontScale="77500" lnSpcReduction="20000"/>
+          </a:bodyPr>
+          <a:lstStyle/>
+          <a:p>
+            <a:r>
+              <a:rPr lang="en-US" dirty="0">
+                <a:solidFill>
+                  <a:schemeClr val="bg1"/>
+                </a:solidFill>
+              </a:rPr>
+              <a:t>Background 1</a:t>
+            </a:r>
+          </a:p>
+          <a:p>
+            <a:r>
+              <a:rPr lang="en-US" dirty="0"/>
+              <a:t>Text 1</a:t>
+            </a:r>
+          </a:p>
+          <a:p>
+            <a:r>
+              <a:rPr lang="en-US" dirty="0">
+                <a:solidFill>
+                  <a:schemeClr val="bg2"/>
+                </a:solidFill>
+              </a:rPr>
+              <a:t>Background 2</a:t>
+            </a:r>
+          </a:p>
+          <a:p>
+            <a:r>
+              <a:rPr lang="en-US" dirty="0">
+                <a:solidFill>
+                  <a:schemeClr val="tx2"/>
+                </a:solidFill>
+              </a:rPr>
+              <a:t>Text 2</a:t>
+            </a:r>
+          </a:p>
+          <a:p>
+            <a:r>
+              <a:rPr lang="en-US" dirty="0">
+                <a:solidFill>
+                  <a:schemeClr val="accent1"/>
+                </a:solidFill>
+              </a:rPr>
+              <a:t>Accent 1</a:t>
+            </a:r>
+          </a:p>
+          <a:p>
+            <a:r>
+              <a:rPr lang="en-US" dirty="0">
+                <a:solidFill>
+                  <a:schemeClr val="accent2"/>
+                </a:solidFill>
+              </a:rPr>
+              <a:t>Accent 2</a:t>
+            </a:r>
+          </a:p>
+          <a:p>
+            <a:r>
+              <a:rPr lang="en-US" dirty="0">
+                <a:solidFill>
+                  <a:schemeClr val="accent3"/>
+                </a:solidFill>
+              </a:rPr>
+              <a:t>Accent 3</a:t>
+            </a:r>
+          </a:p>
+          <a:p>
+            <a:r>
+              <a:rPr lang="en-US" dirty="0">
+                <a:solidFill>
+                  <a:schemeClr val="accent4"/>
+                </a:solidFill>
+              </a:rPr>
+              <a:t>Accent 4</a:t>
+            </a:r>
+          </a:p>
+          <a:p>
+            <a:r>
+              <a:rPr lang="en-US" dirty="0">
+                <a:solidFill>
+                  <a:schemeClr val="accent5"/>
+                </a:solidFill>
+              </a:rPr>
+              <a:t>Accent 5</a:t>
+            </a:r>
+          </a:p>
+          <a:p>
+            <a:r>
+              <a:rPr lang="en-US" dirty="0">
+                <a:solidFill>
+                  <a:schemeClr val="accent6"/>
+                </a:solidFill>
+              </a:rPr>
+              <a:t>Accent 6</a:t>
+            </a:r>
+          </a:p>
+          <a:p>
+            <a:r>
+              <a:rPr lang="en-US" dirty="0">
+                <a:hlinkClick r:id="rId2"/>
+              </a:rPr>
+              <a:t>Hyperlink</a:t>
+            </a:r>
+            <a:endParaRPr lang="en-US" dirty="0"/>
+          </a:p>
+          <a:p>
+            <a:r>
+              <a:rPr lang="en-US" dirty="0">
+                <a:hlinkClick r:id="rId3"/>
+              </a:rPr>
+              <a:t>Hyperlink Visited</a:t>
+            </a:r>
+            <a:endParaRPr lang="en-US" dirty="0"/>
+          </a:p>
+        </p:txBody>
+      </p:sp>
+    </p:spTree>
+    <p:extLst>
+      <p:ext uri="{BB962C8B-B14F-4D97-AF65-F5344CB8AC3E}">
+        <p14:creationId xmlns:p14="http://schemas.microsoft.com/office/powerpoint/2010/main" val="4248543390"/>
       </p:ext>
     </p:extLst>
   </p:cSld>
@@ -7660,4 +11099,225 @@
     </a:ext>
   </a:extLst>
 </a:theme>
+</file>
+
+<file path=ppt/theme/theme3.xml><?xml version="1.0" encoding="utf-8"?>
+<a:theme xmlns:a="http://schemas.openxmlformats.org/drawingml/2006/main" name="Custom Theme Deck">
+  <a:themeElements>
+    <a:clrScheme name="Custom Colours">
+      <a:dk1>
+        <a:sysClr val="windowText" lastClr="000000"/>
+      </a:dk1>
+      <a:lt1>
+        <a:sysClr val="window" lastClr="FFFFFF"/>
+      </a:lt1>
+      <a:dk2>
+        <a:srgbClr val="323232"/>
+      </a:dk2>
+      <a:lt2>
+        <a:srgbClr val="E3DED1"/>
+      </a:lt2>
+      <a:accent1>
+        <a:srgbClr val="DE991C"/>
+      </a:accent1>
+      <a:accent2>
+        <a:srgbClr val="B4226B"/>
+      </a:accent2>
+      <a:accent3>
+        <a:srgbClr val="166D82"/>
+      </a:accent3>
+      <a:accent4>
+        <a:srgbClr val="5B9137"/>
+      </a:accent4>
+      <a:accent5>
+        <a:srgbClr val="5C3F97"/>
+      </a:accent5>
+      <a:accent6>
+        <a:srgbClr val="CD7B4D"/>
+      </a:accent6>
+      <a:hlink>
+        <a:srgbClr val="35A123"/>
+      </a:hlink>
+      <a:folHlink>
+        <a:srgbClr val="AD4E07"/>
+      </a:folHlink>
+    </a:clrScheme>
+    <a:fontScheme name="Custom Fonts">
+      <a:majorFont>
+        <a:latin typeface="Space Grotesk"/>
+        <a:ea typeface=""/>
+        <a:cs typeface=""/>
+      </a:majorFont>
+      <a:minorFont>
+        <a:latin typeface="Inter"/>
+        <a:ea typeface=""/>
+        <a:cs typeface=""/>
+      </a:minorFont>
+    </a:fontScheme>
+    <a:fmtScheme name="Office">
+      <a:fillStyleLst>
+        <a:solidFill>
+          <a:schemeClr val="phClr"/>
+        </a:solidFill>
+        <a:gradFill rotWithShape="1">
+          <a:gsLst>
+            <a:gs pos="0">
+              <a:schemeClr val="phClr">
+                <a:lumMod val="110000"/>
+                <a:satMod val="105000"/>
+                <a:tint val="67000"/>
+              </a:schemeClr>
+            </a:gs>
+            <a:gs pos="50000">
+              <a:schemeClr val="phClr">
+                <a:lumMod val="105000"/>
+                <a:satMod val="103000"/>
+                <a:tint val="73000"/>
+              </a:schemeClr>
+            </a:gs>
+            <a:gs pos="100000">
+              <a:schemeClr val="phClr">
+                <a:lumMod val="105000"/>
+                <a:satMod val="109000"/>
+                <a:tint val="81000"/>
+              </a:schemeClr>
+            </a:gs>
+          </a:gsLst>
+          <a:lin ang="5400000" scaled="0"/>
+        </a:gradFill>
+        <a:gradFill rotWithShape="1">
+          <a:gsLst>
+            <a:gs pos="0">
+              <a:schemeClr val="phClr">
+                <a:satMod val="103000"/>
+                <a:lumMod val="102000"/>
+                <a:tint val="94000"/>
+              </a:schemeClr>
+            </a:gs>
+            <a:gs pos="50000">
+              <a:schemeClr val="phClr">
+                <a:satMod val="110000"/>
+                <a:lumMod val="100000"/>
+                <a:shade val="100000"/>
+              </a:schemeClr>
+            </a:gs>
+            <a:gs pos="100000">
+              <a:schemeClr val="phClr">
+                <a:lumMod val="99000"/>
+                <a:satMod val="120000"/>
+                <a:shade val="78000"/>
+              </a:schemeClr>
+            </a:gs>
+          </a:gsLst>
+          <a:lin ang="5400000" scaled="0"/>
+        </a:gradFill>
+      </a:fillStyleLst>
+      <a:lnStyleLst>
+        <a:ln w="12700" cap="flat" cmpd="sng" algn="ctr">
+          <a:solidFill>
+            <a:schemeClr val="phClr"/>
+          </a:solidFill>
+          <a:prstDash val="solid"/>
+          <a:miter lim="800000"/>
+        </a:ln>
+        <a:ln w="19050" cap="flat" cmpd="sng" algn="ctr">
+          <a:solidFill>
+            <a:schemeClr val="phClr"/>
+          </a:solidFill>
+          <a:prstDash val="solid"/>
+          <a:miter lim="800000"/>
+        </a:ln>
+        <a:ln w="25400" cap="flat" cmpd="sng" algn="ctr">
+          <a:solidFill>
+            <a:schemeClr val="phClr"/>
+          </a:solidFill>
+          <a:prstDash val="solid"/>
+          <a:miter lim="800000"/>
+        </a:ln>
+      </a:lnStyleLst>
+      <a:effectStyleLst>
+        <a:effectStyle>
+          <a:effectLst/>
+        </a:effectStyle>
+        <a:effectStyle>
+          <a:effectLst/>
+        </a:effectStyle>
+        <a:effectStyle>
+          <a:effectLst>
+            <a:outerShdw blurRad="57150" dist="19050" dir="5400000" algn="ctr" rotWithShape="0">
+              <a:srgbClr val="000000">
+                <a:alpha val="63000"/>
+              </a:srgbClr>
+            </a:outerShdw>
+          </a:effectLst>
+        </a:effectStyle>
+      </a:effectStyleLst>
+      <a:bgFillStyleLst>
+        <a:solidFill>
+          <a:schemeClr val="phClr"/>
+        </a:solidFill>
+        <a:solidFill>
+          <a:schemeClr val="phClr">
+            <a:tint val="95000"/>
+            <a:satMod val="170000"/>
+          </a:schemeClr>
+        </a:solidFill>
+        <a:gradFill rotWithShape="1">
+          <a:gsLst>
+            <a:gs pos="0">
+              <a:schemeClr val="phClr">
+                <a:tint val="93000"/>
+                <a:satMod val="150000"/>
+                <a:shade val="98000"/>
+                <a:lumMod val="102000"/>
+              </a:schemeClr>
+            </a:gs>
+            <a:gs pos="50000">
+              <a:schemeClr val="phClr">
+                <a:tint val="98000"/>
+                <a:satMod val="130000"/>
+                <a:shade val="90000"/>
+                <a:lumMod val="103000"/>
+              </a:schemeClr>
+            </a:gs>
+            <a:gs pos="100000">
+              <a:schemeClr val="phClr">
+                <a:shade val="63000"/>
+                <a:satMod val="120000"/>
+              </a:schemeClr>
+            </a:gs>
+          </a:gsLst>
+          <a:lin ang="5400000" scaled="0"/>
+        </a:gradFill>
+      </a:bgFillStyleLst>
+    </a:fmtScheme>
+  </a:themeElements>
+  <a:objectDefaults>
+    <a:lnDef>
+      <a:spPr/>
+      <a:bodyPr/>
+      <a:lstStyle/>
+      <a:style>
+        <a:lnRef idx="2">
+          <a:schemeClr val="accent1"/>
+        </a:lnRef>
+        <a:fillRef idx="0">
+          <a:schemeClr val="accent1"/>
+        </a:fillRef>
+        <a:effectRef idx="1">
+          <a:schemeClr val="accent1"/>
+        </a:effectRef>
+        <a:fontRef idx="minor">
+          <a:schemeClr val="tx1"/>
+        </a:fontRef>
+      </a:style>
+    </a:lnDef>
+  </a:objectDefaults>
+  <a:extraClrSchemeLst/>
+  <a:extLst>
+    <a:ext uri="{05A4C25C-085E-4340-85A3-A5531E510DB2}">
+      <thm15:themeFamily xmlns:thm15="http://schemas.microsoft.com/office/thememl/2012/main" name="Office Theme" id="{2E142A2C-CD16-42D6-873A-C26D2A0506FA}" vid="{1BDDFF52-6CD6-40A5-AB3C-68EB2F1E4D0A}"/>
+    </a:ext>
+  </a:extLst>
+</a:theme>
 </file>
</xml_diff>

<commit_message>
Added color scheme renaming functionality
</commit_message>
<xml_diff>
--- a/cmd/pptx-toolkit/testdata/test.pptx
+++ b/cmd/pptx-toolkit/testdata/test.pptx
@@ -6,11 +6,16 @@
     <p:sldMasterId id="2147483660" r:id="rId2"/>
     <p:sldMasterId id="2147483672" r:id="rId3"/>
   </p:sldMasterIdLst>
+  <p:notesMasterIdLst>
+    <p:notesMasterId r:id="rId10"/>
+  </p:notesMasterIdLst>
   <p:sldIdLst>
     <p:sldId id="256" r:id="rId4"/>
     <p:sldId id="257" r:id="rId5"/>
-    <p:sldId id="258" r:id="rId6"/>
-    <p:sldId id="259" r:id="rId7"/>
+    <p:sldId id="260" r:id="rId6"/>
+    <p:sldId id="261" r:id="rId7"/>
+    <p:sldId id="258" r:id="rId8"/>
+    <p:sldId id="259" r:id="rId9"/>
   </p:sldIdLst>
   <p:sldSz cx="12192000" cy="6858000"/>
   <p:notesSz cx="6858000" cy="9144000"/>
@@ -117,6 +122,440 @@
 </p:presentation>
 </file>
 
+<file path=ppt/notesMasters/notesMaster1.xml><?xml version="1.0" encoding="utf-8"?>
+<p:notesMaster xmlns:a="http://schemas.openxmlformats.org/drawingml/2006/main" xmlns:r="http://schemas.openxmlformats.org/officeDocument/2006/relationships" xmlns:p="http://schemas.openxmlformats.org/presentationml/2006/main">
+  <p:cSld>
+    <p:bg>
+      <p:bgRef idx="1001">
+        <a:schemeClr val="bg1"/>
+      </p:bgRef>
+    </p:bg>
+    <p:spTree>
+      <p:nvGrpSpPr>
+        <p:cNvPr id="1" name=""/>
+        <p:cNvGrpSpPr/>
+        <p:nvPr/>
+      </p:nvGrpSpPr>
+      <p:grpSpPr>
+        <a:xfrm>
+          <a:off x="0" y="0"/>
+          <a:ext cx="0" cy="0"/>
+          <a:chOff x="0" y="0"/>
+          <a:chExt cx="0" cy="0"/>
+        </a:xfrm>
+      </p:grpSpPr>
+      <p:sp>
+        <p:nvSpPr>
+          <p:cNvPr id="2" name="Header Placeholder 1"/>
+          <p:cNvSpPr>
+            <a:spLocks noGrp="1"/>
+          </p:cNvSpPr>
+          <p:nvPr>
+            <p:ph type="hdr" sz="quarter"/>
+          </p:nvPr>
+        </p:nvSpPr>
+        <p:spPr>
+          <a:xfrm>
+            <a:off x="0" y="0"/>
+            <a:ext cx="2971800" cy="458788"/>
+          </a:xfrm>
+          <a:prstGeom prst="rect">
+            <a:avLst/>
+          </a:prstGeom>
+        </p:spPr>
+        <p:txBody>
+          <a:bodyPr vert="horz" lIns="91440" tIns="45720" rIns="91440" bIns="45720" rtlCol="0"/>
+          <a:lstStyle>
+            <a:lvl1pPr algn="l">
+              <a:defRPr sz="1200"/>
+            </a:lvl1pPr>
+          </a:lstStyle>
+          <a:p>
+            <a:endParaRPr lang="en-US"/>
+          </a:p>
+        </p:txBody>
+      </p:sp>
+      <p:sp>
+        <p:nvSpPr>
+          <p:cNvPr id="3" name="Date Placeholder 2"/>
+          <p:cNvSpPr>
+            <a:spLocks noGrp="1"/>
+          </p:cNvSpPr>
+          <p:nvPr>
+            <p:ph type="dt" idx="1"/>
+          </p:nvPr>
+        </p:nvSpPr>
+        <p:spPr>
+          <a:xfrm>
+            <a:off x="3884613" y="0"/>
+            <a:ext cx="2971800" cy="458788"/>
+          </a:xfrm>
+          <a:prstGeom prst="rect">
+            <a:avLst/>
+          </a:prstGeom>
+        </p:spPr>
+        <p:txBody>
+          <a:bodyPr vert="horz" lIns="91440" tIns="45720" rIns="91440" bIns="45720" rtlCol="0"/>
+          <a:lstStyle>
+            <a:lvl1pPr algn="r">
+              <a:defRPr sz="1200"/>
+            </a:lvl1pPr>
+          </a:lstStyle>
+          <a:p>
+            <a:fld id="{7E20784D-5404-1445-90FD-0AA61620D67E}" type="datetimeFigureOut">
+              <a:rPr lang="en-US" smtClean="0"/>
+              <a:t>10/25/25</a:t>
+            </a:fld>
+            <a:endParaRPr lang="en-US"/>
+          </a:p>
+        </p:txBody>
+      </p:sp>
+      <p:sp>
+        <p:nvSpPr>
+          <p:cNvPr id="4" name="Slide Image Placeholder 3"/>
+          <p:cNvSpPr>
+            <a:spLocks noGrp="1" noRot="1" noChangeAspect="1"/>
+          </p:cNvSpPr>
+          <p:nvPr>
+            <p:ph type="sldImg" idx="2"/>
+          </p:nvPr>
+        </p:nvSpPr>
+        <p:spPr>
+          <a:xfrm>
+            <a:off x="685800" y="1143000"/>
+            <a:ext cx="5486400" cy="3086100"/>
+          </a:xfrm>
+          <a:prstGeom prst="rect">
+            <a:avLst/>
+          </a:prstGeom>
+          <a:noFill/>
+          <a:ln w="12700">
+            <a:solidFill>
+              <a:prstClr val="black"/>
+            </a:solidFill>
+          </a:ln>
+        </p:spPr>
+        <p:txBody>
+          <a:bodyPr vert="horz" lIns="91440" tIns="45720" rIns="91440" bIns="45720" rtlCol="0" anchor="ctr"/>
+          <a:lstStyle/>
+          <a:p>
+            <a:endParaRPr lang="en-US"/>
+          </a:p>
+        </p:txBody>
+      </p:sp>
+      <p:sp>
+        <p:nvSpPr>
+          <p:cNvPr id="5" name="Notes Placeholder 4"/>
+          <p:cNvSpPr>
+            <a:spLocks noGrp="1"/>
+          </p:cNvSpPr>
+          <p:nvPr>
+            <p:ph type="body" sz="quarter" idx="3"/>
+          </p:nvPr>
+        </p:nvSpPr>
+        <p:spPr>
+          <a:xfrm>
+            <a:off x="685800" y="4400550"/>
+            <a:ext cx="5486400" cy="3600450"/>
+          </a:xfrm>
+          <a:prstGeom prst="rect">
+            <a:avLst/>
+          </a:prstGeom>
+        </p:spPr>
+        <p:txBody>
+          <a:bodyPr vert="horz" lIns="91440" tIns="45720" rIns="91440" bIns="45720" rtlCol="0"/>
+          <a:lstStyle/>
+          <a:p>
+            <a:pPr lvl="0"/>
+            <a:r>
+              <a:rPr lang="en-GB"/>
+              <a:t>Click to edit Master text styles</a:t>
+            </a:r>
+          </a:p>
+          <a:p>
+            <a:pPr lvl="1"/>
+            <a:r>
+              <a:rPr lang="en-GB"/>
+              <a:t>Second level</a:t>
+            </a:r>
+          </a:p>
+          <a:p>
+            <a:pPr lvl="2"/>
+            <a:r>
+              <a:rPr lang="en-GB"/>
+              <a:t>Third level</a:t>
+            </a:r>
+          </a:p>
+          <a:p>
+            <a:pPr lvl="3"/>
+            <a:r>
+              <a:rPr lang="en-GB"/>
+              <a:t>Fourth level</a:t>
+            </a:r>
+          </a:p>
+          <a:p>
+            <a:pPr lvl="4"/>
+            <a:r>
+              <a:rPr lang="en-GB"/>
+              <a:t>Fifth level</a:t>
+            </a:r>
+            <a:endParaRPr lang="en-US"/>
+          </a:p>
+        </p:txBody>
+      </p:sp>
+      <p:sp>
+        <p:nvSpPr>
+          <p:cNvPr id="6" name="Footer Placeholder 5"/>
+          <p:cNvSpPr>
+            <a:spLocks noGrp="1"/>
+          </p:cNvSpPr>
+          <p:nvPr>
+            <p:ph type="ftr" sz="quarter" idx="4"/>
+          </p:nvPr>
+        </p:nvSpPr>
+        <p:spPr>
+          <a:xfrm>
+            <a:off x="0" y="8685213"/>
+            <a:ext cx="2971800" cy="458787"/>
+          </a:xfrm>
+          <a:prstGeom prst="rect">
+            <a:avLst/>
+          </a:prstGeom>
+        </p:spPr>
+        <p:txBody>
+          <a:bodyPr vert="horz" lIns="91440" tIns="45720" rIns="91440" bIns="45720" rtlCol="0" anchor="b"/>
+          <a:lstStyle>
+            <a:lvl1pPr algn="l">
+              <a:defRPr sz="1200"/>
+            </a:lvl1pPr>
+          </a:lstStyle>
+          <a:p>
+            <a:endParaRPr lang="en-US"/>
+          </a:p>
+        </p:txBody>
+      </p:sp>
+      <p:sp>
+        <p:nvSpPr>
+          <p:cNvPr id="7" name="Slide Number Placeholder 6"/>
+          <p:cNvSpPr>
+            <a:spLocks noGrp="1"/>
+          </p:cNvSpPr>
+          <p:nvPr>
+            <p:ph type="sldNum" sz="quarter" idx="5"/>
+          </p:nvPr>
+        </p:nvSpPr>
+        <p:spPr>
+          <a:xfrm>
+            <a:off x="3884613" y="8685213"/>
+            <a:ext cx="2971800" cy="458787"/>
+          </a:xfrm>
+          <a:prstGeom prst="rect">
+            <a:avLst/>
+          </a:prstGeom>
+        </p:spPr>
+        <p:txBody>
+          <a:bodyPr vert="horz" lIns="91440" tIns="45720" rIns="91440" bIns="45720" rtlCol="0" anchor="b"/>
+          <a:lstStyle>
+            <a:lvl1pPr algn="r">
+              <a:defRPr sz="1200"/>
+            </a:lvl1pPr>
+          </a:lstStyle>
+          <a:p>
+            <a:fld id="{86D25E89-9076-8E49-BD6D-98E82260F9B8}" type="slidenum">
+              <a:rPr lang="en-US" smtClean="0"/>
+              <a:t>‹#›</a:t>
+            </a:fld>
+            <a:endParaRPr lang="en-US"/>
+          </a:p>
+        </p:txBody>
+      </p:sp>
+    </p:spTree>
+    <p:extLst>
+      <p:ext uri="{BB962C8B-B14F-4D97-AF65-F5344CB8AC3E}">
+        <p14:creationId xmlns:p14="http://schemas.microsoft.com/office/powerpoint/2010/main" val="2559368036"/>
+      </p:ext>
+    </p:extLst>
+  </p:cSld>
+  <p:clrMap bg1="lt1" tx1="dk1" bg2="lt2" tx2="dk2" accent1="accent1" accent2="accent2" accent3="accent3" accent4="accent4" accent5="accent5" accent6="accent6" hlink="hlink" folHlink="folHlink"/>
+  <p:notesStyle>
+    <a:lvl1pPr marL="0" algn="l" defTabSz="914400" rtl="0" eaLnBrk="1" latinLnBrk="0" hangingPunct="1">
+      <a:defRPr sz="1200" kern="1200">
+        <a:solidFill>
+          <a:schemeClr val="tx1"/>
+        </a:solidFill>
+        <a:latin typeface="+mn-lt"/>
+        <a:ea typeface="+mn-ea"/>
+        <a:cs typeface="+mn-cs"/>
+      </a:defRPr>
+    </a:lvl1pPr>
+    <a:lvl2pPr marL="457200" algn="l" defTabSz="914400" rtl="0" eaLnBrk="1" latinLnBrk="0" hangingPunct="1">
+      <a:defRPr sz="1200" kern="1200">
+        <a:solidFill>
+          <a:schemeClr val="tx1"/>
+        </a:solidFill>
+        <a:latin typeface="+mn-lt"/>
+        <a:ea typeface="+mn-ea"/>
+        <a:cs typeface="+mn-cs"/>
+      </a:defRPr>
+    </a:lvl2pPr>
+    <a:lvl3pPr marL="914400" algn="l" defTabSz="914400" rtl="0" eaLnBrk="1" latinLnBrk="0" hangingPunct="1">
+      <a:defRPr sz="1200" kern="1200">
+        <a:solidFill>
+          <a:schemeClr val="tx1"/>
+        </a:solidFill>
+        <a:latin typeface="+mn-lt"/>
+        <a:ea typeface="+mn-ea"/>
+        <a:cs typeface="+mn-cs"/>
+      </a:defRPr>
+    </a:lvl3pPr>
+    <a:lvl4pPr marL="1371600" algn="l" defTabSz="914400" rtl="0" eaLnBrk="1" latinLnBrk="0" hangingPunct="1">
+      <a:defRPr sz="1200" kern="1200">
+        <a:solidFill>
+          <a:schemeClr val="tx1"/>
+        </a:solidFill>
+        <a:latin typeface="+mn-lt"/>
+        <a:ea typeface="+mn-ea"/>
+        <a:cs typeface="+mn-cs"/>
+      </a:defRPr>
+    </a:lvl4pPr>
+    <a:lvl5pPr marL="1828800" algn="l" defTabSz="914400" rtl="0" eaLnBrk="1" latinLnBrk="0" hangingPunct="1">
+      <a:defRPr sz="1200" kern="1200">
+        <a:solidFill>
+          <a:schemeClr val="tx1"/>
+        </a:solidFill>
+        <a:latin typeface="+mn-lt"/>
+        <a:ea typeface="+mn-ea"/>
+        <a:cs typeface="+mn-cs"/>
+      </a:defRPr>
+    </a:lvl5pPr>
+    <a:lvl6pPr marL="2286000" algn="l" defTabSz="914400" rtl="0" eaLnBrk="1" latinLnBrk="0" hangingPunct="1">
+      <a:defRPr sz="1200" kern="1200">
+        <a:solidFill>
+          <a:schemeClr val="tx1"/>
+        </a:solidFill>
+        <a:latin typeface="+mn-lt"/>
+        <a:ea typeface="+mn-ea"/>
+        <a:cs typeface="+mn-cs"/>
+      </a:defRPr>
+    </a:lvl6pPr>
+    <a:lvl7pPr marL="2743200" algn="l" defTabSz="914400" rtl="0" eaLnBrk="1" latinLnBrk="0" hangingPunct="1">
+      <a:defRPr sz="1200" kern="1200">
+        <a:solidFill>
+          <a:schemeClr val="tx1"/>
+        </a:solidFill>
+        <a:latin typeface="+mn-lt"/>
+        <a:ea typeface="+mn-ea"/>
+        <a:cs typeface="+mn-cs"/>
+      </a:defRPr>
+    </a:lvl7pPr>
+    <a:lvl8pPr marL="3200400" algn="l" defTabSz="914400" rtl="0" eaLnBrk="1" latinLnBrk="0" hangingPunct="1">
+      <a:defRPr sz="1200" kern="1200">
+        <a:solidFill>
+          <a:schemeClr val="tx1"/>
+        </a:solidFill>
+        <a:latin typeface="+mn-lt"/>
+        <a:ea typeface="+mn-ea"/>
+        <a:cs typeface="+mn-cs"/>
+      </a:defRPr>
+    </a:lvl8pPr>
+    <a:lvl9pPr marL="3657600" algn="l" defTabSz="914400" rtl="0" eaLnBrk="1" latinLnBrk="0" hangingPunct="1">
+      <a:defRPr sz="1200" kern="1200">
+        <a:solidFill>
+          <a:schemeClr val="tx1"/>
+        </a:solidFill>
+        <a:latin typeface="+mn-lt"/>
+        <a:ea typeface="+mn-ea"/>
+        <a:cs typeface="+mn-cs"/>
+      </a:defRPr>
+    </a:lvl9pPr>
+  </p:notesStyle>
+</p:notesMaster>
+</file>
+
+<file path=ppt/notesSlides/notesSlide1.xml><?xml version="1.0" encoding="utf-8"?>
+<p:notes xmlns:a="http://schemas.openxmlformats.org/drawingml/2006/main" xmlns:r="http://schemas.openxmlformats.org/officeDocument/2006/relationships" xmlns:p="http://schemas.openxmlformats.org/presentationml/2006/main">
+  <p:cSld>
+    <p:spTree>
+      <p:nvGrpSpPr>
+        <p:cNvPr id="1" name=""/>
+        <p:cNvGrpSpPr/>
+        <p:nvPr/>
+      </p:nvGrpSpPr>
+      <p:grpSpPr>
+        <a:xfrm>
+          <a:off x="0" y="0"/>
+          <a:ext cx="0" cy="0"/>
+          <a:chOff x="0" y="0"/>
+          <a:chExt cx="0" cy="0"/>
+        </a:xfrm>
+      </p:grpSpPr>
+      <p:sp>
+        <p:nvSpPr>
+          <p:cNvPr id="2" name="Slide Image Placeholder 1"/>
+          <p:cNvSpPr>
+            <a:spLocks noGrp="1" noRot="1" noChangeAspect="1"/>
+          </p:cNvSpPr>
+          <p:nvPr>
+            <p:ph type="sldImg"/>
+          </p:nvPr>
+        </p:nvSpPr>
+        <p:spPr/>
+      </p:sp>
+      <p:sp>
+        <p:nvSpPr>
+          <p:cNvPr id="3" name="Notes Placeholder 2"/>
+          <p:cNvSpPr>
+            <a:spLocks noGrp="1"/>
+          </p:cNvSpPr>
+          <p:nvPr>
+            <p:ph type="body" idx="1"/>
+          </p:nvPr>
+        </p:nvSpPr>
+        <p:spPr/>
+        <p:txBody>
+          <a:bodyPr/>
+          <a:lstStyle/>
+          <a:p>
+            <a:endParaRPr lang="en-US" dirty="0"/>
+          </a:p>
+        </p:txBody>
+      </p:sp>
+      <p:sp>
+        <p:nvSpPr>
+          <p:cNvPr id="4" name="Slide Number Placeholder 3"/>
+          <p:cNvSpPr>
+            <a:spLocks noGrp="1"/>
+          </p:cNvSpPr>
+          <p:nvPr>
+            <p:ph type="sldNum" sz="quarter" idx="5"/>
+          </p:nvPr>
+        </p:nvSpPr>
+        <p:spPr/>
+        <p:txBody>
+          <a:bodyPr/>
+          <a:lstStyle/>
+          <a:p>
+            <a:fld id="{86D25E89-9076-8E49-BD6D-98E82260F9B8}" type="slidenum">
+              <a:rPr lang="en-US" smtClean="0"/>
+              <a:t>2</a:t>
+            </a:fld>
+            <a:endParaRPr lang="en-US"/>
+          </a:p>
+        </p:txBody>
+      </p:sp>
+    </p:spTree>
+    <p:extLst>
+      <p:ext uri="{BB962C8B-B14F-4D97-AF65-F5344CB8AC3E}">
+        <p14:creationId xmlns:p14="http://schemas.microsoft.com/office/powerpoint/2010/main" val="1061148823"/>
+      </p:ext>
+    </p:extLst>
+  </p:cSld>
+  <p:clrMapOvr>
+    <a:masterClrMapping/>
+  </p:clrMapOvr>
+</p:notes>
+</file>
+
 <file path=ppt/slideLayouts/slideLayout1.xml><?xml version="1.0" encoding="utf-8"?>
 <p:sldLayout xmlns:a="http://schemas.openxmlformats.org/drawingml/2006/main" xmlns:r="http://schemas.openxmlformats.org/officeDocument/2006/relationships" xmlns:p="http://schemas.openxmlformats.org/presentationml/2006/main" type="title" preserve="1">
   <p:cSld name="Title Slide">
@@ -270,7 +709,7 @@
           <a:p>
             <a:fld id="{99FB2E88-1E27-2243-AE12-8E9276940C7E}" type="datetimeFigureOut">
               <a:rPr lang="en-US" smtClean="0"/>
-              <a:t>10/23/2025</a:t>
+              <a:t>10/25/25</a:t>
             </a:fld>
             <a:endParaRPr lang="en-US"/>
           </a:p>
@@ -470,7 +909,7 @@
           <a:p>
             <a:fld id="{99FB2E88-1E27-2243-AE12-8E9276940C7E}" type="datetimeFigureOut">
               <a:rPr lang="en-US" smtClean="0"/>
-              <a:t>10/23/2025</a:t>
+              <a:t>10/25/25</a:t>
             </a:fld>
             <a:endParaRPr lang="en-US"/>
           </a:p>
@@ -680,7 +1119,7 @@
           <a:p>
             <a:fld id="{99FB2E88-1E27-2243-AE12-8E9276940C7E}" type="datetimeFigureOut">
               <a:rPr lang="en-US" smtClean="0"/>
-              <a:t>10/23/2025</a:t>
+              <a:t>10/25/25</a:t>
             </a:fld>
             <a:endParaRPr lang="en-US"/>
           </a:p>
@@ -906,7 +1345,7 @@
           <a:p>
             <a:fld id="{99FB2E88-1E27-2243-AE12-8E9276940C7E}" type="datetimeFigureOut">
               <a:rPr lang="en-US" smtClean="0"/>
-              <a:t>10/23/2025</a:t>
+              <a:t>10/25/25</a:t>
             </a:fld>
             <a:endParaRPr lang="en-US"/>
           </a:p>
@@ -1106,7 +1545,7 @@
           <a:p>
             <a:fld id="{99FB2E88-1E27-2243-AE12-8E9276940C7E}" type="datetimeFigureOut">
               <a:rPr lang="en-US" smtClean="0"/>
-              <a:t>10/23/2025</a:t>
+              <a:t>10/25/25</a:t>
             </a:fld>
             <a:endParaRPr lang="en-US"/>
           </a:p>
@@ -1382,7 +1821,7 @@
           <a:p>
             <a:fld id="{99FB2E88-1E27-2243-AE12-8E9276940C7E}" type="datetimeFigureOut">
               <a:rPr lang="en-US" smtClean="0"/>
-              <a:t>10/23/2025</a:t>
+              <a:t>10/25/25</a:t>
             </a:fld>
             <a:endParaRPr lang="en-US"/>
           </a:p>
@@ -1650,7 +2089,7 @@
           <a:p>
             <a:fld id="{99FB2E88-1E27-2243-AE12-8E9276940C7E}" type="datetimeFigureOut">
               <a:rPr lang="en-US" smtClean="0"/>
-              <a:t>10/23/2025</a:t>
+              <a:t>10/25/25</a:t>
             </a:fld>
             <a:endParaRPr lang="en-US"/>
           </a:p>
@@ -2065,7 +2504,7 @@
           <a:p>
             <a:fld id="{99FB2E88-1E27-2243-AE12-8E9276940C7E}" type="datetimeFigureOut">
               <a:rPr lang="en-US" smtClean="0"/>
-              <a:t>10/23/2025</a:t>
+              <a:t>10/25/25</a:t>
             </a:fld>
             <a:endParaRPr lang="en-US"/>
           </a:p>
@@ -2207,7 +2646,7 @@
           <a:p>
             <a:fld id="{99FB2E88-1E27-2243-AE12-8E9276940C7E}" type="datetimeFigureOut">
               <a:rPr lang="en-US" smtClean="0"/>
-              <a:t>10/23/2025</a:t>
+              <a:t>10/25/25</a:t>
             </a:fld>
             <a:endParaRPr lang="en-US"/>
           </a:p>
@@ -2320,7 +2759,7 @@
           <a:p>
             <a:fld id="{99FB2E88-1E27-2243-AE12-8E9276940C7E}" type="datetimeFigureOut">
               <a:rPr lang="en-US" smtClean="0"/>
-              <a:t>10/23/2025</a:t>
+              <a:t>10/25/25</a:t>
             </a:fld>
             <a:endParaRPr lang="en-US"/>
           </a:p>
@@ -2633,7 +3072,7 @@
           <a:p>
             <a:fld id="{99FB2E88-1E27-2243-AE12-8E9276940C7E}" type="datetimeFigureOut">
               <a:rPr lang="en-US" smtClean="0"/>
-              <a:t>10/23/2025</a:t>
+              <a:t>10/25/25</a:t>
             </a:fld>
             <a:endParaRPr lang="en-US"/>
           </a:p>
@@ -2833,7 +3272,7 @@
           <a:p>
             <a:fld id="{99FB2E88-1E27-2243-AE12-8E9276940C7E}" type="datetimeFigureOut">
               <a:rPr lang="en-US" smtClean="0"/>
-              <a:t>10/23/2025</a:t>
+              <a:t>10/25/25</a:t>
             </a:fld>
             <a:endParaRPr lang="en-US"/>
           </a:p>
@@ -3122,7 +3561,7 @@
           <a:p>
             <a:fld id="{99FB2E88-1E27-2243-AE12-8E9276940C7E}" type="datetimeFigureOut">
               <a:rPr lang="en-US" smtClean="0"/>
-              <a:t>10/23/2025</a:t>
+              <a:t>10/25/25</a:t>
             </a:fld>
             <a:endParaRPr lang="en-US"/>
           </a:p>
@@ -3322,7 +3761,7 @@
           <a:p>
             <a:fld id="{99FB2E88-1E27-2243-AE12-8E9276940C7E}" type="datetimeFigureOut">
               <a:rPr lang="en-US" smtClean="0"/>
-              <a:t>10/23/2025</a:t>
+              <a:t>10/25/25</a:t>
             </a:fld>
             <a:endParaRPr lang="en-US"/>
           </a:p>
@@ -3532,7 +3971,7 @@
           <a:p>
             <a:fld id="{99FB2E88-1E27-2243-AE12-8E9276940C7E}" type="datetimeFigureOut">
               <a:rPr lang="en-US" smtClean="0"/>
-              <a:t>10/23/2025</a:t>
+              <a:t>10/25/25</a:t>
             </a:fld>
             <a:endParaRPr lang="en-US"/>
           </a:p>
@@ -3758,7 +4197,7 @@
           <a:p>
             <a:fld id="{99FB2E88-1E27-2243-AE12-8E9276940C7E}" type="datetimeFigureOut">
               <a:rPr lang="en-US" smtClean="0"/>
-              <a:t>10/23/2025</a:t>
+              <a:t>10/25/25</a:t>
             </a:fld>
             <a:endParaRPr lang="en-US"/>
           </a:p>
@@ -3958,7 +4397,7 @@
           <a:p>
             <a:fld id="{99FB2E88-1E27-2243-AE12-8E9276940C7E}" type="datetimeFigureOut">
               <a:rPr lang="en-US" smtClean="0"/>
-              <a:t>10/23/2025</a:t>
+              <a:t>10/25/25</a:t>
             </a:fld>
             <a:endParaRPr lang="en-US"/>
           </a:p>
@@ -4234,7 +4673,7 @@
           <a:p>
             <a:fld id="{99FB2E88-1E27-2243-AE12-8E9276940C7E}" type="datetimeFigureOut">
               <a:rPr lang="en-US" smtClean="0"/>
-              <a:t>10/23/2025</a:t>
+              <a:t>10/25/25</a:t>
             </a:fld>
             <a:endParaRPr lang="en-US"/>
           </a:p>
@@ -4502,7 +4941,7 @@
           <a:p>
             <a:fld id="{99FB2E88-1E27-2243-AE12-8E9276940C7E}" type="datetimeFigureOut">
               <a:rPr lang="en-US" smtClean="0"/>
-              <a:t>10/23/2025</a:t>
+              <a:t>10/25/25</a:t>
             </a:fld>
             <a:endParaRPr lang="en-US"/>
           </a:p>
@@ -4917,7 +5356,7 @@
           <a:p>
             <a:fld id="{99FB2E88-1E27-2243-AE12-8E9276940C7E}" type="datetimeFigureOut">
               <a:rPr lang="en-US" smtClean="0"/>
-              <a:t>10/23/2025</a:t>
+              <a:t>10/25/25</a:t>
             </a:fld>
             <a:endParaRPr lang="en-US"/>
           </a:p>
@@ -5059,7 +5498,7 @@
           <a:p>
             <a:fld id="{99FB2E88-1E27-2243-AE12-8E9276940C7E}" type="datetimeFigureOut">
               <a:rPr lang="en-US" smtClean="0"/>
-              <a:t>10/23/2025</a:t>
+              <a:t>10/25/25</a:t>
             </a:fld>
             <a:endParaRPr lang="en-US"/>
           </a:p>
@@ -5172,7 +5611,7 @@
           <a:p>
             <a:fld id="{99FB2E88-1E27-2243-AE12-8E9276940C7E}" type="datetimeFigureOut">
               <a:rPr lang="en-US" smtClean="0"/>
-              <a:t>10/23/2025</a:t>
+              <a:t>10/25/25</a:t>
             </a:fld>
             <a:endParaRPr lang="en-US"/>
           </a:p>
@@ -5448,7 +5887,7 @@
           <a:p>
             <a:fld id="{99FB2E88-1E27-2243-AE12-8E9276940C7E}" type="datetimeFigureOut">
               <a:rPr lang="en-US" smtClean="0"/>
-              <a:t>10/23/2025</a:t>
+              <a:t>10/25/25</a:t>
             </a:fld>
             <a:endParaRPr lang="en-US"/>
           </a:p>
@@ -5761,7 +6200,7 @@
           <a:p>
             <a:fld id="{99FB2E88-1E27-2243-AE12-8E9276940C7E}" type="datetimeFigureOut">
               <a:rPr lang="en-US" smtClean="0"/>
-              <a:t>10/23/2025</a:t>
+              <a:t>10/25/25</a:t>
             </a:fld>
             <a:endParaRPr lang="en-US"/>
           </a:p>
@@ -6050,7 +6489,7 @@
           <a:p>
             <a:fld id="{99FB2E88-1E27-2243-AE12-8E9276940C7E}" type="datetimeFigureOut">
               <a:rPr lang="en-US" smtClean="0"/>
-              <a:t>10/23/2025</a:t>
+              <a:t>10/25/25</a:t>
             </a:fld>
             <a:endParaRPr lang="en-US"/>
           </a:p>
@@ -6250,7 +6689,7 @@
           <a:p>
             <a:fld id="{99FB2E88-1E27-2243-AE12-8E9276940C7E}" type="datetimeFigureOut">
               <a:rPr lang="en-US" smtClean="0"/>
-              <a:t>10/23/2025</a:t>
+              <a:t>10/25/25</a:t>
             </a:fld>
             <a:endParaRPr lang="en-US"/>
           </a:p>
@@ -6460,7 +6899,7 @@
           <a:p>
             <a:fld id="{99FB2E88-1E27-2243-AE12-8E9276940C7E}" type="datetimeFigureOut">
               <a:rPr lang="en-US" smtClean="0"/>
-              <a:t>10/23/2025</a:t>
+              <a:t>10/25/25</a:t>
             </a:fld>
             <a:endParaRPr lang="en-US"/>
           </a:p>
@@ -6728,7 +7167,7 @@
           <a:p>
             <a:fld id="{99FB2E88-1E27-2243-AE12-8E9276940C7E}" type="datetimeFigureOut">
               <a:rPr lang="en-US" smtClean="0"/>
-              <a:t>10/23/2025</a:t>
+              <a:t>10/25/25</a:t>
             </a:fld>
             <a:endParaRPr lang="en-US"/>
           </a:p>
@@ -7143,7 +7582,7 @@
           <a:p>
             <a:fld id="{99FB2E88-1E27-2243-AE12-8E9276940C7E}" type="datetimeFigureOut">
               <a:rPr lang="en-US" smtClean="0"/>
-              <a:t>10/23/2025</a:t>
+              <a:t>10/25/25</a:t>
             </a:fld>
             <a:endParaRPr lang="en-US"/>
           </a:p>
@@ -7285,7 +7724,7 @@
           <a:p>
             <a:fld id="{99FB2E88-1E27-2243-AE12-8E9276940C7E}" type="datetimeFigureOut">
               <a:rPr lang="en-US" smtClean="0"/>
-              <a:t>10/23/2025</a:t>
+              <a:t>10/25/25</a:t>
             </a:fld>
             <a:endParaRPr lang="en-US"/>
           </a:p>
@@ -7398,7 +7837,7 @@
           <a:p>
             <a:fld id="{99FB2E88-1E27-2243-AE12-8E9276940C7E}" type="datetimeFigureOut">
               <a:rPr lang="en-US" smtClean="0"/>
-              <a:t>10/23/2025</a:t>
+              <a:t>10/25/25</a:t>
             </a:fld>
             <a:endParaRPr lang="en-US"/>
           </a:p>
@@ -7711,7 +8150,7 @@
           <a:p>
             <a:fld id="{99FB2E88-1E27-2243-AE12-8E9276940C7E}" type="datetimeFigureOut">
               <a:rPr lang="en-US" smtClean="0"/>
-              <a:t>10/23/2025</a:t>
+              <a:t>10/25/25</a:t>
             </a:fld>
             <a:endParaRPr lang="en-US"/>
           </a:p>
@@ -8000,7 +8439,7 @@
           <a:p>
             <a:fld id="{99FB2E88-1E27-2243-AE12-8E9276940C7E}" type="datetimeFigureOut">
               <a:rPr lang="en-US" smtClean="0"/>
-              <a:t>10/23/2025</a:t>
+              <a:t>10/25/25</a:t>
             </a:fld>
             <a:endParaRPr lang="en-US"/>
           </a:p>
@@ -8243,7 +8682,7 @@
           <a:p>
             <a:fld id="{99FB2E88-1E27-2243-AE12-8E9276940C7E}" type="datetimeFigureOut">
               <a:rPr lang="en-US" smtClean="0"/>
-              <a:t>10/23/2025</a:t>
+              <a:t>10/25/25</a:t>
             </a:fld>
             <a:endParaRPr lang="en-US"/>
           </a:p>
@@ -8813,7 +9252,7 @@
           <a:p>
             <a:fld id="{99FB2E88-1E27-2243-AE12-8E9276940C7E}" type="datetimeFigureOut">
               <a:rPr lang="en-US" smtClean="0"/>
-              <a:t>10/23/2025</a:t>
+              <a:t>10/25/25</a:t>
             </a:fld>
             <a:endParaRPr lang="en-US"/>
           </a:p>
@@ -9383,7 +9822,7 @@
           <a:p>
             <a:fld id="{99FB2E88-1E27-2243-AE12-8E9276940C7E}" type="datetimeFigureOut">
               <a:rPr lang="en-US" smtClean="0"/>
-              <a:t>10/23/2025</a:t>
+              <a:t>10/25/25</a:t>
             </a:fld>
             <a:endParaRPr lang="en-US"/>
           </a:p>
@@ -10043,7 +10482,7 @@
           <a:p>
             <a:r>
               <a:rPr lang="en-US" dirty="0">
-                <a:hlinkClick r:id="rId2"/>
+                <a:hlinkClick r:id="rId3"/>
               </a:rPr>
               <a:t>Hyperlink</a:t>
             </a:r>
@@ -10052,7 +10491,7 @@
           <a:p>
             <a:r>
               <a:rPr lang="en-US" dirty="0">
-                <a:hlinkClick r:id="rId3"/>
+                <a:hlinkClick r:id="rId4"/>
               </a:rPr>
               <a:t>Hyperlink Visited</a:t>
             </a:r>
@@ -10092,6 +10531,244 @@
       </p:grpSpPr>
       <p:sp>
         <p:nvSpPr>
+          <p:cNvPr id="2" name="Title 1">
+            <a:extLst>
+              <a:ext uri="{FF2B5EF4-FFF2-40B4-BE49-F238E27FC236}">
+                <a16:creationId xmlns:a16="http://schemas.microsoft.com/office/drawing/2014/main" id="{D8AFF263-E707-789A-2696-41FBD152D4EB}"/>
+              </a:ext>
+            </a:extLst>
+          </p:cNvPr>
+          <p:cNvSpPr>
+            <a:spLocks noGrp="1"/>
+          </p:cNvSpPr>
+          <p:nvPr>
+            <p:ph type="title"/>
+          </p:nvPr>
+        </p:nvSpPr>
+        <p:spPr/>
+        <p:txBody>
+          <a:bodyPr/>
+          <a:lstStyle/>
+          <a:p>
+            <a:r>
+              <a:rPr lang="en-US" dirty="0">
+                <a:solidFill>
+                  <a:schemeClr val="accent5"/>
+                </a:solidFill>
+              </a:rPr>
+              <a:t>Theme Override: Other theme vales</a:t>
+            </a:r>
+          </a:p>
+        </p:txBody>
+      </p:sp>
+      <p:sp>
+        <p:nvSpPr>
+          <p:cNvPr id="3" name="Content Placeholder 2">
+            <a:extLst>
+              <a:ext uri="{FF2B5EF4-FFF2-40B4-BE49-F238E27FC236}">
+                <a16:creationId xmlns:a16="http://schemas.microsoft.com/office/drawing/2014/main" id="{9C80CBD2-3AFA-315E-1533-BE3ED9433B2E}"/>
+              </a:ext>
+            </a:extLst>
+          </p:cNvPr>
+          <p:cNvSpPr>
+            <a:spLocks noGrp="1"/>
+          </p:cNvSpPr>
+          <p:nvPr>
+            <p:ph idx="1"/>
+          </p:nvPr>
+        </p:nvSpPr>
+        <p:spPr/>
+        <p:txBody>
+          <a:bodyPr/>
+          <a:lstStyle/>
+          <a:p>
+            <a:r>
+              <a:rPr lang="en-US" dirty="0"/>
+              <a:t>The title of this slide overrides the layout’s theme definition</a:t>
+            </a:r>
+          </a:p>
+          <a:p>
+            <a:r>
+              <a:rPr lang="en-US" dirty="0"/>
+              <a:t>Instead of using the theme’s </a:t>
+            </a:r>
+            <a:r>
+              <a:rPr lang="en-US" dirty="0">
+                <a:solidFill>
+                  <a:schemeClr val="accent2"/>
+                </a:solidFill>
+              </a:rPr>
+              <a:t>accent2</a:t>
+            </a:r>
+            <a:r>
+              <a:rPr lang="en-US" dirty="0"/>
+              <a:t>, it uses </a:t>
+            </a:r>
+            <a:r>
+              <a:rPr lang="en-US" dirty="0">
+                <a:solidFill>
+                  <a:schemeClr val="accent5"/>
+                </a:solidFill>
+              </a:rPr>
+              <a:t>accent5</a:t>
+            </a:r>
+          </a:p>
+        </p:txBody>
+      </p:sp>
+    </p:spTree>
+    <p:extLst>
+      <p:ext uri="{BB962C8B-B14F-4D97-AF65-F5344CB8AC3E}">
+        <p14:creationId xmlns:p14="http://schemas.microsoft.com/office/powerpoint/2010/main" val="3125404764"/>
+      </p:ext>
+    </p:extLst>
+  </p:cSld>
+  <p:clrMapOvr>
+    <a:masterClrMapping/>
+  </p:clrMapOvr>
+</p:sld>
+</file>
+
+<file path=ppt/slides/slide4.xml><?xml version="1.0" encoding="utf-8"?>
+<p:sld xmlns:a="http://schemas.openxmlformats.org/drawingml/2006/main" xmlns:r="http://schemas.openxmlformats.org/officeDocument/2006/relationships" xmlns:p="http://schemas.openxmlformats.org/presentationml/2006/main">
+  <p:cSld>
+    <p:spTree>
+      <p:nvGrpSpPr>
+        <p:cNvPr id="1" name="">
+          <a:extLst>
+            <a:ext uri="{FF2B5EF4-FFF2-40B4-BE49-F238E27FC236}">
+              <a16:creationId xmlns:a16="http://schemas.microsoft.com/office/drawing/2014/main" id="{EBCFE961-8115-FDA1-6C73-D3571E0C5C41}"/>
+            </a:ext>
+          </a:extLst>
+        </p:cNvPr>
+        <p:cNvGrpSpPr/>
+        <p:nvPr/>
+      </p:nvGrpSpPr>
+      <p:grpSpPr>
+        <a:xfrm>
+          <a:off x="0" y="0"/>
+          <a:ext cx="0" cy="0"/>
+          <a:chOff x="0" y="0"/>
+          <a:chExt cx="0" cy="0"/>
+        </a:xfrm>
+      </p:grpSpPr>
+      <p:sp>
+        <p:nvSpPr>
+          <p:cNvPr id="2" name="Title 1">
+            <a:extLst>
+              <a:ext uri="{FF2B5EF4-FFF2-40B4-BE49-F238E27FC236}">
+                <a16:creationId xmlns:a16="http://schemas.microsoft.com/office/drawing/2014/main" id="{F784767C-1CD3-9E3B-7439-A5BA1D9C1AED}"/>
+              </a:ext>
+            </a:extLst>
+          </p:cNvPr>
+          <p:cNvSpPr>
+            <a:spLocks noGrp="1"/>
+          </p:cNvSpPr>
+          <p:nvPr>
+            <p:ph type="title"/>
+          </p:nvPr>
+        </p:nvSpPr>
+        <p:spPr/>
+        <p:txBody>
+          <a:bodyPr/>
+          <a:lstStyle/>
+          <a:p>
+            <a:r>
+              <a:rPr lang="en-US" dirty="0">
+                <a:solidFill>
+                  <a:srgbClr val="009051"/>
+                </a:solidFill>
+              </a:rPr>
+              <a:t>Theme Override: Non-theme vales</a:t>
+            </a:r>
+          </a:p>
+        </p:txBody>
+      </p:sp>
+      <p:sp>
+        <p:nvSpPr>
+          <p:cNvPr id="3" name="Content Placeholder 2">
+            <a:extLst>
+              <a:ext uri="{FF2B5EF4-FFF2-40B4-BE49-F238E27FC236}">
+                <a16:creationId xmlns:a16="http://schemas.microsoft.com/office/drawing/2014/main" id="{7C36769C-1ED3-F727-3B62-F6280B28C562}"/>
+              </a:ext>
+            </a:extLst>
+          </p:cNvPr>
+          <p:cNvSpPr>
+            <a:spLocks noGrp="1"/>
+          </p:cNvSpPr>
+          <p:nvPr>
+            <p:ph idx="1"/>
+          </p:nvPr>
+        </p:nvSpPr>
+        <p:spPr/>
+        <p:txBody>
+          <a:bodyPr/>
+          <a:lstStyle/>
+          <a:p>
+            <a:r>
+              <a:rPr lang="en-US" dirty="0"/>
+              <a:t>The title of this slide overrides the layout’s theme definition</a:t>
+            </a:r>
+          </a:p>
+          <a:p>
+            <a:r>
+              <a:rPr lang="en-US" dirty="0"/>
+              <a:t>Instead of using the theme’s </a:t>
+            </a:r>
+            <a:r>
+              <a:rPr lang="en-US" dirty="0">
+                <a:solidFill>
+                  <a:schemeClr val="accent2"/>
+                </a:solidFill>
+              </a:rPr>
+              <a:t>accent2</a:t>
+            </a:r>
+            <a:r>
+              <a:rPr lang="en-US" dirty="0"/>
+              <a:t>, it uses HEX </a:t>
+            </a:r>
+            <a:r>
+              <a:rPr lang="en-US" dirty="0">
+                <a:solidFill>
+                  <a:srgbClr val="009051"/>
+                </a:solidFill>
+              </a:rPr>
+              <a:t>009051</a:t>
+            </a:r>
+          </a:p>
+        </p:txBody>
+      </p:sp>
+    </p:spTree>
+    <p:extLst>
+      <p:ext uri="{BB962C8B-B14F-4D97-AF65-F5344CB8AC3E}">
+        <p14:creationId xmlns:p14="http://schemas.microsoft.com/office/powerpoint/2010/main" val="814462563"/>
+      </p:ext>
+    </p:extLst>
+  </p:cSld>
+  <p:clrMapOvr>
+    <a:masterClrMapping/>
+  </p:clrMapOvr>
+</p:sld>
+</file>
+
+<file path=ppt/slides/slide5.xml><?xml version="1.0" encoding="utf-8"?>
+<p:sld xmlns:a="http://schemas.openxmlformats.org/drawingml/2006/main" xmlns:r="http://schemas.openxmlformats.org/officeDocument/2006/relationships" xmlns:p="http://schemas.openxmlformats.org/presentationml/2006/main">
+  <p:cSld>
+    <p:spTree>
+      <p:nvGrpSpPr>
+        <p:cNvPr id="1" name=""/>
+        <p:cNvGrpSpPr/>
+        <p:nvPr/>
+      </p:nvGrpSpPr>
+      <p:grpSpPr>
+        <a:xfrm>
+          <a:off x="0" y="0"/>
+          <a:ext cx="0" cy="0"/>
+          <a:chOff x="0" y="0"/>
+          <a:chExt cx="0" cy="0"/>
+        </a:xfrm>
+      </p:grpSpPr>
+      <p:sp>
+        <p:nvSpPr>
           <p:cNvPr id="4" name="Title 3">
             <a:extLst>
               <a:ext uri="{FF2B5EF4-FFF2-40B4-BE49-F238E27FC236}">
@@ -10269,7 +10946,7 @@
 </p:sld>
 </file>
 
-<file path=ppt/slides/slide4.xml><?xml version="1.0" encoding="utf-8"?>
+<file path=ppt/slides/slide6.xml><?xml version="1.0" encoding="utf-8"?>
 <p:sld xmlns:a="http://schemas.openxmlformats.org/drawingml/2006/main" xmlns:r="http://schemas.openxmlformats.org/officeDocument/2006/relationships" xmlns:p="http://schemas.openxmlformats.org/presentationml/2006/main">
   <p:cSld>
     <p:spTree>
@@ -11320,4 +11997,319 @@
     </a:ext>
   </a:extLst>
 </a:theme>
+</file>
+
+<file path=ppt/theme/theme4.xml><?xml version="1.0" encoding="utf-8"?>
+<a:theme xmlns:a="http://schemas.openxmlformats.org/drawingml/2006/main" name="Office Theme">
+  <a:themeElements>
+    <a:clrScheme name="Office">
+      <a:dk1>
+        <a:sysClr val="windowText" lastClr="000000"/>
+      </a:dk1>
+      <a:lt1>
+        <a:sysClr val="window" lastClr="FFFFFF"/>
+      </a:lt1>
+      <a:dk2>
+        <a:srgbClr val="0E2841"/>
+      </a:dk2>
+      <a:lt2>
+        <a:srgbClr val="E8E8E8"/>
+      </a:lt2>
+      <a:accent1>
+        <a:srgbClr val="156082"/>
+      </a:accent1>
+      <a:accent2>
+        <a:srgbClr val="E97132"/>
+      </a:accent2>
+      <a:accent3>
+        <a:srgbClr val="196B24"/>
+      </a:accent3>
+      <a:accent4>
+        <a:srgbClr val="0F9ED5"/>
+      </a:accent4>
+      <a:accent5>
+        <a:srgbClr val="A02B93"/>
+      </a:accent5>
+      <a:accent6>
+        <a:srgbClr val="4EA72E"/>
+      </a:accent6>
+      <a:hlink>
+        <a:srgbClr val="467886"/>
+      </a:hlink>
+      <a:folHlink>
+        <a:srgbClr val="96607D"/>
+      </a:folHlink>
+    </a:clrScheme>
+    <a:fontScheme name="Office">
+      <a:majorFont>
+        <a:latin typeface="Aptos Display" panose="02110004020202020204"/>
+        <a:ea typeface=""/>
+        <a:cs typeface=""/>
+        <a:font script="Jpan" typeface="游ゴシック Light"/>
+        <a:font script="Hang" typeface="맑은 고딕"/>
+        <a:font script="Hans" typeface="等线 Light"/>
+        <a:font script="Hant" typeface="新細明體"/>
+        <a:font script="Arab" typeface="Times New Roman"/>
+        <a:font script="Hebr" typeface="Times New Roman"/>
+        <a:font script="Thai" typeface="Angsana New"/>
+        <a:font script="Ethi" typeface="Nyala"/>
+        <a:font script="Beng" typeface="Vrinda"/>
+        <a:font script="Gujr" typeface="Shruti"/>
+        <a:font script="Khmr" typeface="MoolBoran"/>
+        <a:font script="Knda" typeface="Tunga"/>
+        <a:font script="Guru" typeface="Raavi"/>
+        <a:font script="Cans" typeface="Euphemia"/>
+        <a:font script="Cher" typeface="Plantagenet Cherokee"/>
+        <a:font script="Yiii" typeface="Microsoft Yi Baiti"/>
+        <a:font script="Tibt" typeface="Microsoft Himalaya"/>
+        <a:font script="Thaa" typeface="MV Boli"/>
+        <a:font script="Deva" typeface="Mangal"/>
+        <a:font script="Telu" typeface="Gautami"/>
+        <a:font script="Taml" typeface="Latha"/>
+        <a:font script="Syrc" typeface="Estrangelo Edessa"/>
+        <a:font script="Orya" typeface="Kalinga"/>
+        <a:font script="Mlym" typeface="Kartika"/>
+        <a:font script="Laoo" typeface="DokChampa"/>
+        <a:font script="Sinh" typeface="Iskoola Pota"/>
+        <a:font script="Mong" typeface="Mongolian Baiti"/>
+        <a:font script="Viet" typeface="Times New Roman"/>
+        <a:font script="Uigh" typeface="Microsoft Uighur"/>
+        <a:font script="Geor" typeface="Sylfaen"/>
+        <a:font script="Armn" typeface="Arial"/>
+        <a:font script="Bugi" typeface="Leelawadee UI"/>
+        <a:font script="Bopo" typeface="Microsoft JhengHei"/>
+        <a:font script="Java" typeface="Javanese Text"/>
+        <a:font script="Lisu" typeface="Segoe UI"/>
+        <a:font script="Mymr" typeface="Myanmar Text"/>
+        <a:font script="Nkoo" typeface="Ebrima"/>
+        <a:font script="Olck" typeface="Nirmala UI"/>
+        <a:font script="Osma" typeface="Ebrima"/>
+        <a:font script="Phag" typeface="Phagspa"/>
+        <a:font script="Syrn" typeface="Estrangelo Edessa"/>
+        <a:font script="Syrj" typeface="Estrangelo Edessa"/>
+        <a:font script="Syre" typeface="Estrangelo Edessa"/>
+        <a:font script="Sora" typeface="Nirmala UI"/>
+        <a:font script="Tale" typeface="Microsoft Tai Le"/>
+        <a:font script="Talu" typeface="Microsoft New Tai Lue"/>
+        <a:font script="Tfng" typeface="Ebrima"/>
+      </a:majorFont>
+      <a:minorFont>
+        <a:latin typeface="Aptos" panose="02110004020202020204"/>
+        <a:ea typeface=""/>
+        <a:cs typeface=""/>
+        <a:font script="Jpan" typeface="游ゴシック"/>
+        <a:font script="Hang" typeface="맑은 고딕"/>
+        <a:font script="Hans" typeface="等线"/>
+        <a:font script="Hant" typeface="新細明體"/>
+        <a:font script="Arab" typeface="Arial"/>
+        <a:font script="Hebr" typeface="Arial"/>
+        <a:font script="Thai" typeface="Cordia New"/>
+        <a:font script="Ethi" typeface="Nyala"/>
+        <a:font script="Beng" typeface="Vrinda"/>
+        <a:font script="Gujr" typeface="Shruti"/>
+        <a:font script="Khmr" typeface="DaunPenh"/>
+        <a:font script="Knda" typeface="Tunga"/>
+        <a:font script="Guru" typeface="Raavi"/>
+        <a:font script="Cans" typeface="Euphemia"/>
+        <a:font script="Cher" typeface="Plantagenet Cherokee"/>
+        <a:font script="Yiii" typeface="Microsoft Yi Baiti"/>
+        <a:font script="Tibt" typeface="Microsoft Himalaya"/>
+        <a:font script="Thaa" typeface="MV Boli"/>
+        <a:font script="Deva" typeface="Mangal"/>
+        <a:font script="Telu" typeface="Gautami"/>
+        <a:font script="Taml" typeface="Latha"/>
+        <a:font script="Syrc" typeface="Estrangelo Edessa"/>
+        <a:font script="Orya" typeface="Kalinga"/>
+        <a:font script="Mlym" typeface="Kartika"/>
+        <a:font script="Laoo" typeface="DokChampa"/>
+        <a:font script="Sinh" typeface="Iskoola Pota"/>
+        <a:font script="Mong" typeface="Mongolian Baiti"/>
+        <a:font script="Viet" typeface="Arial"/>
+        <a:font script="Uigh" typeface="Microsoft Uighur"/>
+        <a:font script="Geor" typeface="Sylfaen"/>
+        <a:font script="Armn" typeface="Arial"/>
+        <a:font script="Bugi" typeface="Leelawadee UI"/>
+        <a:font script="Bopo" typeface="Microsoft JhengHei"/>
+        <a:font script="Java" typeface="Javanese Text"/>
+        <a:font script="Lisu" typeface="Segoe UI"/>
+        <a:font script="Mymr" typeface="Myanmar Text"/>
+        <a:font script="Nkoo" typeface="Ebrima"/>
+        <a:font script="Olck" typeface="Nirmala UI"/>
+        <a:font script="Osma" typeface="Ebrima"/>
+        <a:font script="Phag" typeface="Phagspa"/>
+        <a:font script="Syrn" typeface="Estrangelo Edessa"/>
+        <a:font script="Syrj" typeface="Estrangelo Edessa"/>
+        <a:font script="Syre" typeface="Estrangelo Edessa"/>
+        <a:font script="Sora" typeface="Nirmala UI"/>
+        <a:font script="Tale" typeface="Microsoft Tai Le"/>
+        <a:font script="Talu" typeface="Microsoft New Tai Lue"/>
+        <a:font script="Tfng" typeface="Ebrima"/>
+      </a:minorFont>
+    </a:fontScheme>
+    <a:fmtScheme name="Office">
+      <a:fillStyleLst>
+        <a:solidFill>
+          <a:schemeClr val="phClr"/>
+        </a:solidFill>
+        <a:gradFill rotWithShape="1">
+          <a:gsLst>
+            <a:gs pos="0">
+              <a:schemeClr val="phClr">
+                <a:lumMod val="110000"/>
+                <a:satMod val="105000"/>
+                <a:tint val="67000"/>
+              </a:schemeClr>
+            </a:gs>
+            <a:gs pos="50000">
+              <a:schemeClr val="phClr">
+                <a:lumMod val="105000"/>
+                <a:satMod val="103000"/>
+                <a:tint val="73000"/>
+              </a:schemeClr>
+            </a:gs>
+            <a:gs pos="100000">
+              <a:schemeClr val="phClr">
+                <a:lumMod val="105000"/>
+                <a:satMod val="109000"/>
+                <a:tint val="81000"/>
+              </a:schemeClr>
+            </a:gs>
+          </a:gsLst>
+          <a:lin ang="5400000" scaled="0"/>
+        </a:gradFill>
+        <a:gradFill rotWithShape="1">
+          <a:gsLst>
+            <a:gs pos="0">
+              <a:schemeClr val="phClr">
+                <a:satMod val="103000"/>
+                <a:lumMod val="102000"/>
+                <a:tint val="94000"/>
+              </a:schemeClr>
+            </a:gs>
+            <a:gs pos="50000">
+              <a:schemeClr val="phClr">
+                <a:satMod val="110000"/>
+                <a:lumMod val="100000"/>
+                <a:shade val="100000"/>
+              </a:schemeClr>
+            </a:gs>
+            <a:gs pos="100000">
+              <a:schemeClr val="phClr">
+                <a:lumMod val="99000"/>
+                <a:satMod val="120000"/>
+                <a:shade val="78000"/>
+              </a:schemeClr>
+            </a:gs>
+          </a:gsLst>
+          <a:lin ang="5400000" scaled="0"/>
+        </a:gradFill>
+      </a:fillStyleLst>
+      <a:lnStyleLst>
+        <a:ln w="12700" cap="flat" cmpd="sng" algn="ctr">
+          <a:solidFill>
+            <a:schemeClr val="phClr"/>
+          </a:solidFill>
+          <a:prstDash val="solid"/>
+          <a:miter lim="800000"/>
+        </a:ln>
+        <a:ln w="19050" cap="flat" cmpd="sng" algn="ctr">
+          <a:solidFill>
+            <a:schemeClr val="phClr"/>
+          </a:solidFill>
+          <a:prstDash val="solid"/>
+          <a:miter lim="800000"/>
+        </a:ln>
+        <a:ln w="25400" cap="flat" cmpd="sng" algn="ctr">
+          <a:solidFill>
+            <a:schemeClr val="phClr"/>
+          </a:solidFill>
+          <a:prstDash val="solid"/>
+          <a:miter lim="800000"/>
+        </a:ln>
+      </a:lnStyleLst>
+      <a:effectStyleLst>
+        <a:effectStyle>
+          <a:effectLst/>
+        </a:effectStyle>
+        <a:effectStyle>
+          <a:effectLst/>
+        </a:effectStyle>
+        <a:effectStyle>
+          <a:effectLst>
+            <a:outerShdw blurRad="57150" dist="19050" dir="5400000" algn="ctr" rotWithShape="0">
+              <a:srgbClr val="000000">
+                <a:alpha val="63000"/>
+              </a:srgbClr>
+            </a:outerShdw>
+          </a:effectLst>
+        </a:effectStyle>
+      </a:effectStyleLst>
+      <a:bgFillStyleLst>
+        <a:solidFill>
+          <a:schemeClr val="phClr"/>
+        </a:solidFill>
+        <a:solidFill>
+          <a:schemeClr val="phClr">
+            <a:tint val="95000"/>
+            <a:satMod val="170000"/>
+          </a:schemeClr>
+        </a:solidFill>
+        <a:gradFill rotWithShape="1">
+          <a:gsLst>
+            <a:gs pos="0">
+              <a:schemeClr val="phClr">
+                <a:tint val="93000"/>
+                <a:satMod val="150000"/>
+                <a:shade val="98000"/>
+                <a:lumMod val="102000"/>
+              </a:schemeClr>
+            </a:gs>
+            <a:gs pos="50000">
+              <a:schemeClr val="phClr">
+                <a:tint val="98000"/>
+                <a:satMod val="130000"/>
+                <a:shade val="90000"/>
+                <a:lumMod val="103000"/>
+              </a:schemeClr>
+            </a:gs>
+            <a:gs pos="100000">
+              <a:schemeClr val="phClr">
+                <a:shade val="63000"/>
+                <a:satMod val="120000"/>
+              </a:schemeClr>
+            </a:gs>
+          </a:gsLst>
+          <a:lin ang="5400000" scaled="0"/>
+        </a:gradFill>
+      </a:bgFillStyleLst>
+    </a:fmtScheme>
+  </a:themeElements>
+  <a:objectDefaults>
+    <a:lnDef>
+      <a:spPr/>
+      <a:bodyPr/>
+      <a:lstStyle/>
+      <a:style>
+        <a:lnRef idx="2">
+          <a:schemeClr val="accent1"/>
+        </a:lnRef>
+        <a:fillRef idx="0">
+          <a:schemeClr val="accent1"/>
+        </a:fillRef>
+        <a:effectRef idx="1">
+          <a:schemeClr val="accent1"/>
+        </a:effectRef>
+        <a:fontRef idx="minor">
+          <a:schemeClr val="tx1"/>
+        </a:fontRef>
+      </a:style>
+    </a:lnDef>
+  </a:objectDefaults>
+  <a:extraClrSchemeLst/>
+  <a:extLst>
+    <a:ext uri="{05A4C25C-085E-4340-85A3-A5531E510DB2}">
+      <thm15:themeFamily xmlns:thm15="http://schemas.microsoft.com/office/thememl/2012/main" name="Office Theme" id="{2E142A2C-CD16-42D6-873A-C26D2A0506FA}" vid="{1BDDFF52-6CD6-40A5-AB3C-68EB2F1E4D0A}"/>
+    </a:ext>
+  </a:extLst>
+</a:theme>
 </file>
</xml_diff>

<commit_message>
Fix scheme→hex conversion bug with tint modifiers
  - Fixed malformed XML when converting scheme colors with tint/shade modifiers to hex values
  - Enhanced regex to properly match both self-closing and container schemeClr elements
  - Scheme→hex now strips tint modifiers and creates valid self-closing srgbClr elements
  - Scheme→scheme preserves tint/shade modifiers as expected
  - Added comprehensive unit tests for tint modifier handling
  - Updated README documentation explaining tint/shade behavior
</commit_message>
<xml_diff>
--- a/cmd/pptx-toolkit/testdata/test.pptx
+++ b/cmd/pptx-toolkit/testdata/test.pptx
@@ -7,24 +7,25 @@
     <p:sldMasterId id="2147483672" r:id="rId3"/>
   </p:sldMasterIdLst>
   <p:notesMasterIdLst>
-    <p:notesMasterId r:id="rId16"/>
+    <p:notesMasterId r:id="rId17"/>
   </p:notesMasterIdLst>
   <p:handoutMasterIdLst>
-    <p:handoutMasterId r:id="rId17"/>
+    <p:handoutMasterId r:id="rId18"/>
   </p:handoutMasterIdLst>
   <p:sldIdLst>
     <p:sldId id="256" r:id="rId4"/>
     <p:sldId id="257" r:id="rId5"/>
     <p:sldId id="262" r:id="rId6"/>
     <p:sldId id="263" r:id="rId7"/>
-    <p:sldId id="260" r:id="rId8"/>
-    <p:sldId id="261" r:id="rId9"/>
-    <p:sldId id="258" r:id="rId10"/>
-    <p:sldId id="264" r:id="rId11"/>
-    <p:sldId id="265" r:id="rId12"/>
-    <p:sldId id="259" r:id="rId13"/>
-    <p:sldId id="266" r:id="rId14"/>
-    <p:sldId id="267" r:id="rId15"/>
+    <p:sldId id="268" r:id="rId8"/>
+    <p:sldId id="260" r:id="rId9"/>
+    <p:sldId id="261" r:id="rId10"/>
+    <p:sldId id="258" r:id="rId11"/>
+    <p:sldId id="264" r:id="rId12"/>
+    <p:sldId id="265" r:id="rId13"/>
+    <p:sldId id="259" r:id="rId14"/>
+    <p:sldId id="266" r:id="rId15"/>
+    <p:sldId id="267" r:id="rId16"/>
   </p:sldIdLst>
   <p:sldSz cx="12192000" cy="6858000"/>
   <p:notesSz cx="6858000" cy="9144000"/>
@@ -12894,7 +12895,7 @@
           <a:p>
             <a:fld id="{A19F28EB-6B0E-3A46-A4A7-9B1BCB3FCA6C}" type="datetimeFigureOut">
               <a:rPr lang="en-US" smtClean="0"/>
-              <a:t>10/25/25</a:t>
+              <a:t>10/26/25</a:t>
             </a:fld>
             <a:endParaRPr lang="en-US"/>
           </a:p>
@@ -13071,7 +13072,7 @@
           <a:p>
             <a:fld id="{7E20784D-5404-1445-90FD-0AA61620D67E}" type="datetimeFigureOut">
               <a:rPr lang="en-US" smtClean="0"/>
-              <a:t>10/25/25</a:t>
+              <a:t>10/26/25</a:t>
             </a:fld>
             <a:endParaRPr lang="en-US"/>
           </a:p>
@@ -13576,7 +13577,7 @@
           <a:p>
             <a:fld id="{99FB2E88-1E27-2243-AE12-8E9276940C7E}" type="datetimeFigureOut">
               <a:rPr lang="en-US" smtClean="0"/>
-              <a:t>10/25/25</a:t>
+              <a:t>10/26/25</a:t>
             </a:fld>
             <a:endParaRPr lang="en-US"/>
           </a:p>
@@ -13776,7 +13777,7 @@
           <a:p>
             <a:fld id="{99FB2E88-1E27-2243-AE12-8E9276940C7E}" type="datetimeFigureOut">
               <a:rPr lang="en-US" smtClean="0"/>
-              <a:t>10/25/25</a:t>
+              <a:t>10/26/25</a:t>
             </a:fld>
             <a:endParaRPr lang="en-US"/>
           </a:p>
@@ -13986,7 +13987,7 @@
           <a:p>
             <a:fld id="{99FB2E88-1E27-2243-AE12-8E9276940C7E}" type="datetimeFigureOut">
               <a:rPr lang="en-US" smtClean="0"/>
-              <a:t>10/25/25</a:t>
+              <a:t>10/26/25</a:t>
             </a:fld>
             <a:endParaRPr lang="en-US"/>
           </a:p>
@@ -14212,7 +14213,7 @@
           <a:p>
             <a:fld id="{99FB2E88-1E27-2243-AE12-8E9276940C7E}" type="datetimeFigureOut">
               <a:rPr lang="en-US" smtClean="0"/>
-              <a:t>10/25/25</a:t>
+              <a:t>10/26/25</a:t>
             </a:fld>
             <a:endParaRPr lang="en-US"/>
           </a:p>
@@ -14412,7 +14413,7 @@
           <a:p>
             <a:fld id="{99FB2E88-1E27-2243-AE12-8E9276940C7E}" type="datetimeFigureOut">
               <a:rPr lang="en-US" smtClean="0"/>
-              <a:t>10/25/25</a:t>
+              <a:t>10/26/25</a:t>
             </a:fld>
             <a:endParaRPr lang="en-US"/>
           </a:p>
@@ -14688,7 +14689,7 @@
           <a:p>
             <a:fld id="{99FB2E88-1E27-2243-AE12-8E9276940C7E}" type="datetimeFigureOut">
               <a:rPr lang="en-US" smtClean="0"/>
-              <a:t>10/25/25</a:t>
+              <a:t>10/26/25</a:t>
             </a:fld>
             <a:endParaRPr lang="en-US"/>
           </a:p>
@@ -14956,7 +14957,7 @@
           <a:p>
             <a:fld id="{99FB2E88-1E27-2243-AE12-8E9276940C7E}" type="datetimeFigureOut">
               <a:rPr lang="en-US" smtClean="0"/>
-              <a:t>10/25/25</a:t>
+              <a:t>10/26/25</a:t>
             </a:fld>
             <a:endParaRPr lang="en-US"/>
           </a:p>
@@ -15371,7 +15372,7 @@
           <a:p>
             <a:fld id="{99FB2E88-1E27-2243-AE12-8E9276940C7E}" type="datetimeFigureOut">
               <a:rPr lang="en-US" smtClean="0"/>
-              <a:t>10/25/25</a:t>
+              <a:t>10/26/25</a:t>
             </a:fld>
             <a:endParaRPr lang="en-US"/>
           </a:p>
@@ -15513,7 +15514,7 @@
           <a:p>
             <a:fld id="{99FB2E88-1E27-2243-AE12-8E9276940C7E}" type="datetimeFigureOut">
               <a:rPr lang="en-US" smtClean="0"/>
-              <a:t>10/25/25</a:t>
+              <a:t>10/26/25</a:t>
             </a:fld>
             <a:endParaRPr lang="en-US"/>
           </a:p>
@@ -15626,7 +15627,7 @@
           <a:p>
             <a:fld id="{99FB2E88-1E27-2243-AE12-8E9276940C7E}" type="datetimeFigureOut">
               <a:rPr lang="en-US" smtClean="0"/>
-              <a:t>10/25/25</a:t>
+              <a:t>10/26/25</a:t>
             </a:fld>
             <a:endParaRPr lang="en-US"/>
           </a:p>
@@ -15939,7 +15940,7 @@
           <a:p>
             <a:fld id="{99FB2E88-1E27-2243-AE12-8E9276940C7E}" type="datetimeFigureOut">
               <a:rPr lang="en-US" smtClean="0"/>
-              <a:t>10/25/25</a:t>
+              <a:t>10/26/25</a:t>
             </a:fld>
             <a:endParaRPr lang="en-US"/>
           </a:p>
@@ -16139,7 +16140,7 @@
           <a:p>
             <a:fld id="{99FB2E88-1E27-2243-AE12-8E9276940C7E}" type="datetimeFigureOut">
               <a:rPr lang="en-US" smtClean="0"/>
-              <a:t>10/25/25</a:t>
+              <a:t>10/26/25</a:t>
             </a:fld>
             <a:endParaRPr lang="en-US"/>
           </a:p>
@@ -16428,7 +16429,7 @@
           <a:p>
             <a:fld id="{99FB2E88-1E27-2243-AE12-8E9276940C7E}" type="datetimeFigureOut">
               <a:rPr lang="en-US" smtClean="0"/>
-              <a:t>10/25/25</a:t>
+              <a:t>10/26/25</a:t>
             </a:fld>
             <a:endParaRPr lang="en-US"/>
           </a:p>
@@ -16628,7 +16629,7 @@
           <a:p>
             <a:fld id="{99FB2E88-1E27-2243-AE12-8E9276940C7E}" type="datetimeFigureOut">
               <a:rPr lang="en-US" smtClean="0"/>
-              <a:t>10/25/25</a:t>
+              <a:t>10/26/25</a:t>
             </a:fld>
             <a:endParaRPr lang="en-US"/>
           </a:p>
@@ -16838,7 +16839,7 @@
           <a:p>
             <a:fld id="{99FB2E88-1E27-2243-AE12-8E9276940C7E}" type="datetimeFigureOut">
               <a:rPr lang="en-US" smtClean="0"/>
-              <a:t>10/25/25</a:t>
+              <a:t>10/26/25</a:t>
             </a:fld>
             <a:endParaRPr lang="en-US"/>
           </a:p>
@@ -17064,7 +17065,7 @@
           <a:p>
             <a:fld id="{99FB2E88-1E27-2243-AE12-8E9276940C7E}" type="datetimeFigureOut">
               <a:rPr lang="en-US" smtClean="0"/>
-              <a:t>10/25/25</a:t>
+              <a:t>10/26/25</a:t>
             </a:fld>
             <a:endParaRPr lang="en-US"/>
           </a:p>
@@ -17264,7 +17265,7 @@
           <a:p>
             <a:fld id="{99FB2E88-1E27-2243-AE12-8E9276940C7E}" type="datetimeFigureOut">
               <a:rPr lang="en-US" smtClean="0"/>
-              <a:t>10/25/25</a:t>
+              <a:t>10/26/25</a:t>
             </a:fld>
             <a:endParaRPr lang="en-US"/>
           </a:p>
@@ -17540,7 +17541,7 @@
           <a:p>
             <a:fld id="{99FB2E88-1E27-2243-AE12-8E9276940C7E}" type="datetimeFigureOut">
               <a:rPr lang="en-US" smtClean="0"/>
-              <a:t>10/25/25</a:t>
+              <a:t>10/26/25</a:t>
             </a:fld>
             <a:endParaRPr lang="en-US"/>
           </a:p>
@@ -17808,7 +17809,7 @@
           <a:p>
             <a:fld id="{99FB2E88-1E27-2243-AE12-8E9276940C7E}" type="datetimeFigureOut">
               <a:rPr lang="en-US" smtClean="0"/>
-              <a:t>10/25/25</a:t>
+              <a:t>10/26/25</a:t>
             </a:fld>
             <a:endParaRPr lang="en-US"/>
           </a:p>
@@ -18223,7 +18224,7 @@
           <a:p>
             <a:fld id="{99FB2E88-1E27-2243-AE12-8E9276940C7E}" type="datetimeFigureOut">
               <a:rPr lang="en-US" smtClean="0"/>
-              <a:t>10/25/25</a:t>
+              <a:t>10/26/25</a:t>
             </a:fld>
             <a:endParaRPr lang="en-US"/>
           </a:p>
@@ -18365,7 +18366,7 @@
           <a:p>
             <a:fld id="{99FB2E88-1E27-2243-AE12-8E9276940C7E}" type="datetimeFigureOut">
               <a:rPr lang="en-US" smtClean="0"/>
-              <a:t>10/25/25</a:t>
+              <a:t>10/26/25</a:t>
             </a:fld>
             <a:endParaRPr lang="en-US"/>
           </a:p>
@@ -18478,7 +18479,7 @@
           <a:p>
             <a:fld id="{99FB2E88-1E27-2243-AE12-8E9276940C7E}" type="datetimeFigureOut">
               <a:rPr lang="en-US" smtClean="0"/>
-              <a:t>10/25/25</a:t>
+              <a:t>10/26/25</a:t>
             </a:fld>
             <a:endParaRPr lang="en-US"/>
           </a:p>
@@ -18754,7 +18755,7 @@
           <a:p>
             <a:fld id="{99FB2E88-1E27-2243-AE12-8E9276940C7E}" type="datetimeFigureOut">
               <a:rPr lang="en-US" smtClean="0"/>
-              <a:t>10/25/25</a:t>
+              <a:t>10/26/25</a:t>
             </a:fld>
             <a:endParaRPr lang="en-US"/>
           </a:p>
@@ -19067,7 +19068,7 @@
           <a:p>
             <a:fld id="{99FB2E88-1E27-2243-AE12-8E9276940C7E}" type="datetimeFigureOut">
               <a:rPr lang="en-US" smtClean="0"/>
-              <a:t>10/25/25</a:t>
+              <a:t>10/26/25</a:t>
             </a:fld>
             <a:endParaRPr lang="en-US"/>
           </a:p>
@@ -19356,7 +19357,7 @@
           <a:p>
             <a:fld id="{99FB2E88-1E27-2243-AE12-8E9276940C7E}" type="datetimeFigureOut">
               <a:rPr lang="en-US" smtClean="0"/>
-              <a:t>10/25/25</a:t>
+              <a:t>10/26/25</a:t>
             </a:fld>
             <a:endParaRPr lang="en-US"/>
           </a:p>
@@ -19556,7 +19557,7 @@
           <a:p>
             <a:fld id="{99FB2E88-1E27-2243-AE12-8E9276940C7E}" type="datetimeFigureOut">
               <a:rPr lang="en-US" smtClean="0"/>
-              <a:t>10/25/25</a:t>
+              <a:t>10/26/25</a:t>
             </a:fld>
             <a:endParaRPr lang="en-US"/>
           </a:p>
@@ -19766,7 +19767,7 @@
           <a:p>
             <a:fld id="{99FB2E88-1E27-2243-AE12-8E9276940C7E}" type="datetimeFigureOut">
               <a:rPr lang="en-US" smtClean="0"/>
-              <a:t>10/25/25</a:t>
+              <a:t>10/26/25</a:t>
             </a:fld>
             <a:endParaRPr lang="en-US"/>
           </a:p>
@@ -20034,7 +20035,7 @@
           <a:p>
             <a:fld id="{99FB2E88-1E27-2243-AE12-8E9276940C7E}" type="datetimeFigureOut">
               <a:rPr lang="en-US" smtClean="0"/>
-              <a:t>10/25/25</a:t>
+              <a:t>10/26/25</a:t>
             </a:fld>
             <a:endParaRPr lang="en-US"/>
           </a:p>
@@ -20449,7 +20450,7 @@
           <a:p>
             <a:fld id="{99FB2E88-1E27-2243-AE12-8E9276940C7E}" type="datetimeFigureOut">
               <a:rPr lang="en-US" smtClean="0"/>
-              <a:t>10/25/25</a:t>
+              <a:t>10/26/25</a:t>
             </a:fld>
             <a:endParaRPr lang="en-US"/>
           </a:p>
@@ -20591,7 +20592,7 @@
           <a:p>
             <a:fld id="{99FB2E88-1E27-2243-AE12-8E9276940C7E}" type="datetimeFigureOut">
               <a:rPr lang="en-US" smtClean="0"/>
-              <a:t>10/25/25</a:t>
+              <a:t>10/26/25</a:t>
             </a:fld>
             <a:endParaRPr lang="en-US"/>
           </a:p>
@@ -20704,7 +20705,7 @@
           <a:p>
             <a:fld id="{99FB2E88-1E27-2243-AE12-8E9276940C7E}" type="datetimeFigureOut">
               <a:rPr lang="en-US" smtClean="0"/>
-              <a:t>10/25/25</a:t>
+              <a:t>10/26/25</a:t>
             </a:fld>
             <a:endParaRPr lang="en-US"/>
           </a:p>
@@ -21017,7 +21018,7 @@
           <a:p>
             <a:fld id="{99FB2E88-1E27-2243-AE12-8E9276940C7E}" type="datetimeFigureOut">
               <a:rPr lang="en-US" smtClean="0"/>
-              <a:t>10/25/25</a:t>
+              <a:t>10/26/25</a:t>
             </a:fld>
             <a:endParaRPr lang="en-US"/>
           </a:p>
@@ -21306,7 +21307,7 @@
           <a:p>
             <a:fld id="{99FB2E88-1E27-2243-AE12-8E9276940C7E}" type="datetimeFigureOut">
               <a:rPr lang="en-US" smtClean="0"/>
-              <a:t>10/25/25</a:t>
+              <a:t>10/26/25</a:t>
             </a:fld>
             <a:endParaRPr lang="en-US"/>
           </a:p>
@@ -21549,7 +21550,7 @@
           <a:p>
             <a:fld id="{99FB2E88-1E27-2243-AE12-8E9276940C7E}" type="datetimeFigureOut">
               <a:rPr lang="en-US" smtClean="0"/>
-              <a:t>10/25/25</a:t>
+              <a:t>10/26/25</a:t>
             </a:fld>
             <a:endParaRPr lang="en-US"/>
           </a:p>
@@ -22119,7 +22120,7 @@
           <a:p>
             <a:fld id="{99FB2E88-1E27-2243-AE12-8E9276940C7E}" type="datetimeFigureOut">
               <a:rPr lang="en-US" smtClean="0"/>
-              <a:t>10/25/25</a:t>
+              <a:t>10/26/25</a:t>
             </a:fld>
             <a:endParaRPr lang="en-US"/>
           </a:p>
@@ -22689,7 +22690,7 @@
           <a:p>
             <a:fld id="{99FB2E88-1E27-2243-AE12-8E9276940C7E}" type="datetimeFigureOut">
               <a:rPr lang="en-US" smtClean="0"/>
-              <a:t>10/25/25</a:t>
+              <a:t>10/26/25</a:t>
             </a:fld>
             <a:endParaRPr lang="en-US"/>
           </a:p>
@@ -23191,6 +23192,96 @@
         <p:cNvPr id="1" name="">
           <a:extLst>
             <a:ext uri="{FF2B5EF4-FFF2-40B4-BE49-F238E27FC236}">
+              <a16:creationId xmlns:a16="http://schemas.microsoft.com/office/drawing/2014/main" id="{D268A264-832C-8FFF-6ED3-2805B1F8FC92}"/>
+            </a:ext>
+          </a:extLst>
+        </p:cNvPr>
+        <p:cNvGrpSpPr/>
+        <p:nvPr/>
+      </p:nvGrpSpPr>
+      <p:grpSpPr>
+        <a:xfrm>
+          <a:off x="0" y="0"/>
+          <a:ext cx="0" cy="0"/>
+          <a:chOff x="0" y="0"/>
+          <a:chExt cx="0" cy="0"/>
+        </a:xfrm>
+      </p:grpSpPr>
+      <p:sp>
+        <p:nvSpPr>
+          <p:cNvPr id="2" name="Title 1">
+            <a:extLst>
+              <a:ext uri="{FF2B5EF4-FFF2-40B4-BE49-F238E27FC236}">
+                <a16:creationId xmlns:a16="http://schemas.microsoft.com/office/drawing/2014/main" id="{05E06E67-81E1-2130-CE37-7DE0094E6289}"/>
+              </a:ext>
+            </a:extLst>
+          </p:cNvPr>
+          <p:cNvSpPr>
+            <a:spLocks noGrp="1"/>
+          </p:cNvSpPr>
+          <p:nvPr>
+            <p:ph type="title"/>
+          </p:nvPr>
+        </p:nvSpPr>
+        <p:spPr/>
+        <p:txBody>
+          <a:bodyPr/>
+          <a:lstStyle/>
+          <a:p>
+            <a:r>
+              <a:rPr lang="en-US" dirty="0"/>
+              <a:t>Theme 2: Chart</a:t>
+            </a:r>
+          </a:p>
+        </p:txBody>
+      </p:sp>
+      <p:graphicFrame>
+        <p:nvGraphicFramePr>
+          <p:cNvPr id="10" name="Content Placeholder 9">
+            <a:extLst>
+              <a:ext uri="{FF2B5EF4-FFF2-40B4-BE49-F238E27FC236}">
+                <a16:creationId xmlns:a16="http://schemas.microsoft.com/office/drawing/2014/main" id="{307C1A24-B84A-87B6-2C0D-F729B94FBDF5}"/>
+              </a:ext>
+            </a:extLst>
+          </p:cNvPr>
+          <p:cNvGraphicFramePr>
+            <a:graphicFrameLocks noGrp="1"/>
+          </p:cNvGraphicFramePr>
+          <p:nvPr>
+            <p:ph idx="1"/>
+          </p:nvPr>
+        </p:nvGraphicFramePr>
+        <p:xfrm>
+          <a:off x="838200" y="1825625"/>
+          <a:ext cx="10515600" cy="4351338"/>
+        </p:xfrm>
+        <a:graphic>
+          <a:graphicData uri="http://schemas.openxmlformats.org/drawingml/2006/chart">
+            <c:chart xmlns:c="http://schemas.openxmlformats.org/drawingml/2006/chart" xmlns:r="http://schemas.openxmlformats.org/officeDocument/2006/relationships" r:id="rId2"/>
+          </a:graphicData>
+        </a:graphic>
+      </p:graphicFrame>
+    </p:spTree>
+    <p:extLst>
+      <p:ext uri="{BB962C8B-B14F-4D97-AF65-F5344CB8AC3E}">
+        <p14:creationId xmlns:p14="http://schemas.microsoft.com/office/powerpoint/2010/main" val="1292343799"/>
+      </p:ext>
+    </p:extLst>
+  </p:cSld>
+  <p:clrMapOvr>
+    <a:masterClrMapping/>
+  </p:clrMapOvr>
+</p:sld>
+</file>
+
+<file path=ppt/slides/slide11.xml><?xml version="1.0" encoding="utf-8"?>
+<p:sld xmlns:a="http://schemas.openxmlformats.org/drawingml/2006/main" xmlns:r="http://schemas.openxmlformats.org/officeDocument/2006/relationships" xmlns:p="http://schemas.openxmlformats.org/presentationml/2006/main">
+  <p:cSld>
+    <p:spTree>
+      <p:nvGrpSpPr>
+        <p:cNvPr id="1" name="">
+          <a:extLst>
+            <a:ext uri="{FF2B5EF4-FFF2-40B4-BE49-F238E27FC236}">
               <a16:creationId xmlns:a16="http://schemas.microsoft.com/office/drawing/2014/main" id="{B5C27B92-83EA-3DAC-D683-40ECE85DF327}"/>
             </a:ext>
           </a:extLst>
@@ -23385,7 +23476,7 @@
 </p:sld>
 </file>
 
-<file path=ppt/slides/slide11.xml><?xml version="1.0" encoding="utf-8"?>
+<file path=ppt/slides/slide12.xml><?xml version="1.0" encoding="utf-8"?>
 <p:sld xmlns:a="http://schemas.openxmlformats.org/drawingml/2006/main" xmlns:r="http://schemas.openxmlformats.org/officeDocument/2006/relationships" xmlns:p="http://schemas.openxmlformats.org/presentationml/2006/main">
   <p:cSld>
     <p:spTree>
@@ -23475,7 +23566,7 @@
 </p:sld>
 </file>
 
-<file path=ppt/slides/slide12.xml><?xml version="1.0" encoding="utf-8"?>
+<file path=ppt/slides/slide13.xml><?xml version="1.0" encoding="utf-8"?>
 <p:sld xmlns:a="http://schemas.openxmlformats.org/drawingml/2006/main" xmlns:r="http://schemas.openxmlformats.org/officeDocument/2006/relationships" xmlns:p="http://schemas.openxmlformats.org/presentationml/2006/main">
   <p:cSld>
     <p:spTree>
@@ -23961,6 +24052,1271 @@
           <p:cNvPr id="2" name="Title 1">
             <a:extLst>
               <a:ext uri="{FF2B5EF4-FFF2-40B4-BE49-F238E27FC236}">
+                <a16:creationId xmlns:a16="http://schemas.microsoft.com/office/drawing/2014/main" id="{6A9DC7F8-6E2F-F705-8715-2DB77305AC47}"/>
+              </a:ext>
+            </a:extLst>
+          </p:cNvPr>
+          <p:cNvSpPr>
+            <a:spLocks noGrp="1"/>
+          </p:cNvSpPr>
+          <p:nvPr>
+            <p:ph type="title"/>
+          </p:nvPr>
+        </p:nvSpPr>
+        <p:spPr/>
+        <p:txBody>
+          <a:bodyPr/>
+          <a:lstStyle/>
+          <a:p>
+            <a:r>
+              <a:rPr lang="en-US" dirty="0"/>
+              <a:t>Theme 1: Table</a:t>
+            </a:r>
+          </a:p>
+        </p:txBody>
+      </p:sp>
+      <p:graphicFrame>
+        <p:nvGraphicFramePr>
+          <p:cNvPr id="4" name="Content Placeholder 3">
+            <a:extLst>
+              <a:ext uri="{FF2B5EF4-FFF2-40B4-BE49-F238E27FC236}">
+                <a16:creationId xmlns:a16="http://schemas.microsoft.com/office/drawing/2014/main" id="{6D9C80AC-2479-2311-5B98-632FAFDE4573}"/>
+              </a:ext>
+            </a:extLst>
+          </p:cNvPr>
+          <p:cNvGraphicFramePr>
+            <a:graphicFrameLocks noGrp="1"/>
+          </p:cNvGraphicFramePr>
+          <p:nvPr>
+            <p:ph idx="1"/>
+            <p:extLst>
+              <p:ext uri="{D42A27DB-BD31-4B8C-83A1-F6EECF244321}">
+                <p14:modId xmlns:p14="http://schemas.microsoft.com/office/powerpoint/2010/main" val="2270589109"/>
+              </p:ext>
+            </p:extLst>
+          </p:nvPr>
+        </p:nvGraphicFramePr>
+        <p:xfrm>
+          <a:off x="838200" y="1825625"/>
+          <a:ext cx="10515600" cy="2225040"/>
+        </p:xfrm>
+        <a:graphic>
+          <a:graphicData uri="http://schemas.openxmlformats.org/drawingml/2006/table">
+            <a:tbl>
+              <a:tblPr firstRow="1" bandRow="1">
+                <a:tableStyleId>{5C22544A-7EE6-4342-B048-85BDC9FD1C3A}</a:tableStyleId>
+              </a:tblPr>
+              <a:tblGrid>
+                <a:gridCol w="1051560">
+                  <a:extLst>
+                    <a:ext uri="{9D8B030D-6E8A-4147-A177-3AD203B41FA5}">
+                      <a16:colId xmlns:a16="http://schemas.microsoft.com/office/drawing/2014/main" val="2035516117"/>
+                    </a:ext>
+                  </a:extLst>
+                </a:gridCol>
+                <a:gridCol w="1051560">
+                  <a:extLst>
+                    <a:ext uri="{9D8B030D-6E8A-4147-A177-3AD203B41FA5}">
+                      <a16:colId xmlns:a16="http://schemas.microsoft.com/office/drawing/2014/main" val="2661977901"/>
+                    </a:ext>
+                  </a:extLst>
+                </a:gridCol>
+                <a:gridCol w="1051560">
+                  <a:extLst>
+                    <a:ext uri="{9D8B030D-6E8A-4147-A177-3AD203B41FA5}">
+                      <a16:colId xmlns:a16="http://schemas.microsoft.com/office/drawing/2014/main" val="3331786418"/>
+                    </a:ext>
+                  </a:extLst>
+                </a:gridCol>
+                <a:gridCol w="1051560">
+                  <a:extLst>
+                    <a:ext uri="{9D8B030D-6E8A-4147-A177-3AD203B41FA5}">
+                      <a16:colId xmlns:a16="http://schemas.microsoft.com/office/drawing/2014/main" val="1229515411"/>
+                    </a:ext>
+                  </a:extLst>
+                </a:gridCol>
+                <a:gridCol w="1051560">
+                  <a:extLst>
+                    <a:ext uri="{9D8B030D-6E8A-4147-A177-3AD203B41FA5}">
+                      <a16:colId xmlns:a16="http://schemas.microsoft.com/office/drawing/2014/main" val="1815260105"/>
+                    </a:ext>
+                  </a:extLst>
+                </a:gridCol>
+                <a:gridCol w="1051560">
+                  <a:extLst>
+                    <a:ext uri="{9D8B030D-6E8A-4147-A177-3AD203B41FA5}">
+                      <a16:colId xmlns:a16="http://schemas.microsoft.com/office/drawing/2014/main" val="934696678"/>
+                    </a:ext>
+                  </a:extLst>
+                </a:gridCol>
+                <a:gridCol w="1051560">
+                  <a:extLst>
+                    <a:ext uri="{9D8B030D-6E8A-4147-A177-3AD203B41FA5}">
+                      <a16:colId xmlns:a16="http://schemas.microsoft.com/office/drawing/2014/main" val="834923767"/>
+                    </a:ext>
+                  </a:extLst>
+                </a:gridCol>
+                <a:gridCol w="1051560">
+                  <a:extLst>
+                    <a:ext uri="{9D8B030D-6E8A-4147-A177-3AD203B41FA5}">
+                      <a16:colId xmlns:a16="http://schemas.microsoft.com/office/drawing/2014/main" val="1032153197"/>
+                    </a:ext>
+                  </a:extLst>
+                </a:gridCol>
+                <a:gridCol w="1051560">
+                  <a:extLst>
+                    <a:ext uri="{9D8B030D-6E8A-4147-A177-3AD203B41FA5}">
+                      <a16:colId xmlns:a16="http://schemas.microsoft.com/office/drawing/2014/main" val="1618958211"/>
+                    </a:ext>
+                  </a:extLst>
+                </a:gridCol>
+                <a:gridCol w="1051560">
+                  <a:extLst>
+                    <a:ext uri="{9D8B030D-6E8A-4147-A177-3AD203B41FA5}">
+                      <a16:colId xmlns:a16="http://schemas.microsoft.com/office/drawing/2014/main" val="3232968516"/>
+                    </a:ext>
+                  </a:extLst>
+                </a:gridCol>
+              </a:tblGrid>
+              <a:tr h="370840">
+                <a:tc>
+                  <a:txBody>
+                    <a:bodyPr/>
+                    <a:lstStyle/>
+                    <a:p>
+                      <a:pPr algn="ctr"/>
+                      <a:r>
+                        <a:rPr lang="en-US" sz="1600" dirty="0"/>
+                        <a:t>BG 1</a:t>
+                      </a:r>
+                    </a:p>
+                  </a:txBody>
+                  <a:tcPr>
+                    <a:solidFill>
+                      <a:schemeClr val="bg1"/>
+                    </a:solidFill>
+                  </a:tcPr>
+                </a:tc>
+                <a:tc>
+                  <a:txBody>
+                    <a:bodyPr/>
+                    <a:lstStyle/>
+                    <a:p>
+                      <a:pPr algn="ctr"/>
+                      <a:r>
+                        <a:rPr lang="en-US" sz="1600" dirty="0"/>
+                        <a:t>Text 1</a:t>
+                      </a:r>
+                    </a:p>
+                  </a:txBody>
+                  <a:tcPr>
+                    <a:solidFill>
+                      <a:schemeClr val="tx1"/>
+                    </a:solidFill>
+                  </a:tcPr>
+                </a:tc>
+                <a:tc>
+                  <a:txBody>
+                    <a:bodyPr/>
+                    <a:lstStyle/>
+                    <a:p>
+                      <a:pPr algn="ctr"/>
+                      <a:r>
+                        <a:rPr lang="en-US" sz="1600" dirty="0"/>
+                        <a:t>BG 2</a:t>
+                      </a:r>
+                    </a:p>
+                  </a:txBody>
+                  <a:tcPr>
+                    <a:solidFill>
+                      <a:schemeClr val="bg2"/>
+                    </a:solidFill>
+                  </a:tcPr>
+                </a:tc>
+                <a:tc>
+                  <a:txBody>
+                    <a:bodyPr/>
+                    <a:lstStyle/>
+                    <a:p>
+                      <a:pPr algn="ctr"/>
+                      <a:r>
+                        <a:rPr lang="en-US" sz="1600" dirty="0"/>
+                        <a:t>Text 2</a:t>
+                      </a:r>
+                    </a:p>
+                  </a:txBody>
+                  <a:tcPr>
+                    <a:solidFill>
+                      <a:schemeClr val="tx2"/>
+                    </a:solidFill>
+                  </a:tcPr>
+                </a:tc>
+                <a:tc>
+                  <a:txBody>
+                    <a:bodyPr/>
+                    <a:lstStyle/>
+                    <a:p>
+                      <a:pPr algn="ctr"/>
+                      <a:r>
+                        <a:rPr lang="en-US" sz="1600" dirty="0"/>
+                        <a:t>Accent 1</a:t>
+                      </a:r>
+                    </a:p>
+                  </a:txBody>
+                  <a:tcPr>
+                    <a:solidFill>
+                      <a:schemeClr val="accent1"/>
+                    </a:solidFill>
+                  </a:tcPr>
+                </a:tc>
+                <a:tc>
+                  <a:txBody>
+                    <a:bodyPr/>
+                    <a:lstStyle/>
+                    <a:p>
+                      <a:pPr algn="ctr"/>
+                      <a:r>
+                        <a:rPr lang="en-US" sz="1600" dirty="0"/>
+                        <a:t>Accent 2</a:t>
+                      </a:r>
+                    </a:p>
+                  </a:txBody>
+                  <a:tcPr>
+                    <a:solidFill>
+                      <a:schemeClr val="accent2"/>
+                    </a:solidFill>
+                  </a:tcPr>
+                </a:tc>
+                <a:tc>
+                  <a:txBody>
+                    <a:bodyPr/>
+                    <a:lstStyle/>
+                    <a:p>
+                      <a:pPr algn="ctr"/>
+                      <a:r>
+                        <a:rPr lang="en-US" sz="1600" dirty="0"/>
+                        <a:t>Accent 3</a:t>
+                      </a:r>
+                    </a:p>
+                  </a:txBody>
+                  <a:tcPr>
+                    <a:solidFill>
+                      <a:schemeClr val="accent3"/>
+                    </a:solidFill>
+                  </a:tcPr>
+                </a:tc>
+                <a:tc>
+                  <a:txBody>
+                    <a:bodyPr/>
+                    <a:lstStyle/>
+                    <a:p>
+                      <a:pPr algn="ctr"/>
+                      <a:r>
+                        <a:rPr lang="en-US" sz="1600" dirty="0"/>
+                        <a:t>Accent 4</a:t>
+                      </a:r>
+                    </a:p>
+                  </a:txBody>
+                  <a:tcPr>
+                    <a:solidFill>
+                      <a:schemeClr val="accent4"/>
+                    </a:solidFill>
+                  </a:tcPr>
+                </a:tc>
+                <a:tc>
+                  <a:txBody>
+                    <a:bodyPr/>
+                    <a:lstStyle/>
+                    <a:p>
+                      <a:pPr algn="ctr"/>
+                      <a:r>
+                        <a:rPr lang="en-US" sz="1600" dirty="0"/>
+                        <a:t>Accent 5</a:t>
+                      </a:r>
+                    </a:p>
+                  </a:txBody>
+                  <a:tcPr>
+                    <a:solidFill>
+                      <a:schemeClr val="accent5"/>
+                    </a:solidFill>
+                  </a:tcPr>
+                </a:tc>
+                <a:tc>
+                  <a:txBody>
+                    <a:bodyPr/>
+                    <a:lstStyle/>
+                    <a:p>
+                      <a:pPr algn="ctr"/>
+                      <a:r>
+                        <a:rPr lang="en-US" sz="1600" dirty="0"/>
+                        <a:t>Accent 6</a:t>
+                      </a:r>
+                    </a:p>
+                  </a:txBody>
+                  <a:tcPr>
+                    <a:solidFill>
+                      <a:schemeClr val="accent6"/>
+                    </a:solidFill>
+                  </a:tcPr>
+                </a:tc>
+                <a:extLst>
+                  <a:ext uri="{0D108BD9-81ED-4DB2-BD59-A6C34878D82A}">
+                    <a16:rowId xmlns:a16="http://schemas.microsoft.com/office/drawing/2014/main" val="152300375"/>
+                  </a:ext>
+                </a:extLst>
+              </a:tr>
+              <a:tr h="370840">
+                <a:tc>
+                  <a:txBody>
+                    <a:bodyPr/>
+                    <a:lstStyle/>
+                    <a:p>
+                      <a:pPr algn="ctr"/>
+                      <a:endParaRPr lang="en-US" sz="1600" dirty="0"/>
+                    </a:p>
+                  </a:txBody>
+                  <a:tcPr>
+                    <a:solidFill>
+                      <a:schemeClr val="bg1">
+                        <a:lumMod val="95000"/>
+                      </a:schemeClr>
+                    </a:solidFill>
+                  </a:tcPr>
+                </a:tc>
+                <a:tc>
+                  <a:txBody>
+                    <a:bodyPr/>
+                    <a:lstStyle/>
+                    <a:p>
+                      <a:pPr algn="ctr"/>
+                      <a:endParaRPr lang="en-US" sz="1600" dirty="0"/>
+                    </a:p>
+                  </a:txBody>
+                  <a:tcPr>
+                    <a:solidFill>
+                      <a:schemeClr val="tx1">
+                        <a:lumMod val="50000"/>
+                        <a:lumOff val="50000"/>
+                      </a:schemeClr>
+                    </a:solidFill>
+                  </a:tcPr>
+                </a:tc>
+                <a:tc>
+                  <a:txBody>
+                    <a:bodyPr/>
+                    <a:lstStyle/>
+                    <a:p>
+                      <a:pPr algn="ctr"/>
+                      <a:endParaRPr lang="en-US" sz="1600" dirty="0"/>
+                    </a:p>
+                  </a:txBody>
+                  <a:tcPr>
+                    <a:solidFill>
+                      <a:schemeClr val="bg2">
+                        <a:lumMod val="90000"/>
+                      </a:schemeClr>
+                    </a:solidFill>
+                  </a:tcPr>
+                </a:tc>
+                <a:tc>
+                  <a:txBody>
+                    <a:bodyPr/>
+                    <a:lstStyle/>
+                    <a:p>
+                      <a:pPr algn="ctr"/>
+                      <a:endParaRPr lang="en-US" sz="1600" dirty="0"/>
+                    </a:p>
+                  </a:txBody>
+                  <a:tcPr>
+                    <a:solidFill>
+                      <a:schemeClr val="tx2">
+                        <a:lumMod val="10000"/>
+                        <a:lumOff val="90000"/>
+                      </a:schemeClr>
+                    </a:solidFill>
+                  </a:tcPr>
+                </a:tc>
+                <a:tc>
+                  <a:txBody>
+                    <a:bodyPr/>
+                    <a:lstStyle/>
+                    <a:p>
+                      <a:pPr algn="ctr"/>
+                      <a:endParaRPr lang="en-US" sz="1600" dirty="0"/>
+                    </a:p>
+                  </a:txBody>
+                  <a:tcPr>
+                    <a:solidFill>
+                      <a:schemeClr val="accent1">
+                        <a:lumMod val="20000"/>
+                        <a:lumOff val="80000"/>
+                      </a:schemeClr>
+                    </a:solidFill>
+                  </a:tcPr>
+                </a:tc>
+                <a:tc>
+                  <a:txBody>
+                    <a:bodyPr/>
+                    <a:lstStyle/>
+                    <a:p>
+                      <a:pPr algn="ctr"/>
+                      <a:endParaRPr lang="en-US" sz="1600" dirty="0"/>
+                    </a:p>
+                  </a:txBody>
+                  <a:tcPr>
+                    <a:solidFill>
+                      <a:schemeClr val="accent2">
+                        <a:lumMod val="20000"/>
+                        <a:lumOff val="80000"/>
+                      </a:schemeClr>
+                    </a:solidFill>
+                  </a:tcPr>
+                </a:tc>
+                <a:tc>
+                  <a:txBody>
+                    <a:bodyPr/>
+                    <a:lstStyle/>
+                    <a:p>
+                      <a:pPr algn="ctr"/>
+                      <a:endParaRPr lang="en-US" sz="1600" dirty="0"/>
+                    </a:p>
+                  </a:txBody>
+                  <a:tcPr>
+                    <a:solidFill>
+                      <a:schemeClr val="accent3">
+                        <a:lumMod val="20000"/>
+                        <a:lumOff val="80000"/>
+                      </a:schemeClr>
+                    </a:solidFill>
+                  </a:tcPr>
+                </a:tc>
+                <a:tc>
+                  <a:txBody>
+                    <a:bodyPr/>
+                    <a:lstStyle/>
+                    <a:p>
+                      <a:pPr algn="ctr"/>
+                      <a:endParaRPr lang="en-US" sz="1600" dirty="0"/>
+                    </a:p>
+                  </a:txBody>
+                  <a:tcPr>
+                    <a:solidFill>
+                      <a:schemeClr val="accent4">
+                        <a:lumMod val="20000"/>
+                        <a:lumOff val="80000"/>
+                      </a:schemeClr>
+                    </a:solidFill>
+                  </a:tcPr>
+                </a:tc>
+                <a:tc>
+                  <a:txBody>
+                    <a:bodyPr/>
+                    <a:lstStyle/>
+                    <a:p>
+                      <a:pPr algn="ctr"/>
+                      <a:endParaRPr lang="en-US" sz="1600" dirty="0"/>
+                    </a:p>
+                  </a:txBody>
+                  <a:tcPr>
+                    <a:solidFill>
+                      <a:schemeClr val="accent5">
+                        <a:lumMod val="20000"/>
+                        <a:lumOff val="80000"/>
+                      </a:schemeClr>
+                    </a:solidFill>
+                  </a:tcPr>
+                </a:tc>
+                <a:tc>
+                  <a:txBody>
+                    <a:bodyPr/>
+                    <a:lstStyle/>
+                    <a:p>
+                      <a:pPr algn="ctr"/>
+                      <a:endParaRPr lang="en-US" sz="1600" dirty="0"/>
+                    </a:p>
+                  </a:txBody>
+                  <a:tcPr>
+                    <a:solidFill>
+                      <a:schemeClr val="accent6">
+                        <a:lumMod val="20000"/>
+                        <a:lumOff val="80000"/>
+                      </a:schemeClr>
+                    </a:solidFill>
+                  </a:tcPr>
+                </a:tc>
+                <a:extLst>
+                  <a:ext uri="{0D108BD9-81ED-4DB2-BD59-A6C34878D82A}">
+                    <a16:rowId xmlns:a16="http://schemas.microsoft.com/office/drawing/2014/main" val="3975443862"/>
+                  </a:ext>
+                </a:extLst>
+              </a:tr>
+              <a:tr h="370840">
+                <a:tc>
+                  <a:txBody>
+                    <a:bodyPr/>
+                    <a:lstStyle/>
+                    <a:p>
+                      <a:pPr algn="ctr"/>
+                      <a:endParaRPr lang="en-US" sz="1600" dirty="0"/>
+                    </a:p>
+                  </a:txBody>
+                  <a:tcPr>
+                    <a:solidFill>
+                      <a:schemeClr val="bg1">
+                        <a:lumMod val="85000"/>
+                      </a:schemeClr>
+                    </a:solidFill>
+                  </a:tcPr>
+                </a:tc>
+                <a:tc>
+                  <a:txBody>
+                    <a:bodyPr/>
+                    <a:lstStyle/>
+                    <a:p>
+                      <a:pPr algn="ctr"/>
+                      <a:endParaRPr lang="en-US" sz="1600" dirty="0"/>
+                    </a:p>
+                  </a:txBody>
+                  <a:tcPr>
+                    <a:solidFill>
+                      <a:schemeClr val="tx1">
+                        <a:lumMod val="65000"/>
+                        <a:lumOff val="35000"/>
+                      </a:schemeClr>
+                    </a:solidFill>
+                  </a:tcPr>
+                </a:tc>
+                <a:tc>
+                  <a:txBody>
+                    <a:bodyPr/>
+                    <a:lstStyle/>
+                    <a:p>
+                      <a:pPr algn="ctr"/>
+                      <a:endParaRPr lang="en-US" sz="1600" dirty="0"/>
+                    </a:p>
+                  </a:txBody>
+                  <a:tcPr>
+                    <a:solidFill>
+                      <a:schemeClr val="bg2">
+                        <a:lumMod val="75000"/>
+                      </a:schemeClr>
+                    </a:solidFill>
+                  </a:tcPr>
+                </a:tc>
+                <a:tc>
+                  <a:txBody>
+                    <a:bodyPr/>
+                    <a:lstStyle/>
+                    <a:p>
+                      <a:pPr algn="ctr"/>
+                      <a:endParaRPr lang="en-US" sz="1600" dirty="0"/>
+                    </a:p>
+                  </a:txBody>
+                  <a:tcPr>
+                    <a:solidFill>
+                      <a:schemeClr val="tx2">
+                        <a:lumMod val="25000"/>
+                        <a:lumOff val="75000"/>
+                      </a:schemeClr>
+                    </a:solidFill>
+                  </a:tcPr>
+                </a:tc>
+                <a:tc>
+                  <a:txBody>
+                    <a:bodyPr/>
+                    <a:lstStyle/>
+                    <a:p>
+                      <a:pPr algn="ctr"/>
+                      <a:endParaRPr lang="en-US" sz="1600" dirty="0"/>
+                    </a:p>
+                  </a:txBody>
+                  <a:tcPr>
+                    <a:solidFill>
+                      <a:schemeClr val="accent1">
+                        <a:lumMod val="40000"/>
+                        <a:lumOff val="60000"/>
+                      </a:schemeClr>
+                    </a:solidFill>
+                  </a:tcPr>
+                </a:tc>
+                <a:tc>
+                  <a:txBody>
+                    <a:bodyPr/>
+                    <a:lstStyle/>
+                    <a:p>
+                      <a:pPr algn="ctr"/>
+                      <a:endParaRPr lang="en-US" sz="1600" dirty="0"/>
+                    </a:p>
+                  </a:txBody>
+                  <a:tcPr>
+                    <a:solidFill>
+                      <a:schemeClr val="accent2">
+                        <a:lumMod val="40000"/>
+                        <a:lumOff val="60000"/>
+                      </a:schemeClr>
+                    </a:solidFill>
+                  </a:tcPr>
+                </a:tc>
+                <a:tc>
+                  <a:txBody>
+                    <a:bodyPr/>
+                    <a:lstStyle/>
+                    <a:p>
+                      <a:pPr algn="ctr"/>
+                      <a:endParaRPr lang="en-US" sz="1600" dirty="0"/>
+                    </a:p>
+                  </a:txBody>
+                  <a:tcPr>
+                    <a:solidFill>
+                      <a:schemeClr val="accent3">
+                        <a:lumMod val="60000"/>
+                        <a:lumOff val="40000"/>
+                      </a:schemeClr>
+                    </a:solidFill>
+                  </a:tcPr>
+                </a:tc>
+                <a:tc>
+                  <a:txBody>
+                    <a:bodyPr/>
+                    <a:lstStyle/>
+                    <a:p>
+                      <a:pPr algn="ctr"/>
+                      <a:endParaRPr lang="en-US" sz="1600" dirty="0"/>
+                    </a:p>
+                  </a:txBody>
+                  <a:tcPr>
+                    <a:solidFill>
+                      <a:schemeClr val="accent4">
+                        <a:lumMod val="40000"/>
+                        <a:lumOff val="60000"/>
+                      </a:schemeClr>
+                    </a:solidFill>
+                  </a:tcPr>
+                </a:tc>
+                <a:tc>
+                  <a:txBody>
+                    <a:bodyPr/>
+                    <a:lstStyle/>
+                    <a:p>
+                      <a:pPr algn="ctr"/>
+                      <a:endParaRPr lang="en-US" sz="1600" dirty="0"/>
+                    </a:p>
+                  </a:txBody>
+                  <a:tcPr>
+                    <a:solidFill>
+                      <a:schemeClr val="accent5">
+                        <a:lumMod val="40000"/>
+                        <a:lumOff val="60000"/>
+                      </a:schemeClr>
+                    </a:solidFill>
+                  </a:tcPr>
+                </a:tc>
+                <a:tc>
+                  <a:txBody>
+                    <a:bodyPr/>
+                    <a:lstStyle/>
+                    <a:p>
+                      <a:pPr algn="ctr"/>
+                      <a:endParaRPr lang="en-US" sz="1600" dirty="0"/>
+                    </a:p>
+                  </a:txBody>
+                  <a:tcPr>
+                    <a:solidFill>
+                      <a:schemeClr val="accent6">
+                        <a:lumMod val="40000"/>
+                        <a:lumOff val="60000"/>
+                      </a:schemeClr>
+                    </a:solidFill>
+                  </a:tcPr>
+                </a:tc>
+                <a:extLst>
+                  <a:ext uri="{0D108BD9-81ED-4DB2-BD59-A6C34878D82A}">
+                    <a16:rowId xmlns:a16="http://schemas.microsoft.com/office/drawing/2014/main" val="3812555212"/>
+                  </a:ext>
+                </a:extLst>
+              </a:tr>
+              <a:tr h="370840">
+                <a:tc>
+                  <a:txBody>
+                    <a:bodyPr/>
+                    <a:lstStyle/>
+                    <a:p>
+                      <a:pPr algn="ctr"/>
+                      <a:endParaRPr lang="en-US" sz="1600" dirty="0"/>
+                    </a:p>
+                  </a:txBody>
+                  <a:tcPr>
+                    <a:solidFill>
+                      <a:schemeClr val="bg1">
+                        <a:lumMod val="75000"/>
+                      </a:schemeClr>
+                    </a:solidFill>
+                  </a:tcPr>
+                </a:tc>
+                <a:tc>
+                  <a:txBody>
+                    <a:bodyPr/>
+                    <a:lstStyle/>
+                    <a:p>
+                      <a:pPr algn="ctr"/>
+                      <a:endParaRPr lang="en-US" sz="1600" dirty="0"/>
+                    </a:p>
+                  </a:txBody>
+                  <a:tcPr>
+                    <a:solidFill>
+                      <a:schemeClr val="tx1">
+                        <a:lumMod val="75000"/>
+                        <a:lumOff val="25000"/>
+                      </a:schemeClr>
+                    </a:solidFill>
+                  </a:tcPr>
+                </a:tc>
+                <a:tc>
+                  <a:txBody>
+                    <a:bodyPr/>
+                    <a:lstStyle/>
+                    <a:p>
+                      <a:pPr algn="ctr"/>
+                      <a:endParaRPr lang="en-US" sz="1600" dirty="0"/>
+                    </a:p>
+                  </a:txBody>
+                  <a:tcPr>
+                    <a:solidFill>
+                      <a:schemeClr val="bg2">
+                        <a:lumMod val="50000"/>
+                      </a:schemeClr>
+                    </a:solidFill>
+                  </a:tcPr>
+                </a:tc>
+                <a:tc>
+                  <a:txBody>
+                    <a:bodyPr/>
+                    <a:lstStyle/>
+                    <a:p>
+                      <a:pPr algn="ctr"/>
+                      <a:endParaRPr lang="en-US" sz="1600" dirty="0"/>
+                    </a:p>
+                  </a:txBody>
+                  <a:tcPr>
+                    <a:solidFill>
+                      <a:schemeClr val="tx2">
+                        <a:lumMod val="50000"/>
+                        <a:lumOff val="50000"/>
+                      </a:schemeClr>
+                    </a:solidFill>
+                  </a:tcPr>
+                </a:tc>
+                <a:tc>
+                  <a:txBody>
+                    <a:bodyPr/>
+                    <a:lstStyle/>
+                    <a:p>
+                      <a:pPr algn="ctr"/>
+                      <a:endParaRPr lang="en-US" sz="1600" dirty="0"/>
+                    </a:p>
+                  </a:txBody>
+                  <a:tcPr>
+                    <a:solidFill>
+                      <a:schemeClr val="accent1">
+                        <a:lumMod val="60000"/>
+                        <a:lumOff val="40000"/>
+                      </a:schemeClr>
+                    </a:solidFill>
+                  </a:tcPr>
+                </a:tc>
+                <a:tc>
+                  <a:txBody>
+                    <a:bodyPr/>
+                    <a:lstStyle/>
+                    <a:p>
+                      <a:pPr algn="ctr"/>
+                      <a:endParaRPr lang="en-US" sz="1600" dirty="0"/>
+                    </a:p>
+                  </a:txBody>
+                  <a:tcPr>
+                    <a:solidFill>
+                      <a:schemeClr val="accent2">
+                        <a:lumMod val="60000"/>
+                        <a:lumOff val="40000"/>
+                      </a:schemeClr>
+                    </a:solidFill>
+                  </a:tcPr>
+                </a:tc>
+                <a:tc>
+                  <a:txBody>
+                    <a:bodyPr/>
+                    <a:lstStyle/>
+                    <a:p>
+                      <a:pPr algn="ctr"/>
+                      <a:endParaRPr lang="en-US" sz="1600" dirty="0"/>
+                    </a:p>
+                  </a:txBody>
+                  <a:tcPr>
+                    <a:solidFill>
+                      <a:schemeClr val="accent3">
+                        <a:lumMod val="60000"/>
+                        <a:lumOff val="40000"/>
+                      </a:schemeClr>
+                    </a:solidFill>
+                  </a:tcPr>
+                </a:tc>
+                <a:tc>
+                  <a:txBody>
+                    <a:bodyPr/>
+                    <a:lstStyle/>
+                    <a:p>
+                      <a:pPr algn="ctr"/>
+                      <a:endParaRPr lang="en-US" sz="1600" dirty="0"/>
+                    </a:p>
+                  </a:txBody>
+                  <a:tcPr>
+                    <a:solidFill>
+                      <a:schemeClr val="accent4">
+                        <a:lumMod val="60000"/>
+                        <a:lumOff val="40000"/>
+                      </a:schemeClr>
+                    </a:solidFill>
+                  </a:tcPr>
+                </a:tc>
+                <a:tc>
+                  <a:txBody>
+                    <a:bodyPr/>
+                    <a:lstStyle/>
+                    <a:p>
+                      <a:pPr algn="ctr"/>
+                      <a:endParaRPr lang="en-US" sz="1600" dirty="0"/>
+                    </a:p>
+                  </a:txBody>
+                  <a:tcPr>
+                    <a:solidFill>
+                      <a:schemeClr val="accent5">
+                        <a:lumMod val="60000"/>
+                        <a:lumOff val="40000"/>
+                      </a:schemeClr>
+                    </a:solidFill>
+                  </a:tcPr>
+                </a:tc>
+                <a:tc>
+                  <a:txBody>
+                    <a:bodyPr/>
+                    <a:lstStyle/>
+                    <a:p>
+                      <a:pPr algn="ctr"/>
+                      <a:endParaRPr lang="en-US" sz="1600" dirty="0"/>
+                    </a:p>
+                  </a:txBody>
+                  <a:tcPr>
+                    <a:solidFill>
+                      <a:schemeClr val="accent6">
+                        <a:lumMod val="60000"/>
+                        <a:lumOff val="40000"/>
+                      </a:schemeClr>
+                    </a:solidFill>
+                  </a:tcPr>
+                </a:tc>
+                <a:extLst>
+                  <a:ext uri="{0D108BD9-81ED-4DB2-BD59-A6C34878D82A}">
+                    <a16:rowId xmlns:a16="http://schemas.microsoft.com/office/drawing/2014/main" val="1034102025"/>
+                  </a:ext>
+                </a:extLst>
+              </a:tr>
+              <a:tr h="370840">
+                <a:tc>
+                  <a:txBody>
+                    <a:bodyPr/>
+                    <a:lstStyle/>
+                    <a:p>
+                      <a:pPr algn="ctr"/>
+                      <a:endParaRPr lang="en-US" sz="1600" dirty="0"/>
+                    </a:p>
+                  </a:txBody>
+                  <a:tcPr>
+                    <a:solidFill>
+                      <a:schemeClr val="bg1">
+                        <a:lumMod val="65000"/>
+                      </a:schemeClr>
+                    </a:solidFill>
+                  </a:tcPr>
+                </a:tc>
+                <a:tc>
+                  <a:txBody>
+                    <a:bodyPr/>
+                    <a:lstStyle/>
+                    <a:p>
+                      <a:pPr algn="ctr"/>
+                      <a:endParaRPr lang="en-US" sz="1600" dirty="0"/>
+                    </a:p>
+                  </a:txBody>
+                  <a:tcPr>
+                    <a:solidFill>
+                      <a:schemeClr val="tx1">
+                        <a:lumMod val="85000"/>
+                        <a:lumOff val="15000"/>
+                      </a:schemeClr>
+                    </a:solidFill>
+                  </a:tcPr>
+                </a:tc>
+                <a:tc>
+                  <a:txBody>
+                    <a:bodyPr/>
+                    <a:lstStyle/>
+                    <a:p>
+                      <a:pPr algn="ctr"/>
+                      <a:endParaRPr lang="en-US" sz="1600" dirty="0"/>
+                    </a:p>
+                  </a:txBody>
+                  <a:tcPr>
+                    <a:solidFill>
+                      <a:schemeClr val="bg2">
+                        <a:lumMod val="25000"/>
+                      </a:schemeClr>
+                    </a:solidFill>
+                  </a:tcPr>
+                </a:tc>
+                <a:tc>
+                  <a:txBody>
+                    <a:bodyPr/>
+                    <a:lstStyle/>
+                    <a:p>
+                      <a:pPr algn="ctr"/>
+                      <a:endParaRPr lang="en-US" sz="1600" dirty="0"/>
+                    </a:p>
+                  </a:txBody>
+                  <a:tcPr>
+                    <a:solidFill>
+                      <a:schemeClr val="tx2">
+                        <a:lumMod val="75000"/>
+                        <a:lumOff val="25000"/>
+                      </a:schemeClr>
+                    </a:solidFill>
+                  </a:tcPr>
+                </a:tc>
+                <a:tc>
+                  <a:txBody>
+                    <a:bodyPr/>
+                    <a:lstStyle/>
+                    <a:p>
+                      <a:pPr algn="ctr"/>
+                      <a:endParaRPr lang="en-US" sz="1600" dirty="0"/>
+                    </a:p>
+                  </a:txBody>
+                  <a:tcPr>
+                    <a:solidFill>
+                      <a:schemeClr val="accent1">
+                        <a:lumMod val="75000"/>
+                      </a:schemeClr>
+                    </a:solidFill>
+                  </a:tcPr>
+                </a:tc>
+                <a:tc>
+                  <a:txBody>
+                    <a:bodyPr/>
+                    <a:lstStyle/>
+                    <a:p>
+                      <a:pPr algn="ctr"/>
+                      <a:endParaRPr lang="en-US" sz="1600" dirty="0"/>
+                    </a:p>
+                  </a:txBody>
+                  <a:tcPr>
+                    <a:solidFill>
+                      <a:schemeClr val="accent2">
+                        <a:lumMod val="75000"/>
+                      </a:schemeClr>
+                    </a:solidFill>
+                  </a:tcPr>
+                </a:tc>
+                <a:tc>
+                  <a:txBody>
+                    <a:bodyPr/>
+                    <a:lstStyle/>
+                    <a:p>
+                      <a:pPr algn="ctr"/>
+                      <a:endParaRPr lang="en-US" sz="1600" dirty="0"/>
+                    </a:p>
+                  </a:txBody>
+                  <a:tcPr>
+                    <a:solidFill>
+                      <a:schemeClr val="accent3">
+                        <a:lumMod val="75000"/>
+                      </a:schemeClr>
+                    </a:solidFill>
+                  </a:tcPr>
+                </a:tc>
+                <a:tc>
+                  <a:txBody>
+                    <a:bodyPr/>
+                    <a:lstStyle/>
+                    <a:p>
+                      <a:pPr algn="ctr"/>
+                      <a:endParaRPr lang="en-US" sz="1600" dirty="0"/>
+                    </a:p>
+                  </a:txBody>
+                  <a:tcPr>
+                    <a:solidFill>
+                      <a:schemeClr val="accent4">
+                        <a:lumMod val="75000"/>
+                      </a:schemeClr>
+                    </a:solidFill>
+                  </a:tcPr>
+                </a:tc>
+                <a:tc>
+                  <a:txBody>
+                    <a:bodyPr/>
+                    <a:lstStyle/>
+                    <a:p>
+                      <a:pPr algn="ctr"/>
+                      <a:endParaRPr lang="en-US" sz="1600" dirty="0"/>
+                    </a:p>
+                  </a:txBody>
+                  <a:tcPr>
+                    <a:solidFill>
+                      <a:schemeClr val="accent5">
+                        <a:lumMod val="75000"/>
+                      </a:schemeClr>
+                    </a:solidFill>
+                  </a:tcPr>
+                </a:tc>
+                <a:tc>
+                  <a:txBody>
+                    <a:bodyPr/>
+                    <a:lstStyle/>
+                    <a:p>
+                      <a:pPr algn="ctr"/>
+                      <a:endParaRPr lang="en-US" sz="1600" dirty="0"/>
+                    </a:p>
+                  </a:txBody>
+                  <a:tcPr>
+                    <a:solidFill>
+                      <a:schemeClr val="accent6">
+                        <a:lumMod val="75000"/>
+                      </a:schemeClr>
+                    </a:solidFill>
+                  </a:tcPr>
+                </a:tc>
+                <a:extLst>
+                  <a:ext uri="{0D108BD9-81ED-4DB2-BD59-A6C34878D82A}">
+                    <a16:rowId xmlns:a16="http://schemas.microsoft.com/office/drawing/2014/main" val="3797489546"/>
+                  </a:ext>
+                </a:extLst>
+              </a:tr>
+              <a:tr h="370840">
+                <a:tc>
+                  <a:txBody>
+                    <a:bodyPr/>
+                    <a:lstStyle/>
+                    <a:p>
+                      <a:pPr algn="ctr"/>
+                      <a:endParaRPr lang="en-US" sz="1600" dirty="0"/>
+                    </a:p>
+                  </a:txBody>
+                  <a:tcPr>
+                    <a:solidFill>
+                      <a:schemeClr val="bg1">
+                        <a:lumMod val="50000"/>
+                      </a:schemeClr>
+                    </a:solidFill>
+                  </a:tcPr>
+                </a:tc>
+                <a:tc>
+                  <a:txBody>
+                    <a:bodyPr/>
+                    <a:lstStyle/>
+                    <a:p>
+                      <a:pPr algn="ctr"/>
+                      <a:endParaRPr lang="en-US" sz="1600" dirty="0"/>
+                    </a:p>
+                  </a:txBody>
+                  <a:tcPr>
+                    <a:solidFill>
+                      <a:schemeClr val="tx1">
+                        <a:lumMod val="95000"/>
+                        <a:lumOff val="5000"/>
+                      </a:schemeClr>
+                    </a:solidFill>
+                  </a:tcPr>
+                </a:tc>
+                <a:tc>
+                  <a:txBody>
+                    <a:bodyPr/>
+                    <a:lstStyle/>
+                    <a:p>
+                      <a:pPr algn="ctr"/>
+                      <a:endParaRPr lang="en-US" sz="1600" dirty="0"/>
+                    </a:p>
+                  </a:txBody>
+                  <a:tcPr>
+                    <a:solidFill>
+                      <a:schemeClr val="bg2">
+                        <a:lumMod val="10000"/>
+                      </a:schemeClr>
+                    </a:solidFill>
+                  </a:tcPr>
+                </a:tc>
+                <a:tc>
+                  <a:txBody>
+                    <a:bodyPr/>
+                    <a:lstStyle/>
+                    <a:p>
+                      <a:pPr algn="ctr"/>
+                      <a:endParaRPr lang="en-US" sz="1600" dirty="0"/>
+                    </a:p>
+                  </a:txBody>
+                  <a:tcPr>
+                    <a:solidFill>
+                      <a:schemeClr val="tx2">
+                        <a:lumMod val="90000"/>
+                        <a:lumOff val="10000"/>
+                      </a:schemeClr>
+                    </a:solidFill>
+                  </a:tcPr>
+                </a:tc>
+                <a:tc>
+                  <a:txBody>
+                    <a:bodyPr/>
+                    <a:lstStyle/>
+                    <a:p>
+                      <a:pPr algn="ctr"/>
+                      <a:endParaRPr lang="en-US" sz="1600" dirty="0"/>
+                    </a:p>
+                  </a:txBody>
+                  <a:tcPr>
+                    <a:solidFill>
+                      <a:schemeClr val="accent1">
+                        <a:lumMod val="50000"/>
+                      </a:schemeClr>
+                    </a:solidFill>
+                  </a:tcPr>
+                </a:tc>
+                <a:tc>
+                  <a:txBody>
+                    <a:bodyPr/>
+                    <a:lstStyle/>
+                    <a:p>
+                      <a:pPr algn="ctr"/>
+                      <a:endParaRPr lang="en-US" sz="1600" dirty="0"/>
+                    </a:p>
+                  </a:txBody>
+                  <a:tcPr>
+                    <a:solidFill>
+                      <a:schemeClr val="accent2">
+                        <a:lumMod val="50000"/>
+                      </a:schemeClr>
+                    </a:solidFill>
+                  </a:tcPr>
+                </a:tc>
+                <a:tc>
+                  <a:txBody>
+                    <a:bodyPr/>
+                    <a:lstStyle/>
+                    <a:p>
+                      <a:pPr algn="ctr"/>
+                      <a:endParaRPr lang="en-US" sz="1600" dirty="0"/>
+                    </a:p>
+                  </a:txBody>
+                  <a:tcPr>
+                    <a:solidFill>
+                      <a:schemeClr val="accent3">
+                        <a:lumMod val="50000"/>
+                      </a:schemeClr>
+                    </a:solidFill>
+                  </a:tcPr>
+                </a:tc>
+                <a:tc>
+                  <a:txBody>
+                    <a:bodyPr/>
+                    <a:lstStyle/>
+                    <a:p>
+                      <a:pPr algn="ctr"/>
+                      <a:endParaRPr lang="en-US" sz="1600" dirty="0"/>
+                    </a:p>
+                  </a:txBody>
+                  <a:tcPr>
+                    <a:solidFill>
+                      <a:schemeClr val="accent4">
+                        <a:lumMod val="50000"/>
+                      </a:schemeClr>
+                    </a:solidFill>
+                  </a:tcPr>
+                </a:tc>
+                <a:tc>
+                  <a:txBody>
+                    <a:bodyPr/>
+                    <a:lstStyle/>
+                    <a:p>
+                      <a:pPr algn="ctr"/>
+                      <a:endParaRPr lang="en-US" sz="1600" dirty="0"/>
+                    </a:p>
+                  </a:txBody>
+                  <a:tcPr>
+                    <a:solidFill>
+                      <a:schemeClr val="accent5">
+                        <a:lumMod val="50000"/>
+                      </a:schemeClr>
+                    </a:solidFill>
+                  </a:tcPr>
+                </a:tc>
+                <a:tc>
+                  <a:txBody>
+                    <a:bodyPr/>
+                    <a:lstStyle/>
+                    <a:p>
+                      <a:pPr algn="ctr"/>
+                      <a:endParaRPr lang="en-US" sz="1600" dirty="0"/>
+                    </a:p>
+                  </a:txBody>
+                  <a:tcPr>
+                    <a:solidFill>
+                      <a:schemeClr val="accent6">
+                        <a:lumMod val="50000"/>
+                      </a:schemeClr>
+                    </a:solidFill>
+                  </a:tcPr>
+                </a:tc>
+                <a:extLst>
+                  <a:ext uri="{0D108BD9-81ED-4DB2-BD59-A6C34878D82A}">
+                    <a16:rowId xmlns:a16="http://schemas.microsoft.com/office/drawing/2014/main" val="1507944986"/>
+                  </a:ext>
+                </a:extLst>
+              </a:tr>
+            </a:tbl>
+          </a:graphicData>
+        </a:graphic>
+      </p:graphicFrame>
+    </p:spTree>
+    <p:extLst>
+      <p:ext uri="{BB962C8B-B14F-4D97-AF65-F5344CB8AC3E}">
+        <p14:creationId xmlns:p14="http://schemas.microsoft.com/office/powerpoint/2010/main" val="175623985"/>
+      </p:ext>
+    </p:extLst>
+  </p:cSld>
+  <p:clrMapOvr>
+    <a:masterClrMapping/>
+  </p:clrMapOvr>
+</p:sld>
+</file>
+
+<file path=ppt/slides/slide6.xml><?xml version="1.0" encoding="utf-8"?>
+<p:sld xmlns:a="http://schemas.openxmlformats.org/drawingml/2006/main" xmlns:r="http://schemas.openxmlformats.org/officeDocument/2006/relationships" xmlns:p="http://schemas.openxmlformats.org/presentationml/2006/main">
+  <p:cSld>
+    <p:spTree>
+      <p:nvGrpSpPr>
+        <p:cNvPr id="1" name=""/>
+        <p:cNvGrpSpPr/>
+        <p:nvPr/>
+      </p:nvGrpSpPr>
+      <p:grpSpPr>
+        <a:xfrm>
+          <a:off x="0" y="0"/>
+          <a:ext cx="0" cy="0"/>
+          <a:chOff x="0" y="0"/>
+          <a:chExt cx="0" cy="0"/>
+        </a:xfrm>
+      </p:grpSpPr>
+      <p:sp>
+        <p:nvSpPr>
+          <p:cNvPr id="2" name="Title 1">
+            <a:extLst>
+              <a:ext uri="{FF2B5EF4-FFF2-40B4-BE49-F238E27FC236}">
                 <a16:creationId xmlns:a16="http://schemas.microsoft.com/office/drawing/2014/main" id="{D8AFF263-E707-789A-2696-41FBD152D4EB}"/>
               </a:ext>
             </a:extLst>
@@ -24055,7 +25411,7 @@
 </p:sld>
 </file>
 
-<file path=ppt/slides/slide6.xml><?xml version="1.0" encoding="utf-8"?>
+<file path=ppt/slides/slide7.xml><?xml version="1.0" encoding="utf-8"?>
 <p:sld xmlns:a="http://schemas.openxmlformats.org/drawingml/2006/main" xmlns:r="http://schemas.openxmlformats.org/officeDocument/2006/relationships" xmlns:p="http://schemas.openxmlformats.org/presentationml/2006/main">
   <p:cSld>
     <p:spTree>
@@ -24177,7 +25533,7 @@
 </p:sld>
 </file>
 
-<file path=ppt/slides/slide7.xml><?xml version="1.0" encoding="utf-8"?>
+<file path=ppt/slides/slide8.xml><?xml version="1.0" encoding="utf-8"?>
 <p:sld xmlns:a="http://schemas.openxmlformats.org/drawingml/2006/main" xmlns:r="http://schemas.openxmlformats.org/officeDocument/2006/relationships" xmlns:p="http://schemas.openxmlformats.org/presentationml/2006/main">
   <p:cSld>
     <p:spTree>
@@ -24373,7 +25729,7 @@
 </p:sld>
 </file>
 
-<file path=ppt/slides/slide8.xml><?xml version="1.0" encoding="utf-8"?>
+<file path=ppt/slides/slide9.xml><?xml version="1.0" encoding="utf-8"?>
 <p:sld xmlns:a="http://schemas.openxmlformats.org/drawingml/2006/main" xmlns:r="http://schemas.openxmlformats.org/officeDocument/2006/relationships" xmlns:p="http://schemas.openxmlformats.org/presentationml/2006/main">
   <p:cSld>
     <p:spTree>
@@ -24454,96 +25810,6 @@
     <p:extLst>
       <p:ext uri="{BB962C8B-B14F-4D97-AF65-F5344CB8AC3E}">
         <p14:creationId xmlns:p14="http://schemas.microsoft.com/office/powerpoint/2010/main" val="2781542848"/>
-      </p:ext>
-    </p:extLst>
-  </p:cSld>
-  <p:clrMapOvr>
-    <a:masterClrMapping/>
-  </p:clrMapOvr>
-</p:sld>
-</file>
-
-<file path=ppt/slides/slide9.xml><?xml version="1.0" encoding="utf-8"?>
-<p:sld xmlns:a="http://schemas.openxmlformats.org/drawingml/2006/main" xmlns:r="http://schemas.openxmlformats.org/officeDocument/2006/relationships" xmlns:p="http://schemas.openxmlformats.org/presentationml/2006/main">
-  <p:cSld>
-    <p:spTree>
-      <p:nvGrpSpPr>
-        <p:cNvPr id="1" name="">
-          <a:extLst>
-            <a:ext uri="{FF2B5EF4-FFF2-40B4-BE49-F238E27FC236}">
-              <a16:creationId xmlns:a16="http://schemas.microsoft.com/office/drawing/2014/main" id="{D268A264-832C-8FFF-6ED3-2805B1F8FC92}"/>
-            </a:ext>
-          </a:extLst>
-        </p:cNvPr>
-        <p:cNvGrpSpPr/>
-        <p:nvPr/>
-      </p:nvGrpSpPr>
-      <p:grpSpPr>
-        <a:xfrm>
-          <a:off x="0" y="0"/>
-          <a:ext cx="0" cy="0"/>
-          <a:chOff x="0" y="0"/>
-          <a:chExt cx="0" cy="0"/>
-        </a:xfrm>
-      </p:grpSpPr>
-      <p:sp>
-        <p:nvSpPr>
-          <p:cNvPr id="2" name="Title 1">
-            <a:extLst>
-              <a:ext uri="{FF2B5EF4-FFF2-40B4-BE49-F238E27FC236}">
-                <a16:creationId xmlns:a16="http://schemas.microsoft.com/office/drawing/2014/main" id="{05E06E67-81E1-2130-CE37-7DE0094E6289}"/>
-              </a:ext>
-            </a:extLst>
-          </p:cNvPr>
-          <p:cNvSpPr>
-            <a:spLocks noGrp="1"/>
-          </p:cNvSpPr>
-          <p:nvPr>
-            <p:ph type="title"/>
-          </p:nvPr>
-        </p:nvSpPr>
-        <p:spPr/>
-        <p:txBody>
-          <a:bodyPr/>
-          <a:lstStyle/>
-          <a:p>
-            <a:r>
-              <a:rPr lang="en-US" dirty="0"/>
-              <a:t>Theme 2: Chart</a:t>
-            </a:r>
-          </a:p>
-        </p:txBody>
-      </p:sp>
-      <p:graphicFrame>
-        <p:nvGraphicFramePr>
-          <p:cNvPr id="10" name="Content Placeholder 9">
-            <a:extLst>
-              <a:ext uri="{FF2B5EF4-FFF2-40B4-BE49-F238E27FC236}">
-                <a16:creationId xmlns:a16="http://schemas.microsoft.com/office/drawing/2014/main" id="{307C1A24-B84A-87B6-2C0D-F729B94FBDF5}"/>
-              </a:ext>
-            </a:extLst>
-          </p:cNvPr>
-          <p:cNvGraphicFramePr>
-            <a:graphicFrameLocks noGrp="1"/>
-          </p:cNvGraphicFramePr>
-          <p:nvPr>
-            <p:ph idx="1"/>
-          </p:nvPr>
-        </p:nvGraphicFramePr>
-        <p:xfrm>
-          <a:off x="838200" y="1825625"/>
-          <a:ext cx="10515600" cy="4351338"/>
-        </p:xfrm>
-        <a:graphic>
-          <a:graphicData uri="http://schemas.openxmlformats.org/drawingml/2006/chart">
-            <c:chart xmlns:c="http://schemas.openxmlformats.org/drawingml/2006/chart" xmlns:r="http://schemas.openxmlformats.org/officeDocument/2006/relationships" r:id="rId2"/>
-          </a:graphicData>
-        </a:graphic>
-      </p:graphicFrame>
-    </p:spTree>
-    <p:extLst>
-      <p:ext uri="{BB962C8B-B14F-4D97-AF65-F5344CB8AC3E}">
-        <p14:creationId xmlns:p14="http://schemas.microsoft.com/office/powerpoint/2010/main" val="1292343799"/>
       </p:ext>
     </p:extLst>
   </p:cSld>

</xml_diff>